<commit_message>
web site tructure updated according to new idea. Design template image was added.
</commit_message>
<xml_diff>
--- a/artifacts/web site structure.pptx
+++ b/artifacts/web site structure.pptx
@@ -104,6 +104,11 @@
       </a:defRPr>
     </a:lvl9pPr>
   </p:defaultTextStyle>
+  <p:extLst>
+    <p:ext uri="{EFAFB233-063F-42B5-8137-9DF3F51BA10A}">
+      <p15:sldGuideLst xmlns:p15="http://schemas.microsoft.com/office/powerpoint/2012/main"/>
+    </p:ext>
+  </p:extLst>
 </p:presentation>
 </file>
 
@@ -857,7 +862,7 @@
 <file path=ppt/diagrams/data1.xml><?xml version="1.0" encoding="utf-8"?>
 <dgm:dataModel xmlns:dgm="http://schemas.openxmlformats.org/drawingml/2006/diagram" xmlns:a="http://schemas.openxmlformats.org/drawingml/2006/main">
   <dgm:ptLst>
-    <dgm:pt modelId="{6F72523D-3FDA-4CE5-AC38-A9BA6E1C30CB}" type="doc">
+    <dgm:pt modelId="{B19DC9A7-610C-4A48-8810-E75EBF37A42F}" type="doc">
       <dgm:prSet loTypeId="urn:microsoft.com/office/officeart/2005/8/layout/orgChart1" loCatId="hierarchy" qsTypeId="urn:microsoft.com/office/officeart/2005/8/quickstyle/simple1" qsCatId="simple" csTypeId="urn:microsoft.com/office/officeart/2005/8/colors/accent1_2" csCatId="accent1" phldr="1"/>
       <dgm:spPr/>
       <dgm:t>
@@ -868,7 +873,7 @@
         </a:p>
       </dgm:t>
     </dgm:pt>
-    <dgm:pt modelId="{3EB44D4F-E0DA-4318-8579-C3AD43B9AB08}">
+    <dgm:pt modelId="{A97E5E2E-ED55-4E69-BD13-1911951DA18F}">
       <dgm:prSet phldrT="[Текст]"/>
       <dgm:spPr/>
       <dgm:t>
@@ -876,14 +881,21 @@
         <a:lstStyle/>
         <a:p>
           <a:r>
+            <a:rPr lang="ru-RU" dirty="0"/>
+            <a:t>Главная страница (</a:t>
+          </a:r>
+          <a:r>
             <a:rPr lang="en-US" dirty="0"/>
-            <a:t>Welcome page (index)</a:t>
+            <a:t>index.html</a:t>
           </a:r>
-          <a:endParaRPr lang="ru-RU" dirty="0"/>
+          <a:r>
+            <a:rPr lang="ru-RU" dirty="0"/>
+            <a:t>)</a:t>
+          </a:r>
         </a:p>
       </dgm:t>
     </dgm:pt>
-    <dgm:pt modelId="{CD46E39D-0F04-4850-A5DA-DF377EC19F01}" type="parTrans" cxnId="{364AAA5C-D3B0-4F26-95E7-4E1B11AD9951}">
+    <dgm:pt modelId="{B6AFF7E3-757B-4AA6-B0AC-2C07A1ECB43B}" type="parTrans" cxnId="{0583FC3F-D3EC-4AF5-988F-5DAC5068C098}">
       <dgm:prSet/>
       <dgm:spPr/>
       <dgm:t>
@@ -894,7 +906,7 @@
         </a:p>
       </dgm:t>
     </dgm:pt>
-    <dgm:pt modelId="{0FC80FFD-BDB8-44F2-899C-B056A9C57EF7}" type="sibTrans" cxnId="{364AAA5C-D3B0-4F26-95E7-4E1B11AD9951}">
+    <dgm:pt modelId="{17260005-1550-4918-9422-23453F465509}" type="sibTrans" cxnId="{0583FC3F-D3EC-4AF5-988F-5DAC5068C098}">
       <dgm:prSet/>
       <dgm:spPr/>
       <dgm:t>
@@ -905,7 +917,7 @@
         </a:p>
       </dgm:t>
     </dgm:pt>
-    <dgm:pt modelId="{49D3A56E-ABE9-4EE8-8EC6-06DF3B598A2F}" type="asst">
+    <dgm:pt modelId="{5D1F6F73-40FE-43DA-970C-7F2E380842FA}" type="asst">
       <dgm:prSet phldrT="[Текст]"/>
       <dgm:spPr/>
       <dgm:t>
@@ -913,16 +925,12 @@
         <a:lstStyle/>
         <a:p>
           <a:r>
-            <a:rPr lang="en-US" dirty="0"/>
-            <a:t>Main page </a:t>
-          </a:r>
-          <a:r>
             <a:rPr lang="ru-RU" dirty="0"/>
-            <a:t>(</a:t>
+            <a:t>Учим языки (</a:t>
           </a:r>
           <a:r>
             <a:rPr lang="en-US" dirty="0"/>
-            <a:t>main</a:t>
+            <a:t>language_study.html</a:t>
           </a:r>
           <a:r>
             <a:rPr lang="ru-RU" dirty="0"/>
@@ -931,7 +939,7 @@
         </a:p>
       </dgm:t>
     </dgm:pt>
-    <dgm:pt modelId="{6DDE7781-BBCE-4FC9-B09B-EBC1C8E861BA}" type="parTrans" cxnId="{66D478E2-8E2D-43D7-99B3-39A87D46738F}">
+    <dgm:pt modelId="{A8A4DDBB-0C24-4CC0-BD4F-DA78F4128661}" type="parTrans" cxnId="{FE727BA8-73AE-484B-A6F3-2B1828E3312D}">
       <dgm:prSet/>
       <dgm:spPr/>
       <dgm:t>
@@ -942,7 +950,7 @@
         </a:p>
       </dgm:t>
     </dgm:pt>
-    <dgm:pt modelId="{E8D115D2-7906-4D2C-AF79-D26FFFDD3EC6}" type="sibTrans" cxnId="{66D478E2-8E2D-43D7-99B3-39A87D46738F}">
+    <dgm:pt modelId="{E91ACD3F-6F59-4A37-B909-7BEA7824FC9A}" type="sibTrans" cxnId="{FE727BA8-73AE-484B-A6F3-2B1828E3312D}">
       <dgm:prSet/>
       <dgm:spPr/>
       <dgm:t>
@@ -953,7 +961,7 @@
         </a:p>
       </dgm:t>
     </dgm:pt>
-    <dgm:pt modelId="{967F48A2-52E3-42FE-BFB0-0F6F44BB09EA}" type="asst">
+    <dgm:pt modelId="{6015B824-730D-469F-A2C7-F2FC0FC2833A}">
       <dgm:prSet phldrT="[Текст]"/>
       <dgm:spPr/>
       <dgm:t>
@@ -961,14 +969,21 @@
         <a:lstStyle/>
         <a:p>
           <a:r>
+            <a:rPr lang="ru-RU" dirty="0"/>
+            <a:t>Путешествуем (</a:t>
+          </a:r>
+          <a:r>
             <a:rPr lang="en-US" dirty="0"/>
-            <a:t>About page (about)</a:t>
+            <a:t>traveling.html</a:t>
           </a:r>
-          <a:endParaRPr lang="ru-RU" dirty="0"/>
+          <a:r>
+            <a:rPr lang="ru-RU" dirty="0"/>
+            <a:t>)</a:t>
+          </a:r>
         </a:p>
       </dgm:t>
     </dgm:pt>
-    <dgm:pt modelId="{ECD23172-FCAC-4768-802F-333E0E015B94}" type="sibTrans" cxnId="{6399BCF8-85BD-4359-AE92-20FE9F14A09B}">
+    <dgm:pt modelId="{79F72359-2A5D-45D9-BC20-81FA3BEAECC5}" type="parTrans" cxnId="{0202E1BA-4E10-4601-B767-9276E6AD17D8}">
       <dgm:prSet/>
       <dgm:spPr/>
       <dgm:t>
@@ -979,7 +994,7 @@
         </a:p>
       </dgm:t>
     </dgm:pt>
-    <dgm:pt modelId="{19E72598-07D7-46C8-A62E-1C3DBD4B9505}" type="parTrans" cxnId="{6399BCF8-85BD-4359-AE92-20FE9F14A09B}">
+    <dgm:pt modelId="{A84CDBB8-4C23-4817-A576-415D883080E5}" type="sibTrans" cxnId="{0202E1BA-4E10-4601-B767-9276E6AD17D8}">
       <dgm:prSet/>
       <dgm:spPr/>
       <dgm:t>
@@ -990,7 +1005,7 @@
         </a:p>
       </dgm:t>
     </dgm:pt>
-    <dgm:pt modelId="{0146C9F1-D5F0-4B14-A451-961B269EC42E}" type="asst">
+    <dgm:pt modelId="{A9CD4C57-9B4C-41A0-8289-F4D11843F47A}">
       <dgm:prSet phldrT="[Текст]"/>
       <dgm:spPr/>
       <dgm:t>
@@ -998,22 +1013,21 @@
         <a:lstStyle/>
         <a:p>
           <a:r>
-            <a:rPr lang="en-US" dirty="0"/>
-            <a:t>Contacts page (</a:t>
-          </a:r>
-          <a:r>
-            <a:rPr lang="en-US" dirty="0" err="1"/>
-            <a:t>sontacts</a:t>
+            <a:rPr lang="ru-RU" dirty="0"/>
+            <a:t>Изучаем страны (</a:t>
           </a:r>
           <a:r>
             <a:rPr lang="en-US" dirty="0"/>
+            <a:t>countries_study.html</a:t>
+          </a:r>
+          <a:r>
+            <a:rPr lang="ru-RU" dirty="0"/>
             <a:t>)</a:t>
           </a:r>
-          <a:endParaRPr lang="ru-RU" dirty="0"/>
         </a:p>
       </dgm:t>
     </dgm:pt>
-    <dgm:pt modelId="{4FF8BEAC-078B-4757-AF85-AA8D1F0C6EA8}" type="parTrans" cxnId="{871FA4D0-6CD7-406B-82C9-16AFD160D494}">
+    <dgm:pt modelId="{B84CDA71-2B05-4FF3-B9DE-6738078FD03C}" type="parTrans" cxnId="{290F04D7-D81B-4B01-8651-81A87F11814A}">
       <dgm:prSet/>
       <dgm:spPr/>
       <dgm:t>
@@ -1024,7 +1038,7 @@
         </a:p>
       </dgm:t>
     </dgm:pt>
-    <dgm:pt modelId="{75294C89-6EA9-47F1-BD22-7B5402B9C1EE}" type="sibTrans" cxnId="{871FA4D0-6CD7-406B-82C9-16AFD160D494}">
+    <dgm:pt modelId="{F942E3A9-C219-4097-88B4-FB1BAE669E61}" type="sibTrans" cxnId="{290F04D7-D81B-4B01-8651-81A87F11814A}">
       <dgm:prSet/>
       <dgm:spPr/>
       <dgm:t>
@@ -1035,7 +1049,7 @@
         </a:p>
       </dgm:t>
     </dgm:pt>
-    <dgm:pt modelId="{4763B572-D80F-4BDC-ACF8-9C758BFD289E}" type="asst">
+    <dgm:pt modelId="{D6823304-69A5-409B-AE13-574908B3BE83}">
       <dgm:prSet phldrT="[Текст]"/>
       <dgm:spPr/>
       <dgm:t>
@@ -1043,14 +1057,21 @@
         <a:lstStyle/>
         <a:p>
           <a:r>
+            <a:rPr lang="ru-RU" dirty="0"/>
+            <a:t>Советы путешественникам (</a:t>
+          </a:r>
+          <a:r>
             <a:rPr lang="en-US" dirty="0"/>
-            <a:t>Traveling page (traveling)</a:t>
+            <a:t>traveling_tips.html</a:t>
           </a:r>
-          <a:endParaRPr lang="ru-RU" dirty="0"/>
+          <a:r>
+            <a:rPr lang="ru-RU" dirty="0"/>
+            <a:t>)</a:t>
+          </a:r>
         </a:p>
       </dgm:t>
     </dgm:pt>
-    <dgm:pt modelId="{D46C994E-85C8-4E21-BC37-375F412FD806}" type="parTrans" cxnId="{FD38F0B4-855B-46F2-9067-F62D65C7E7D8}">
+    <dgm:pt modelId="{9E44B917-975A-4930-A553-33451827BF43}" type="parTrans" cxnId="{D2D8C062-EA47-47BC-8575-8A56B95DC9ED}">
       <dgm:prSet/>
       <dgm:spPr/>
       <dgm:t>
@@ -1061,7 +1082,7 @@
         </a:p>
       </dgm:t>
     </dgm:pt>
-    <dgm:pt modelId="{758E4A18-5CF7-4F8D-863A-29CDBB1EB4E9}" type="sibTrans" cxnId="{FD38F0B4-855B-46F2-9067-F62D65C7E7D8}">
+    <dgm:pt modelId="{B39B0788-C57D-4F6F-9C32-7D71F8284458}" type="sibTrans" cxnId="{D2D8C062-EA47-47BC-8575-8A56B95DC9ED}">
       <dgm:prSet/>
       <dgm:spPr/>
       <dgm:t>
@@ -1072,7 +1093,7 @@
         </a:p>
       </dgm:t>
     </dgm:pt>
-    <dgm:pt modelId="{A2E8C118-36E7-4CFD-B20C-731E17EFD628}" type="asst">
+    <dgm:pt modelId="{AF11656C-4FE8-4560-B8B1-F5FBDF16A4EE}">
       <dgm:prSet phldrT="[Текст]"/>
       <dgm:spPr/>
       <dgm:t>
@@ -1080,22 +1101,21 @@
         <a:lstStyle/>
         <a:p>
           <a:r>
-            <a:rPr lang="en-US" dirty="0"/>
-            <a:t>Gifts shop page (</a:t>
-          </a:r>
-          <a:r>
-            <a:rPr lang="en-US" dirty="0" err="1"/>
-            <a:t>gifts_shop</a:t>
+            <a:rPr lang="ru-RU" dirty="0"/>
+            <a:t>О нас (</a:t>
           </a:r>
           <a:r>
             <a:rPr lang="en-US" dirty="0"/>
+            <a:t>about_us.html</a:t>
+          </a:r>
+          <a:r>
+            <a:rPr lang="ru-RU" dirty="0"/>
             <a:t>)</a:t>
           </a:r>
-          <a:endParaRPr lang="ru-RU" dirty="0"/>
         </a:p>
       </dgm:t>
     </dgm:pt>
-    <dgm:pt modelId="{F66F3758-BED7-4FDF-A3CC-7BF4F2162977}" type="parTrans" cxnId="{58C6A1C7-3AB4-41EB-97DF-C29F2734929F}">
+    <dgm:pt modelId="{8E8E8CD9-99B5-4652-AD5D-4F2C537D4E66}" type="parTrans" cxnId="{2F9156A3-63F9-4E70-A6CB-25966DC88CE2}">
       <dgm:prSet/>
       <dgm:spPr/>
       <dgm:t>
@@ -1106,7 +1126,7 @@
         </a:p>
       </dgm:t>
     </dgm:pt>
-    <dgm:pt modelId="{A39BEF03-7FC6-4D18-B36C-62080EF1DF05}" type="sibTrans" cxnId="{58C6A1C7-3AB4-41EB-97DF-C29F2734929F}">
+    <dgm:pt modelId="{818FE496-2610-4080-9B94-2CE3FF4475F7}" type="sibTrans" cxnId="{2F9156A3-63F9-4E70-A6CB-25966DC88CE2}">
       <dgm:prSet/>
       <dgm:spPr/>
       <dgm:t>
@@ -1117,349 +1137,8 @@
         </a:p>
       </dgm:t>
     </dgm:pt>
-    <dgm:pt modelId="{B39391BF-21C2-452D-A538-733BED02433E}" type="asst">
-      <dgm:prSet phldrT="[Текст]"/>
-      <dgm:spPr/>
-      <dgm:t>
-        <a:bodyPr/>
-        <a:lstStyle/>
-        <a:p>
-          <a:r>
-            <a:rPr lang="en-US" dirty="0"/>
-            <a:t>Events organization page (</a:t>
-          </a:r>
-          <a:r>
-            <a:rPr lang="en-US" dirty="0" err="1"/>
-            <a:t>events_shop</a:t>
-          </a:r>
-          <a:r>
-            <a:rPr lang="en-US" dirty="0"/>
-            <a:t>)</a:t>
-          </a:r>
-          <a:endParaRPr lang="ru-RU" dirty="0"/>
-        </a:p>
-      </dgm:t>
-    </dgm:pt>
-    <dgm:pt modelId="{F4754B2D-6EC9-4982-85FD-478E91807E18}" type="parTrans" cxnId="{803891ED-DDA2-46F8-97EF-8D40B9AB264D}">
-      <dgm:prSet/>
-      <dgm:spPr/>
-      <dgm:t>
-        <a:bodyPr/>
-        <a:lstStyle/>
-        <a:p>
-          <a:endParaRPr lang="ru-RU"/>
-        </a:p>
-      </dgm:t>
-    </dgm:pt>
-    <dgm:pt modelId="{355F9248-CD68-42B7-BB49-C103A6D3C7A4}" type="sibTrans" cxnId="{803891ED-DDA2-46F8-97EF-8D40B9AB264D}">
-      <dgm:prSet/>
-      <dgm:spPr/>
-      <dgm:t>
-        <a:bodyPr/>
-        <a:lstStyle/>
-        <a:p>
-          <a:endParaRPr lang="ru-RU"/>
-        </a:p>
-      </dgm:t>
-    </dgm:pt>
-    <dgm:pt modelId="{70D1DB33-558A-4930-A60F-95648575A2B9}" type="asst">
-      <dgm:prSet phldrT="[Текст]"/>
-      <dgm:spPr/>
-      <dgm:t>
-        <a:bodyPr/>
-        <a:lstStyle/>
-        <a:p>
-          <a:r>
-            <a:rPr lang="en-US" dirty="0"/>
-            <a:t>Traveling blog</a:t>
-          </a:r>
-          <a:endParaRPr lang="ru-RU" dirty="0"/>
-        </a:p>
-      </dgm:t>
-    </dgm:pt>
-    <dgm:pt modelId="{61682B32-BF7A-4740-AA92-D84ED75253D6}" type="parTrans" cxnId="{7F6EC533-0CB2-4FEE-80ED-BD9DDFB64F78}">
-      <dgm:prSet/>
-      <dgm:spPr/>
-      <dgm:t>
-        <a:bodyPr/>
-        <a:lstStyle/>
-        <a:p>
-          <a:endParaRPr lang="ru-RU"/>
-        </a:p>
-      </dgm:t>
-    </dgm:pt>
-    <dgm:pt modelId="{BA6559B8-3160-408B-9E44-6E57327D0456}" type="sibTrans" cxnId="{7F6EC533-0CB2-4FEE-80ED-BD9DDFB64F78}">
-      <dgm:prSet/>
-      <dgm:spPr/>
-      <dgm:t>
-        <a:bodyPr/>
-        <a:lstStyle/>
-        <a:p>
-          <a:endParaRPr lang="ru-RU"/>
-        </a:p>
-      </dgm:t>
-    </dgm:pt>
-    <dgm:pt modelId="{A1721267-0235-4C3B-8530-877D5C750476}" type="asst">
-      <dgm:prSet phldrT="[Текст]"/>
-      <dgm:spPr/>
-      <dgm:t>
-        <a:bodyPr/>
-        <a:lstStyle/>
-        <a:p>
-          <a:r>
-            <a:rPr lang="en-US" dirty="0"/>
-            <a:t>Offers</a:t>
-          </a:r>
-          <a:endParaRPr lang="ru-RU" dirty="0"/>
-        </a:p>
-      </dgm:t>
-    </dgm:pt>
-    <dgm:pt modelId="{AF671B97-65CD-4D5A-8170-530CC4F7A08B}" type="parTrans" cxnId="{3190A482-A44D-4439-BFBF-B9D9E6C649AF}">
-      <dgm:prSet/>
-      <dgm:spPr/>
-      <dgm:t>
-        <a:bodyPr/>
-        <a:lstStyle/>
-        <a:p>
-          <a:endParaRPr lang="ru-RU"/>
-        </a:p>
-      </dgm:t>
-    </dgm:pt>
-    <dgm:pt modelId="{D0CC0C12-ABC1-49F9-A94A-331807C28899}" type="sibTrans" cxnId="{3190A482-A44D-4439-BFBF-B9D9E6C649AF}">
-      <dgm:prSet/>
-      <dgm:spPr/>
-      <dgm:t>
-        <a:bodyPr/>
-        <a:lstStyle/>
-        <a:p>
-          <a:endParaRPr lang="ru-RU"/>
-        </a:p>
-      </dgm:t>
-    </dgm:pt>
-    <dgm:pt modelId="{B2BB11EB-6B3E-478F-AF92-BF8BE3034051}" type="asst">
-      <dgm:prSet phldrT="[Текст]"/>
-      <dgm:spPr/>
-      <dgm:t>
-        <a:bodyPr/>
-        <a:lstStyle/>
-        <a:p>
-          <a:r>
-            <a:rPr lang="en-US" dirty="0"/>
-            <a:t>Languages page (languages)</a:t>
-          </a:r>
-          <a:endParaRPr lang="ru-RU" dirty="0"/>
-        </a:p>
-      </dgm:t>
-    </dgm:pt>
-    <dgm:pt modelId="{A5C728E2-6405-4D37-89DF-62339A6E4EA6}" type="parTrans" cxnId="{3B5A9929-E6AF-4E17-977D-FD5E8D37DAE7}">
-      <dgm:prSet/>
-      <dgm:spPr/>
-      <dgm:t>
-        <a:bodyPr/>
-        <a:lstStyle/>
-        <a:p>
-          <a:endParaRPr lang="ru-RU"/>
-        </a:p>
-      </dgm:t>
-    </dgm:pt>
-    <dgm:pt modelId="{E2CF5D79-8355-49F4-958D-A63A252831E4}" type="sibTrans" cxnId="{3B5A9929-E6AF-4E17-977D-FD5E8D37DAE7}">
-      <dgm:prSet/>
-      <dgm:spPr/>
-      <dgm:t>
-        <a:bodyPr/>
-        <a:lstStyle/>
-        <a:p>
-          <a:endParaRPr lang="ru-RU"/>
-        </a:p>
-      </dgm:t>
-    </dgm:pt>
-    <dgm:pt modelId="{2383CF53-02E1-4F3F-BE6C-062CBDE7D594}" type="asst">
-      <dgm:prSet phldrT="[Текст]"/>
-      <dgm:spPr/>
-      <dgm:t>
-        <a:bodyPr/>
-        <a:lstStyle/>
-        <a:p>
-          <a:r>
-            <a:rPr lang="en-US" dirty="0"/>
-            <a:t>Flowers</a:t>
-          </a:r>
-          <a:endParaRPr lang="ru-RU" dirty="0"/>
-        </a:p>
-      </dgm:t>
-    </dgm:pt>
-    <dgm:pt modelId="{E14BE7A0-D68F-439F-9E46-1E67E9D647AD}" type="parTrans" cxnId="{D3A9A3E7-183E-45D2-9EEA-86216E59FC17}">
-      <dgm:prSet/>
-      <dgm:spPr/>
-      <dgm:t>
-        <a:bodyPr/>
-        <a:lstStyle/>
-        <a:p>
-          <a:endParaRPr lang="ru-RU"/>
-        </a:p>
-      </dgm:t>
-    </dgm:pt>
-    <dgm:pt modelId="{DE070276-8ACB-4A95-82A2-C022AC073F68}" type="sibTrans" cxnId="{D3A9A3E7-183E-45D2-9EEA-86216E59FC17}">
-      <dgm:prSet/>
-      <dgm:spPr/>
-      <dgm:t>
-        <a:bodyPr/>
-        <a:lstStyle/>
-        <a:p>
-          <a:endParaRPr lang="ru-RU"/>
-        </a:p>
-      </dgm:t>
-    </dgm:pt>
-    <dgm:pt modelId="{CB8D0629-6424-46D8-B083-D3B69B5D6EBE}" type="asst">
-      <dgm:prSet phldrT="[Текст]"/>
-      <dgm:spPr/>
-      <dgm:t>
-        <a:bodyPr/>
-        <a:lstStyle/>
-        <a:p>
-          <a:r>
-            <a:rPr lang="en-US" dirty="0"/>
-            <a:t>Other ?</a:t>
-          </a:r>
-          <a:endParaRPr lang="ru-RU" dirty="0"/>
-        </a:p>
-      </dgm:t>
-    </dgm:pt>
-    <dgm:pt modelId="{89D141A3-2077-49D1-ACAC-E1F8CA7A0585}" type="parTrans" cxnId="{7957E5B6-74DE-4526-A7D3-3FF624F7F7FA}">
-      <dgm:prSet/>
-      <dgm:spPr/>
-      <dgm:t>
-        <a:bodyPr/>
-        <a:lstStyle/>
-        <a:p>
-          <a:endParaRPr lang="ru-RU"/>
-        </a:p>
-      </dgm:t>
-    </dgm:pt>
-    <dgm:pt modelId="{E0249DD1-B1FB-40D4-B02E-7E8DFCC3F406}" type="sibTrans" cxnId="{7957E5B6-74DE-4526-A7D3-3FF624F7F7FA}">
-      <dgm:prSet/>
-      <dgm:spPr/>
-      <dgm:t>
-        <a:bodyPr/>
-        <a:lstStyle/>
-        <a:p>
-          <a:endParaRPr lang="ru-RU"/>
-        </a:p>
-      </dgm:t>
-    </dgm:pt>
-    <dgm:pt modelId="{4E85A17E-10EC-40FC-BC89-9209368B7129}" type="asst">
-      <dgm:prSet phldrT="[Текст]"/>
-      <dgm:spPr/>
-      <dgm:t>
-        <a:bodyPr/>
-        <a:lstStyle/>
-        <a:p>
-          <a:r>
-            <a:rPr lang="en-US" dirty="0"/>
-            <a:t>Learning page / games</a:t>
-          </a:r>
-          <a:endParaRPr lang="ru-RU" dirty="0"/>
-        </a:p>
-      </dgm:t>
-    </dgm:pt>
-    <dgm:pt modelId="{87C2BEB1-97D3-490C-A4A6-465B43C11494}" type="parTrans" cxnId="{402E89C9-21BE-41B6-8375-1638A21B8448}">
-      <dgm:prSet/>
-      <dgm:spPr/>
-      <dgm:t>
-        <a:bodyPr/>
-        <a:lstStyle/>
-        <a:p>
-          <a:endParaRPr lang="ru-RU"/>
-        </a:p>
-      </dgm:t>
-    </dgm:pt>
-    <dgm:pt modelId="{7B57F461-3107-442D-ACA3-D385BF5E4121}" type="sibTrans" cxnId="{402E89C9-21BE-41B6-8375-1638A21B8448}">
-      <dgm:prSet/>
-      <dgm:spPr/>
-      <dgm:t>
-        <a:bodyPr/>
-        <a:lstStyle/>
-        <a:p>
-          <a:endParaRPr lang="ru-RU"/>
-        </a:p>
-      </dgm:t>
-    </dgm:pt>
-    <dgm:pt modelId="{AFEFBB6E-5AA1-4F4B-9D8D-2B6FCBCE202E}" type="asst">
-      <dgm:prSet phldrT="[Текст]"/>
-      <dgm:spPr/>
-      <dgm:t>
-        <a:bodyPr/>
-        <a:lstStyle/>
-        <a:p>
-          <a:r>
-            <a:rPr lang="en-US" dirty="0"/>
-            <a:t>All about languages</a:t>
-          </a:r>
-          <a:endParaRPr lang="ru-RU" dirty="0"/>
-        </a:p>
-      </dgm:t>
-    </dgm:pt>
-    <dgm:pt modelId="{A5A639E0-123E-449B-AAA6-78FACB6B64B7}" type="parTrans" cxnId="{A6463C92-B23C-402A-963B-F4AE8F1C9145}">
-      <dgm:prSet/>
-      <dgm:spPr/>
-      <dgm:t>
-        <a:bodyPr/>
-        <a:lstStyle/>
-        <a:p>
-          <a:endParaRPr lang="ru-RU"/>
-        </a:p>
-      </dgm:t>
-    </dgm:pt>
-    <dgm:pt modelId="{3533C4AB-C9D6-4747-8DE7-1A91803DB368}" type="sibTrans" cxnId="{A6463C92-B23C-402A-963B-F4AE8F1C9145}">
-      <dgm:prSet/>
-      <dgm:spPr/>
-      <dgm:t>
-        <a:bodyPr/>
-        <a:lstStyle/>
-        <a:p>
-          <a:endParaRPr lang="ru-RU"/>
-        </a:p>
-      </dgm:t>
-    </dgm:pt>
-    <dgm:pt modelId="{35C75F19-636D-4071-9623-CF6F9A8A0749}" type="asst">
-      <dgm:prSet phldrT="[Текст]"/>
-      <dgm:spPr/>
-      <dgm:t>
-        <a:bodyPr/>
-        <a:lstStyle/>
-        <a:p>
-          <a:r>
-            <a:rPr lang="en-US" dirty="0"/>
-            <a:t>Courses</a:t>
-          </a:r>
-          <a:endParaRPr lang="ru-RU" dirty="0"/>
-        </a:p>
-      </dgm:t>
-    </dgm:pt>
-    <dgm:pt modelId="{AE698914-B5E6-46E6-ABC5-FA7C77DD4BFD}" type="parTrans" cxnId="{4EF76AE2-A570-44CB-9E7F-1DD7E53C3E93}">
-      <dgm:prSet/>
-      <dgm:spPr/>
-      <dgm:t>
-        <a:bodyPr/>
-        <a:lstStyle/>
-        <a:p>
-          <a:endParaRPr lang="ru-RU"/>
-        </a:p>
-      </dgm:t>
-    </dgm:pt>
-    <dgm:pt modelId="{321D1483-ABDD-4BAE-8446-C9786702F4C8}" type="sibTrans" cxnId="{4EF76AE2-A570-44CB-9E7F-1DD7E53C3E93}">
-      <dgm:prSet/>
-      <dgm:spPr/>
-      <dgm:t>
-        <a:bodyPr/>
-        <a:lstStyle/>
-        <a:p>
-          <a:endParaRPr lang="ru-RU"/>
-        </a:p>
-      </dgm:t>
-    </dgm:pt>
-    <dgm:pt modelId="{A32BB778-99B3-460D-A008-1A1F9FD7F25F}" type="pres">
-      <dgm:prSet presAssocID="{6F72523D-3FDA-4CE5-AC38-A9BA6E1C30CB}" presName="hierChild1" presStyleCnt="0">
+    <dgm:pt modelId="{B180B330-3089-44ED-BFDC-2199E241C39E}" type="pres">
+      <dgm:prSet presAssocID="{B19DC9A7-610C-4A48-8810-E75EBF37A42F}" presName="hierChild1" presStyleCnt="0">
         <dgm:presLayoutVars>
           <dgm:orgChart val="1"/>
           <dgm:chPref val="1"/>
@@ -1471,708 +1150,285 @@
       </dgm:prSet>
       <dgm:spPr/>
     </dgm:pt>
-    <dgm:pt modelId="{543FA7BB-4A70-4F89-AEB4-5471A3891A8E}" type="pres">
-      <dgm:prSet presAssocID="{3EB44D4F-E0DA-4318-8579-C3AD43B9AB08}" presName="hierRoot1" presStyleCnt="0">
+    <dgm:pt modelId="{29B0EF56-2AA5-4076-8399-B374591DE18A}" type="pres">
+      <dgm:prSet presAssocID="{A97E5E2E-ED55-4E69-BD13-1911951DA18F}" presName="hierRoot1" presStyleCnt="0">
         <dgm:presLayoutVars>
           <dgm:hierBranch val="init"/>
         </dgm:presLayoutVars>
       </dgm:prSet>
       <dgm:spPr/>
     </dgm:pt>
-    <dgm:pt modelId="{0B924AFF-E4A3-466F-B015-B28870A31054}" type="pres">
-      <dgm:prSet presAssocID="{3EB44D4F-E0DA-4318-8579-C3AD43B9AB08}" presName="rootComposite1" presStyleCnt="0"/>
+    <dgm:pt modelId="{96BB7865-FF8B-4908-8B11-21449F159097}" type="pres">
+      <dgm:prSet presAssocID="{A97E5E2E-ED55-4E69-BD13-1911951DA18F}" presName="rootComposite1" presStyleCnt="0"/>
       <dgm:spPr/>
     </dgm:pt>
-    <dgm:pt modelId="{D7FB7A5E-8816-4BD8-9D46-B745F7752139}" type="pres">
-      <dgm:prSet presAssocID="{3EB44D4F-E0DA-4318-8579-C3AD43B9AB08}" presName="rootText1" presStyleLbl="node0" presStyleIdx="0" presStyleCnt="1">
+    <dgm:pt modelId="{7C7D2C7E-8266-41A9-B7F0-0E6D7FA2CAAE}" type="pres">
+      <dgm:prSet presAssocID="{A97E5E2E-ED55-4E69-BD13-1911951DA18F}" presName="rootText1" presStyleLbl="node0" presStyleIdx="0" presStyleCnt="1">
         <dgm:presLayoutVars>
           <dgm:chPref val="3"/>
         </dgm:presLayoutVars>
       </dgm:prSet>
       <dgm:spPr/>
     </dgm:pt>
-    <dgm:pt modelId="{D6207FE7-3A44-415C-ADBC-93102EAA492C}" type="pres">
-      <dgm:prSet presAssocID="{3EB44D4F-E0DA-4318-8579-C3AD43B9AB08}" presName="rootConnector1" presStyleLbl="node1" presStyleIdx="0" presStyleCnt="0"/>
+    <dgm:pt modelId="{90CFF9E7-D2DE-4A24-B2EE-D2BC4135F735}" type="pres">
+      <dgm:prSet presAssocID="{A97E5E2E-ED55-4E69-BD13-1911951DA18F}" presName="rootConnector1" presStyleLbl="node1" presStyleIdx="0" presStyleCnt="0"/>
       <dgm:spPr/>
     </dgm:pt>
-    <dgm:pt modelId="{922E8F53-E844-41A2-A107-AAC1EDE5C6E3}" type="pres">
-      <dgm:prSet presAssocID="{3EB44D4F-E0DA-4318-8579-C3AD43B9AB08}" presName="hierChild2" presStyleCnt="0"/>
+    <dgm:pt modelId="{2E603EAC-4888-42A8-82E5-BD74853F7660}" type="pres">
+      <dgm:prSet presAssocID="{A97E5E2E-ED55-4E69-BD13-1911951DA18F}" presName="hierChild2" presStyleCnt="0"/>
       <dgm:spPr/>
     </dgm:pt>
-    <dgm:pt modelId="{E31B5BC4-D426-49A9-B9DE-31E3B0F92D50}" type="pres">
-      <dgm:prSet presAssocID="{3EB44D4F-E0DA-4318-8579-C3AD43B9AB08}" presName="hierChild3" presStyleCnt="0"/>
+    <dgm:pt modelId="{3E1E9609-3069-4C9F-A138-450DE62CF0F1}" type="pres">
+      <dgm:prSet presAssocID="{79F72359-2A5D-45D9-BC20-81FA3BEAECC5}" presName="Name37" presStyleLbl="parChTrans1D2" presStyleIdx="0" presStyleCnt="5"/>
       <dgm:spPr/>
     </dgm:pt>
-    <dgm:pt modelId="{9AA8733F-3439-4F82-8E4E-8B1C5509A1C8}" type="pres">
-      <dgm:prSet presAssocID="{6DDE7781-BBCE-4FC9-B09B-EBC1C8E861BA}" presName="Name111" presStyleLbl="parChTrans1D2" presStyleIdx="0" presStyleCnt="1"/>
-      <dgm:spPr/>
-    </dgm:pt>
-    <dgm:pt modelId="{0653F80B-B18F-4E5A-9F0C-9D3165E8CFFD}" type="pres">
-      <dgm:prSet presAssocID="{49D3A56E-ABE9-4EE8-8EC6-06DF3B598A2F}" presName="hierRoot3" presStyleCnt="0">
+    <dgm:pt modelId="{212F956F-969A-443B-9139-2137CC9A9AC0}" type="pres">
+      <dgm:prSet presAssocID="{6015B824-730D-469F-A2C7-F2FC0FC2833A}" presName="hierRoot2" presStyleCnt="0">
         <dgm:presLayoutVars>
           <dgm:hierBranch val="init"/>
         </dgm:presLayoutVars>
       </dgm:prSet>
       <dgm:spPr/>
     </dgm:pt>
-    <dgm:pt modelId="{0A27ED4F-1D88-4EDF-8C8A-632BD6B9DC8A}" type="pres">
-      <dgm:prSet presAssocID="{49D3A56E-ABE9-4EE8-8EC6-06DF3B598A2F}" presName="rootComposite3" presStyleCnt="0"/>
+    <dgm:pt modelId="{103DEDF5-BF94-4015-A73C-98D905D3386F}" type="pres">
+      <dgm:prSet presAssocID="{6015B824-730D-469F-A2C7-F2FC0FC2833A}" presName="rootComposite" presStyleCnt="0"/>
       <dgm:spPr/>
     </dgm:pt>
-    <dgm:pt modelId="{A98B100C-274F-4765-88F3-AB7621990B39}" type="pres">
-      <dgm:prSet presAssocID="{49D3A56E-ABE9-4EE8-8EC6-06DF3B598A2F}" presName="rootText3" presStyleLbl="asst1" presStyleIdx="0" presStyleCnt="14">
+    <dgm:pt modelId="{5768DA00-30DE-4444-B4E5-B3EF52F0821A}" type="pres">
+      <dgm:prSet presAssocID="{6015B824-730D-469F-A2C7-F2FC0FC2833A}" presName="rootText" presStyleLbl="node2" presStyleIdx="0" presStyleCnt="4">
         <dgm:presLayoutVars>
           <dgm:chPref val="3"/>
         </dgm:presLayoutVars>
       </dgm:prSet>
       <dgm:spPr/>
     </dgm:pt>
-    <dgm:pt modelId="{193351BE-B9BC-4943-A239-828677255160}" type="pres">
-      <dgm:prSet presAssocID="{49D3A56E-ABE9-4EE8-8EC6-06DF3B598A2F}" presName="rootConnector3" presStyleLbl="asst1" presStyleIdx="0" presStyleCnt="14"/>
+    <dgm:pt modelId="{B20FF7CE-438F-4BD1-A0E9-7EC4E918C8F8}" type="pres">
+      <dgm:prSet presAssocID="{6015B824-730D-469F-A2C7-F2FC0FC2833A}" presName="rootConnector" presStyleLbl="node2" presStyleIdx="0" presStyleCnt="4"/>
       <dgm:spPr/>
     </dgm:pt>
-    <dgm:pt modelId="{40D07C34-6104-41BB-8758-C17F3D1A5ED5}" type="pres">
-      <dgm:prSet presAssocID="{49D3A56E-ABE9-4EE8-8EC6-06DF3B598A2F}" presName="hierChild6" presStyleCnt="0"/>
+    <dgm:pt modelId="{2FFFCB1E-90DD-4B97-9299-18EF8355B94D}" type="pres">
+      <dgm:prSet presAssocID="{6015B824-730D-469F-A2C7-F2FC0FC2833A}" presName="hierChild4" presStyleCnt="0"/>
       <dgm:spPr/>
     </dgm:pt>
-    <dgm:pt modelId="{193CF19A-CDA5-4513-B2AB-1F2847962EDB}" type="pres">
-      <dgm:prSet presAssocID="{49D3A56E-ABE9-4EE8-8EC6-06DF3B598A2F}" presName="hierChild7" presStyleCnt="0"/>
+    <dgm:pt modelId="{2842FC25-9A77-4A39-BB99-921D3ABBBCEA}" type="pres">
+      <dgm:prSet presAssocID="{6015B824-730D-469F-A2C7-F2FC0FC2833A}" presName="hierChild5" presStyleCnt="0"/>
       <dgm:spPr/>
     </dgm:pt>
-    <dgm:pt modelId="{99970878-4EDC-4385-A709-C43B933E0757}" type="pres">
-      <dgm:prSet presAssocID="{19E72598-07D7-46C8-A62E-1C3DBD4B9505}" presName="Name111" presStyleLbl="parChTrans1D3" presStyleIdx="0" presStyleCnt="6"/>
+    <dgm:pt modelId="{7C705CD8-85A3-410A-B3AC-1F896FE7E6B5}" type="pres">
+      <dgm:prSet presAssocID="{B84CDA71-2B05-4FF3-B9DE-6738078FD03C}" presName="Name37" presStyleLbl="parChTrans1D2" presStyleIdx="1" presStyleCnt="5"/>
       <dgm:spPr/>
     </dgm:pt>
-    <dgm:pt modelId="{6F80C357-3D70-4052-8E5D-71CD2E2A1D05}" type="pres">
-      <dgm:prSet presAssocID="{967F48A2-52E3-42FE-BFB0-0F6F44BB09EA}" presName="hierRoot3" presStyleCnt="0">
+    <dgm:pt modelId="{A118E8C6-79D8-40B5-A76F-3854EDDE8615}" type="pres">
+      <dgm:prSet presAssocID="{A9CD4C57-9B4C-41A0-8289-F4D11843F47A}" presName="hierRoot2" presStyleCnt="0">
         <dgm:presLayoutVars>
           <dgm:hierBranch val="init"/>
         </dgm:presLayoutVars>
       </dgm:prSet>
       <dgm:spPr/>
     </dgm:pt>
-    <dgm:pt modelId="{DB35BF69-13CF-4809-8FD4-C8A5255C2FD0}" type="pres">
-      <dgm:prSet presAssocID="{967F48A2-52E3-42FE-BFB0-0F6F44BB09EA}" presName="rootComposite3" presStyleCnt="0"/>
+    <dgm:pt modelId="{5049A462-7017-4E0F-A697-7060931CED6E}" type="pres">
+      <dgm:prSet presAssocID="{A9CD4C57-9B4C-41A0-8289-F4D11843F47A}" presName="rootComposite" presStyleCnt="0"/>
       <dgm:spPr/>
     </dgm:pt>
-    <dgm:pt modelId="{A9C5A3E1-4B26-4770-85D6-B0E5B7630701}" type="pres">
-      <dgm:prSet presAssocID="{967F48A2-52E3-42FE-BFB0-0F6F44BB09EA}" presName="rootText3" presStyleLbl="asst1" presStyleIdx="1" presStyleCnt="14">
+    <dgm:pt modelId="{C8EF3C95-F073-43EA-8A54-504A01F394B5}" type="pres">
+      <dgm:prSet presAssocID="{A9CD4C57-9B4C-41A0-8289-F4D11843F47A}" presName="rootText" presStyleLbl="node2" presStyleIdx="1" presStyleCnt="4">
         <dgm:presLayoutVars>
           <dgm:chPref val="3"/>
         </dgm:presLayoutVars>
       </dgm:prSet>
       <dgm:spPr/>
     </dgm:pt>
-    <dgm:pt modelId="{F809183E-6CC5-4F2C-BF74-DA04580520CA}" type="pres">
-      <dgm:prSet presAssocID="{967F48A2-52E3-42FE-BFB0-0F6F44BB09EA}" presName="rootConnector3" presStyleLbl="asst1" presStyleIdx="1" presStyleCnt="14"/>
+    <dgm:pt modelId="{D43BC50E-2873-49AA-B25B-120155FA3219}" type="pres">
+      <dgm:prSet presAssocID="{A9CD4C57-9B4C-41A0-8289-F4D11843F47A}" presName="rootConnector" presStyleLbl="node2" presStyleIdx="1" presStyleCnt="4"/>
       <dgm:spPr/>
     </dgm:pt>
-    <dgm:pt modelId="{F7810152-F2CB-469C-A96E-EB6A19ACEB50}" type="pres">
-      <dgm:prSet presAssocID="{967F48A2-52E3-42FE-BFB0-0F6F44BB09EA}" presName="hierChild6" presStyleCnt="0"/>
+    <dgm:pt modelId="{BBBB646D-54A2-4ABB-8DA6-9D522FF48CC0}" type="pres">
+      <dgm:prSet presAssocID="{A9CD4C57-9B4C-41A0-8289-F4D11843F47A}" presName="hierChild4" presStyleCnt="0"/>
       <dgm:spPr/>
     </dgm:pt>
-    <dgm:pt modelId="{03C02855-D8EF-46A3-B227-AB9A888807C1}" type="pres">
-      <dgm:prSet presAssocID="{967F48A2-52E3-42FE-BFB0-0F6F44BB09EA}" presName="hierChild7" presStyleCnt="0"/>
+    <dgm:pt modelId="{EEA24CB1-9F92-4F7A-90EE-54A65FC78CD7}" type="pres">
+      <dgm:prSet presAssocID="{A9CD4C57-9B4C-41A0-8289-F4D11843F47A}" presName="hierChild5" presStyleCnt="0"/>
       <dgm:spPr/>
     </dgm:pt>
-    <dgm:pt modelId="{DC66C6E7-E03B-4F0A-AA36-D826A08382D1}" type="pres">
-      <dgm:prSet presAssocID="{4FF8BEAC-078B-4757-AF85-AA8D1F0C6EA8}" presName="Name111" presStyleLbl="parChTrans1D3" presStyleIdx="1" presStyleCnt="6"/>
+    <dgm:pt modelId="{66CCEE48-8CA8-44DB-85E2-34D6AF639985}" type="pres">
+      <dgm:prSet presAssocID="{9E44B917-975A-4930-A553-33451827BF43}" presName="Name37" presStyleLbl="parChTrans1D2" presStyleIdx="2" presStyleCnt="5"/>
       <dgm:spPr/>
     </dgm:pt>
-    <dgm:pt modelId="{411B4DB4-5243-407A-9B25-49D9B4ED5C95}" type="pres">
-      <dgm:prSet presAssocID="{0146C9F1-D5F0-4B14-A451-961B269EC42E}" presName="hierRoot3" presStyleCnt="0">
+    <dgm:pt modelId="{E04D28C1-2ED0-4CBF-9C14-9DDC0BA37CA9}" type="pres">
+      <dgm:prSet presAssocID="{D6823304-69A5-409B-AE13-574908B3BE83}" presName="hierRoot2" presStyleCnt="0">
         <dgm:presLayoutVars>
           <dgm:hierBranch val="init"/>
         </dgm:presLayoutVars>
       </dgm:prSet>
       <dgm:spPr/>
     </dgm:pt>
-    <dgm:pt modelId="{A557BBF7-1F75-480A-AAAA-257B63FD3080}" type="pres">
-      <dgm:prSet presAssocID="{0146C9F1-D5F0-4B14-A451-961B269EC42E}" presName="rootComposite3" presStyleCnt="0"/>
+    <dgm:pt modelId="{D8EC4C82-2C95-4D08-AE5B-507F46E02E24}" type="pres">
+      <dgm:prSet presAssocID="{D6823304-69A5-409B-AE13-574908B3BE83}" presName="rootComposite" presStyleCnt="0"/>
       <dgm:spPr/>
     </dgm:pt>
-    <dgm:pt modelId="{FDD65648-DB74-42C8-A622-6966DB89CE5D}" type="pres">
-      <dgm:prSet presAssocID="{0146C9F1-D5F0-4B14-A451-961B269EC42E}" presName="rootText3" presStyleLbl="asst1" presStyleIdx="2" presStyleCnt="14">
+    <dgm:pt modelId="{1280358D-5C16-49D0-93E5-A29B636B6D27}" type="pres">
+      <dgm:prSet presAssocID="{D6823304-69A5-409B-AE13-574908B3BE83}" presName="rootText" presStyleLbl="node2" presStyleIdx="2" presStyleCnt="4">
         <dgm:presLayoutVars>
           <dgm:chPref val="3"/>
         </dgm:presLayoutVars>
       </dgm:prSet>
       <dgm:spPr/>
     </dgm:pt>
-    <dgm:pt modelId="{681C7190-5D7E-4004-9047-024547925004}" type="pres">
-      <dgm:prSet presAssocID="{0146C9F1-D5F0-4B14-A451-961B269EC42E}" presName="rootConnector3" presStyleLbl="asst1" presStyleIdx="2" presStyleCnt="14"/>
+    <dgm:pt modelId="{EB5F4D9D-A1B8-476C-95BB-BCF550B4E885}" type="pres">
+      <dgm:prSet presAssocID="{D6823304-69A5-409B-AE13-574908B3BE83}" presName="rootConnector" presStyleLbl="node2" presStyleIdx="2" presStyleCnt="4"/>
       <dgm:spPr/>
     </dgm:pt>
-    <dgm:pt modelId="{04015F67-3CEC-44CB-9D12-7C95013373CB}" type="pres">
-      <dgm:prSet presAssocID="{0146C9F1-D5F0-4B14-A451-961B269EC42E}" presName="hierChild6" presStyleCnt="0"/>
+    <dgm:pt modelId="{3709983F-B2FA-45EB-AD46-312D9CD4256F}" type="pres">
+      <dgm:prSet presAssocID="{D6823304-69A5-409B-AE13-574908B3BE83}" presName="hierChild4" presStyleCnt="0"/>
       <dgm:spPr/>
     </dgm:pt>
-    <dgm:pt modelId="{669F75E6-2EA5-48DB-96A8-44B8590E77C4}" type="pres">
-      <dgm:prSet presAssocID="{0146C9F1-D5F0-4B14-A451-961B269EC42E}" presName="hierChild7" presStyleCnt="0"/>
+    <dgm:pt modelId="{AF7CFFD1-F125-479A-976D-6FB0FCBA3610}" type="pres">
+      <dgm:prSet presAssocID="{D6823304-69A5-409B-AE13-574908B3BE83}" presName="hierChild5" presStyleCnt="0"/>
       <dgm:spPr/>
     </dgm:pt>
-    <dgm:pt modelId="{1E3562D8-53FD-44BF-AD79-E2E22051C757}" type="pres">
-      <dgm:prSet presAssocID="{D46C994E-85C8-4E21-BC37-375F412FD806}" presName="Name111" presStyleLbl="parChTrans1D3" presStyleIdx="2" presStyleCnt="6"/>
+    <dgm:pt modelId="{DE86A25E-3391-4FC7-AF41-4E6256991058}" type="pres">
+      <dgm:prSet presAssocID="{8E8E8CD9-99B5-4652-AD5D-4F2C537D4E66}" presName="Name37" presStyleLbl="parChTrans1D2" presStyleIdx="3" presStyleCnt="5"/>
       <dgm:spPr/>
     </dgm:pt>
-    <dgm:pt modelId="{C5BEA3A2-5F4E-4295-A03D-E8CECBC2E42F}" type="pres">
-      <dgm:prSet presAssocID="{4763B572-D80F-4BDC-ACF8-9C758BFD289E}" presName="hierRoot3" presStyleCnt="0">
+    <dgm:pt modelId="{BA471C71-6613-4C17-B34F-A687A2705181}" type="pres">
+      <dgm:prSet presAssocID="{AF11656C-4FE8-4560-B8B1-F5FBDF16A4EE}" presName="hierRoot2" presStyleCnt="0">
         <dgm:presLayoutVars>
           <dgm:hierBranch val="init"/>
         </dgm:presLayoutVars>
       </dgm:prSet>
       <dgm:spPr/>
     </dgm:pt>
-    <dgm:pt modelId="{2C04EA0A-9A2F-4BC6-8888-C10C55FA1EF3}" type="pres">
-      <dgm:prSet presAssocID="{4763B572-D80F-4BDC-ACF8-9C758BFD289E}" presName="rootComposite3" presStyleCnt="0"/>
+    <dgm:pt modelId="{287C0023-FFD9-4352-A7E9-67B422837B43}" type="pres">
+      <dgm:prSet presAssocID="{AF11656C-4FE8-4560-B8B1-F5FBDF16A4EE}" presName="rootComposite" presStyleCnt="0"/>
       <dgm:spPr/>
     </dgm:pt>
-    <dgm:pt modelId="{64239F16-4F55-49BE-88DC-6966CB06462B}" type="pres">
-      <dgm:prSet presAssocID="{4763B572-D80F-4BDC-ACF8-9C758BFD289E}" presName="rootText3" presStyleLbl="asst1" presStyleIdx="3" presStyleCnt="14">
+    <dgm:pt modelId="{56BBB9BA-E45F-40AF-A212-67D77FF51EAC}" type="pres">
+      <dgm:prSet presAssocID="{AF11656C-4FE8-4560-B8B1-F5FBDF16A4EE}" presName="rootText" presStyleLbl="node2" presStyleIdx="3" presStyleCnt="4">
         <dgm:presLayoutVars>
           <dgm:chPref val="3"/>
         </dgm:presLayoutVars>
       </dgm:prSet>
       <dgm:spPr/>
     </dgm:pt>
-    <dgm:pt modelId="{1F8F2A92-A788-4996-B95D-FEA7D1CA4756}" type="pres">
-      <dgm:prSet presAssocID="{4763B572-D80F-4BDC-ACF8-9C758BFD289E}" presName="rootConnector3" presStyleLbl="asst1" presStyleIdx="3" presStyleCnt="14"/>
+    <dgm:pt modelId="{3B6B2862-BDCA-4946-A920-B2413AD4A356}" type="pres">
+      <dgm:prSet presAssocID="{AF11656C-4FE8-4560-B8B1-F5FBDF16A4EE}" presName="rootConnector" presStyleLbl="node2" presStyleIdx="3" presStyleCnt="4"/>
       <dgm:spPr/>
     </dgm:pt>
-    <dgm:pt modelId="{9749930A-3675-4DCD-9B9A-855CC8E95415}" type="pres">
-      <dgm:prSet presAssocID="{4763B572-D80F-4BDC-ACF8-9C758BFD289E}" presName="hierChild6" presStyleCnt="0"/>
+    <dgm:pt modelId="{213577AE-9EAA-4CB6-B65C-DB7F2C960A65}" type="pres">
+      <dgm:prSet presAssocID="{AF11656C-4FE8-4560-B8B1-F5FBDF16A4EE}" presName="hierChild4" presStyleCnt="0"/>
       <dgm:spPr/>
     </dgm:pt>
-    <dgm:pt modelId="{6670A478-F582-4022-8810-5362BA1A6D5C}" type="pres">
-      <dgm:prSet presAssocID="{4763B572-D80F-4BDC-ACF8-9C758BFD289E}" presName="hierChild7" presStyleCnt="0"/>
+    <dgm:pt modelId="{EE0A607F-F356-4B9D-BEC7-81F6147292BB}" type="pres">
+      <dgm:prSet presAssocID="{AF11656C-4FE8-4560-B8B1-F5FBDF16A4EE}" presName="hierChild5" presStyleCnt="0"/>
       <dgm:spPr/>
     </dgm:pt>
-    <dgm:pt modelId="{79BFB1A5-42BC-49DC-AECD-37FF5B2A9991}" type="pres">
-      <dgm:prSet presAssocID="{61682B32-BF7A-4740-AA92-D84ED75253D6}" presName="Name111" presStyleLbl="parChTrans1D4" presStyleIdx="0" presStyleCnt="7"/>
+    <dgm:pt modelId="{1B019B9D-71BF-4D29-B533-4DB1A3924954}" type="pres">
+      <dgm:prSet presAssocID="{A97E5E2E-ED55-4E69-BD13-1911951DA18F}" presName="hierChild3" presStyleCnt="0"/>
       <dgm:spPr/>
     </dgm:pt>
-    <dgm:pt modelId="{6469CBE3-2936-4328-8C8E-C772A7FDAFB0}" type="pres">
-      <dgm:prSet presAssocID="{70D1DB33-558A-4930-A60F-95648575A2B9}" presName="hierRoot3" presStyleCnt="0">
+    <dgm:pt modelId="{DF59ECB3-FA60-4AF3-ADB4-DD157DE2D6E5}" type="pres">
+      <dgm:prSet presAssocID="{A8A4DDBB-0C24-4CC0-BD4F-DA78F4128661}" presName="Name111" presStyleLbl="parChTrans1D2" presStyleIdx="4" presStyleCnt="5"/>
+      <dgm:spPr/>
+    </dgm:pt>
+    <dgm:pt modelId="{A0179212-1DF9-4885-8F5F-76E4009441E5}" type="pres">
+      <dgm:prSet presAssocID="{5D1F6F73-40FE-43DA-970C-7F2E380842FA}" presName="hierRoot3" presStyleCnt="0">
         <dgm:presLayoutVars>
           <dgm:hierBranch val="init"/>
         </dgm:presLayoutVars>
       </dgm:prSet>
       <dgm:spPr/>
     </dgm:pt>
-    <dgm:pt modelId="{1622853C-4A65-4C51-B645-F4F2427A9AE6}" type="pres">
-      <dgm:prSet presAssocID="{70D1DB33-558A-4930-A60F-95648575A2B9}" presName="rootComposite3" presStyleCnt="0"/>
+    <dgm:pt modelId="{6D71E08D-BC99-4AEB-9873-FFD991FF76DE}" type="pres">
+      <dgm:prSet presAssocID="{5D1F6F73-40FE-43DA-970C-7F2E380842FA}" presName="rootComposite3" presStyleCnt="0"/>
       <dgm:spPr/>
     </dgm:pt>
-    <dgm:pt modelId="{84A4997E-AA68-44A1-B49D-095020597CC6}" type="pres">
-      <dgm:prSet presAssocID="{70D1DB33-558A-4930-A60F-95648575A2B9}" presName="rootText3" presStyleLbl="asst1" presStyleIdx="4" presStyleCnt="14">
+    <dgm:pt modelId="{6A17E83B-A51A-48BF-AEAB-13C83E0E1E3D}" type="pres">
+      <dgm:prSet presAssocID="{5D1F6F73-40FE-43DA-970C-7F2E380842FA}" presName="rootText3" presStyleLbl="asst1" presStyleIdx="0" presStyleCnt="1">
         <dgm:presLayoutVars>
           <dgm:chPref val="3"/>
         </dgm:presLayoutVars>
       </dgm:prSet>
       <dgm:spPr/>
     </dgm:pt>
-    <dgm:pt modelId="{D3469E18-6AE0-441F-9D81-24898BAF013F}" type="pres">
-      <dgm:prSet presAssocID="{70D1DB33-558A-4930-A60F-95648575A2B9}" presName="rootConnector3" presStyleLbl="asst1" presStyleIdx="4" presStyleCnt="14"/>
+    <dgm:pt modelId="{20ED53F9-7948-4F65-A333-7291D67269E2}" type="pres">
+      <dgm:prSet presAssocID="{5D1F6F73-40FE-43DA-970C-7F2E380842FA}" presName="rootConnector3" presStyleLbl="asst1" presStyleIdx="0" presStyleCnt="1"/>
       <dgm:spPr/>
     </dgm:pt>
-    <dgm:pt modelId="{47C930B1-D4FD-4FA7-9AB1-9273FBA8B826}" type="pres">
-      <dgm:prSet presAssocID="{70D1DB33-558A-4930-A60F-95648575A2B9}" presName="hierChild6" presStyleCnt="0"/>
+    <dgm:pt modelId="{676F5775-3BF1-4FDD-B666-69D1EC9E1F7B}" type="pres">
+      <dgm:prSet presAssocID="{5D1F6F73-40FE-43DA-970C-7F2E380842FA}" presName="hierChild6" presStyleCnt="0"/>
       <dgm:spPr/>
     </dgm:pt>
-    <dgm:pt modelId="{4601E1FE-E5E6-4840-811C-CDD4B3EDCDD0}" type="pres">
-      <dgm:prSet presAssocID="{70D1DB33-558A-4930-A60F-95648575A2B9}" presName="hierChild7" presStyleCnt="0"/>
-      <dgm:spPr/>
-    </dgm:pt>
-    <dgm:pt modelId="{23C52E41-00C9-4660-9F7C-E79A721D2A76}" type="pres">
-      <dgm:prSet presAssocID="{AF671B97-65CD-4D5A-8170-530CC4F7A08B}" presName="Name111" presStyleLbl="parChTrans1D4" presStyleIdx="1" presStyleCnt="7"/>
-      <dgm:spPr/>
-    </dgm:pt>
-    <dgm:pt modelId="{BCF7C666-6EA8-45C1-97D1-47F787128265}" type="pres">
-      <dgm:prSet presAssocID="{A1721267-0235-4C3B-8530-877D5C750476}" presName="hierRoot3" presStyleCnt="0">
-        <dgm:presLayoutVars>
-          <dgm:hierBranch val="init"/>
-        </dgm:presLayoutVars>
-      </dgm:prSet>
-      <dgm:spPr/>
-    </dgm:pt>
-    <dgm:pt modelId="{3324DC7F-D3FE-4C7B-A63C-65FB20743974}" type="pres">
-      <dgm:prSet presAssocID="{A1721267-0235-4C3B-8530-877D5C750476}" presName="rootComposite3" presStyleCnt="0"/>
-      <dgm:spPr/>
-    </dgm:pt>
-    <dgm:pt modelId="{547EBEB2-66F4-49F2-9EC4-FE62025F48E9}" type="pres">
-      <dgm:prSet presAssocID="{A1721267-0235-4C3B-8530-877D5C750476}" presName="rootText3" presStyleLbl="asst1" presStyleIdx="5" presStyleCnt="14">
-        <dgm:presLayoutVars>
-          <dgm:chPref val="3"/>
-        </dgm:presLayoutVars>
-      </dgm:prSet>
-      <dgm:spPr/>
-    </dgm:pt>
-    <dgm:pt modelId="{F4E85B78-B2DC-48F8-9AFD-A4121DC125FA}" type="pres">
-      <dgm:prSet presAssocID="{A1721267-0235-4C3B-8530-877D5C750476}" presName="rootConnector3" presStyleLbl="asst1" presStyleIdx="5" presStyleCnt="14"/>
-      <dgm:spPr/>
-    </dgm:pt>
-    <dgm:pt modelId="{3258806D-B0C7-47ED-8945-A74C40DBFCF1}" type="pres">
-      <dgm:prSet presAssocID="{A1721267-0235-4C3B-8530-877D5C750476}" presName="hierChild6" presStyleCnt="0"/>
-      <dgm:spPr/>
-    </dgm:pt>
-    <dgm:pt modelId="{A2F5E6FA-7D86-40CB-B6AA-6898D5D568D7}" type="pres">
-      <dgm:prSet presAssocID="{A1721267-0235-4C3B-8530-877D5C750476}" presName="hierChild7" presStyleCnt="0"/>
-      <dgm:spPr/>
-    </dgm:pt>
-    <dgm:pt modelId="{CAC482E8-66D6-409D-982D-D5BE40028EC1}" type="pres">
-      <dgm:prSet presAssocID="{F66F3758-BED7-4FDF-A3CC-7BF4F2162977}" presName="Name111" presStyleLbl="parChTrans1D3" presStyleIdx="3" presStyleCnt="6"/>
-      <dgm:spPr/>
-    </dgm:pt>
-    <dgm:pt modelId="{30822E55-6EF1-47FD-88B8-BE35AF712B54}" type="pres">
-      <dgm:prSet presAssocID="{A2E8C118-36E7-4CFD-B20C-731E17EFD628}" presName="hierRoot3" presStyleCnt="0">
-        <dgm:presLayoutVars>
-          <dgm:hierBranch val="init"/>
-        </dgm:presLayoutVars>
-      </dgm:prSet>
-      <dgm:spPr/>
-    </dgm:pt>
-    <dgm:pt modelId="{E5621E7C-A655-4C96-819F-54511D8A7EC2}" type="pres">
-      <dgm:prSet presAssocID="{A2E8C118-36E7-4CFD-B20C-731E17EFD628}" presName="rootComposite3" presStyleCnt="0"/>
-      <dgm:spPr/>
-    </dgm:pt>
-    <dgm:pt modelId="{2C1A0EB1-97B2-4B4E-9148-A93F6736BFB2}" type="pres">
-      <dgm:prSet presAssocID="{A2E8C118-36E7-4CFD-B20C-731E17EFD628}" presName="rootText3" presStyleLbl="asst1" presStyleIdx="6" presStyleCnt="14">
-        <dgm:presLayoutVars>
-          <dgm:chPref val="3"/>
-        </dgm:presLayoutVars>
-      </dgm:prSet>
-      <dgm:spPr/>
-    </dgm:pt>
-    <dgm:pt modelId="{19EA03CC-C570-4B80-AF63-88BC9FD1AF94}" type="pres">
-      <dgm:prSet presAssocID="{A2E8C118-36E7-4CFD-B20C-731E17EFD628}" presName="rootConnector3" presStyleLbl="asst1" presStyleIdx="6" presStyleCnt="14"/>
-      <dgm:spPr/>
-    </dgm:pt>
-    <dgm:pt modelId="{75B01115-03B5-4CBC-A3C0-5790BAEE5CC7}" type="pres">
-      <dgm:prSet presAssocID="{A2E8C118-36E7-4CFD-B20C-731E17EFD628}" presName="hierChild6" presStyleCnt="0"/>
-      <dgm:spPr/>
-    </dgm:pt>
-    <dgm:pt modelId="{6560CCD2-927B-49E0-BA15-F8103F56444F}" type="pres">
-      <dgm:prSet presAssocID="{A2E8C118-36E7-4CFD-B20C-731E17EFD628}" presName="hierChild7" presStyleCnt="0"/>
-      <dgm:spPr/>
-    </dgm:pt>
-    <dgm:pt modelId="{9671D427-A6CF-4FBB-A364-F2B641BA1AA4}" type="pres">
-      <dgm:prSet presAssocID="{E14BE7A0-D68F-439F-9E46-1E67E9D647AD}" presName="Name111" presStyleLbl="parChTrans1D4" presStyleIdx="2" presStyleCnt="7"/>
-      <dgm:spPr/>
-    </dgm:pt>
-    <dgm:pt modelId="{3FA6A51C-AC81-4173-98F0-902A56345BD9}" type="pres">
-      <dgm:prSet presAssocID="{2383CF53-02E1-4F3F-BE6C-062CBDE7D594}" presName="hierRoot3" presStyleCnt="0">
-        <dgm:presLayoutVars>
-          <dgm:hierBranch val="init"/>
-        </dgm:presLayoutVars>
-      </dgm:prSet>
-      <dgm:spPr/>
-    </dgm:pt>
-    <dgm:pt modelId="{712FDEBD-26A1-40C1-95A6-1A0A16B77E49}" type="pres">
-      <dgm:prSet presAssocID="{2383CF53-02E1-4F3F-BE6C-062CBDE7D594}" presName="rootComposite3" presStyleCnt="0"/>
-      <dgm:spPr/>
-    </dgm:pt>
-    <dgm:pt modelId="{97D0B171-D747-4050-93EA-AFF2D46A22E5}" type="pres">
-      <dgm:prSet presAssocID="{2383CF53-02E1-4F3F-BE6C-062CBDE7D594}" presName="rootText3" presStyleLbl="asst1" presStyleIdx="7" presStyleCnt="14">
-        <dgm:presLayoutVars>
-          <dgm:chPref val="3"/>
-        </dgm:presLayoutVars>
-      </dgm:prSet>
-      <dgm:spPr/>
-    </dgm:pt>
-    <dgm:pt modelId="{3CF4E510-507E-403B-8F16-C215BF693818}" type="pres">
-      <dgm:prSet presAssocID="{2383CF53-02E1-4F3F-BE6C-062CBDE7D594}" presName="rootConnector3" presStyleLbl="asst1" presStyleIdx="7" presStyleCnt="14"/>
-      <dgm:spPr/>
-    </dgm:pt>
-    <dgm:pt modelId="{6F0E5D34-D03E-402C-A596-BA6F59196352}" type="pres">
-      <dgm:prSet presAssocID="{2383CF53-02E1-4F3F-BE6C-062CBDE7D594}" presName="hierChild6" presStyleCnt="0"/>
-      <dgm:spPr/>
-    </dgm:pt>
-    <dgm:pt modelId="{3CEE8101-A518-4E95-9155-780D93A7D6D6}" type="pres">
-      <dgm:prSet presAssocID="{2383CF53-02E1-4F3F-BE6C-062CBDE7D594}" presName="hierChild7" presStyleCnt="0"/>
-      <dgm:spPr/>
-    </dgm:pt>
-    <dgm:pt modelId="{7C1BB281-B26B-4876-817A-BA65908F0D9E}" type="pres">
-      <dgm:prSet presAssocID="{89D141A3-2077-49D1-ACAC-E1F8CA7A0585}" presName="Name111" presStyleLbl="parChTrans1D4" presStyleIdx="3" presStyleCnt="7"/>
-      <dgm:spPr/>
-    </dgm:pt>
-    <dgm:pt modelId="{06395DF6-541B-4A2E-BA4F-AD9A6EDADEC7}" type="pres">
-      <dgm:prSet presAssocID="{CB8D0629-6424-46D8-B083-D3B69B5D6EBE}" presName="hierRoot3" presStyleCnt="0">
-        <dgm:presLayoutVars>
-          <dgm:hierBranch val="init"/>
-        </dgm:presLayoutVars>
-      </dgm:prSet>
-      <dgm:spPr/>
-    </dgm:pt>
-    <dgm:pt modelId="{A41E8D22-DFF8-4C64-BA2F-E04FEDDA0162}" type="pres">
-      <dgm:prSet presAssocID="{CB8D0629-6424-46D8-B083-D3B69B5D6EBE}" presName="rootComposite3" presStyleCnt="0"/>
-      <dgm:spPr/>
-    </dgm:pt>
-    <dgm:pt modelId="{1E030A24-C840-4CA4-93A9-7740A2A70080}" type="pres">
-      <dgm:prSet presAssocID="{CB8D0629-6424-46D8-B083-D3B69B5D6EBE}" presName="rootText3" presStyleLbl="asst1" presStyleIdx="8" presStyleCnt="14">
-        <dgm:presLayoutVars>
-          <dgm:chPref val="3"/>
-        </dgm:presLayoutVars>
-      </dgm:prSet>
-      <dgm:spPr/>
-    </dgm:pt>
-    <dgm:pt modelId="{46664753-ABD3-43ED-A8BE-0DDC61EC6682}" type="pres">
-      <dgm:prSet presAssocID="{CB8D0629-6424-46D8-B083-D3B69B5D6EBE}" presName="rootConnector3" presStyleLbl="asst1" presStyleIdx="8" presStyleCnt="14"/>
-      <dgm:spPr/>
-    </dgm:pt>
-    <dgm:pt modelId="{0CBF2825-2B36-40D5-B657-2E32D7DBE3B3}" type="pres">
-      <dgm:prSet presAssocID="{CB8D0629-6424-46D8-B083-D3B69B5D6EBE}" presName="hierChild6" presStyleCnt="0"/>
-      <dgm:spPr/>
-    </dgm:pt>
-    <dgm:pt modelId="{7667CBEA-AEE5-4B13-8F40-07074D18B94C}" type="pres">
-      <dgm:prSet presAssocID="{CB8D0629-6424-46D8-B083-D3B69B5D6EBE}" presName="hierChild7" presStyleCnt="0"/>
-      <dgm:spPr/>
-    </dgm:pt>
-    <dgm:pt modelId="{7B569ED8-109D-48C6-82EA-DD90994E2391}" type="pres">
-      <dgm:prSet presAssocID="{F4754B2D-6EC9-4982-85FD-478E91807E18}" presName="Name111" presStyleLbl="parChTrans1D3" presStyleIdx="4" presStyleCnt="6"/>
-      <dgm:spPr/>
-    </dgm:pt>
-    <dgm:pt modelId="{E2AD70A4-3565-4CC0-B164-8581C6A82CC5}" type="pres">
-      <dgm:prSet presAssocID="{B39391BF-21C2-452D-A538-733BED02433E}" presName="hierRoot3" presStyleCnt="0">
-        <dgm:presLayoutVars>
-          <dgm:hierBranch val="init"/>
-        </dgm:presLayoutVars>
-      </dgm:prSet>
-      <dgm:spPr/>
-    </dgm:pt>
-    <dgm:pt modelId="{FF5F8DDD-DA52-4233-80B5-F2BF1E5C563F}" type="pres">
-      <dgm:prSet presAssocID="{B39391BF-21C2-452D-A538-733BED02433E}" presName="rootComposite3" presStyleCnt="0"/>
-      <dgm:spPr/>
-    </dgm:pt>
-    <dgm:pt modelId="{FBDFA012-C5E2-4143-AC77-97EC51731B91}" type="pres">
-      <dgm:prSet presAssocID="{B39391BF-21C2-452D-A538-733BED02433E}" presName="rootText3" presStyleLbl="asst1" presStyleIdx="9" presStyleCnt="14">
-        <dgm:presLayoutVars>
-          <dgm:chPref val="3"/>
-        </dgm:presLayoutVars>
-      </dgm:prSet>
-      <dgm:spPr/>
-    </dgm:pt>
-    <dgm:pt modelId="{6F652C23-9AC9-4AA3-86DF-E7FA7DAEC046}" type="pres">
-      <dgm:prSet presAssocID="{B39391BF-21C2-452D-A538-733BED02433E}" presName="rootConnector3" presStyleLbl="asst1" presStyleIdx="9" presStyleCnt="14"/>
-      <dgm:spPr/>
-    </dgm:pt>
-    <dgm:pt modelId="{0455B36A-F8DD-4EC9-82AF-0AAFE8064D44}" type="pres">
-      <dgm:prSet presAssocID="{B39391BF-21C2-452D-A538-733BED02433E}" presName="hierChild6" presStyleCnt="0"/>
-      <dgm:spPr/>
-    </dgm:pt>
-    <dgm:pt modelId="{6881D86F-9149-45AB-BC40-311179E34C3E}" type="pres">
-      <dgm:prSet presAssocID="{B39391BF-21C2-452D-A538-733BED02433E}" presName="hierChild7" presStyleCnt="0"/>
-      <dgm:spPr/>
-    </dgm:pt>
-    <dgm:pt modelId="{1FC65B10-387B-4A7F-A3F3-649FCE8FF37C}" type="pres">
-      <dgm:prSet presAssocID="{A5C728E2-6405-4D37-89DF-62339A6E4EA6}" presName="Name111" presStyleLbl="parChTrans1D3" presStyleIdx="5" presStyleCnt="6"/>
-      <dgm:spPr/>
-    </dgm:pt>
-    <dgm:pt modelId="{E94EE334-8E19-4CDC-BF57-FBCB5332D7F5}" type="pres">
-      <dgm:prSet presAssocID="{B2BB11EB-6B3E-478F-AF92-BF8BE3034051}" presName="hierRoot3" presStyleCnt="0">
-        <dgm:presLayoutVars>
-          <dgm:hierBranch val="init"/>
-        </dgm:presLayoutVars>
-      </dgm:prSet>
-      <dgm:spPr/>
-    </dgm:pt>
-    <dgm:pt modelId="{6A3305EA-EA88-439E-B261-16E068E73801}" type="pres">
-      <dgm:prSet presAssocID="{B2BB11EB-6B3E-478F-AF92-BF8BE3034051}" presName="rootComposite3" presStyleCnt="0"/>
-      <dgm:spPr/>
-    </dgm:pt>
-    <dgm:pt modelId="{6EEA9D6A-07CA-4B8D-9992-7C70A1A8C11D}" type="pres">
-      <dgm:prSet presAssocID="{B2BB11EB-6B3E-478F-AF92-BF8BE3034051}" presName="rootText3" presStyleLbl="asst1" presStyleIdx="10" presStyleCnt="14">
-        <dgm:presLayoutVars>
-          <dgm:chPref val="3"/>
-        </dgm:presLayoutVars>
-      </dgm:prSet>
-      <dgm:spPr/>
-    </dgm:pt>
-    <dgm:pt modelId="{BD04605A-89DC-4A3F-81F7-CB090B7F61D0}" type="pres">
-      <dgm:prSet presAssocID="{B2BB11EB-6B3E-478F-AF92-BF8BE3034051}" presName="rootConnector3" presStyleLbl="asst1" presStyleIdx="10" presStyleCnt="14"/>
-      <dgm:spPr/>
-    </dgm:pt>
-    <dgm:pt modelId="{424803A1-94D1-4E22-A476-AEF2329BB8E5}" type="pres">
-      <dgm:prSet presAssocID="{B2BB11EB-6B3E-478F-AF92-BF8BE3034051}" presName="hierChild6" presStyleCnt="0"/>
-      <dgm:spPr/>
-    </dgm:pt>
-    <dgm:pt modelId="{49FD9BA5-C901-4889-A9EA-38EBB531FA14}" type="pres">
-      <dgm:prSet presAssocID="{B2BB11EB-6B3E-478F-AF92-BF8BE3034051}" presName="hierChild7" presStyleCnt="0"/>
-      <dgm:spPr/>
-    </dgm:pt>
-    <dgm:pt modelId="{311E2D49-366F-4190-95E5-6F15586CB528}" type="pres">
-      <dgm:prSet presAssocID="{87C2BEB1-97D3-490C-A4A6-465B43C11494}" presName="Name111" presStyleLbl="parChTrans1D4" presStyleIdx="4" presStyleCnt="7"/>
-      <dgm:spPr/>
-    </dgm:pt>
-    <dgm:pt modelId="{8125067C-719E-4C5A-996F-E0D9208985A6}" type="pres">
-      <dgm:prSet presAssocID="{4E85A17E-10EC-40FC-BC89-9209368B7129}" presName="hierRoot3" presStyleCnt="0">
-        <dgm:presLayoutVars>
-          <dgm:hierBranch val="init"/>
-        </dgm:presLayoutVars>
-      </dgm:prSet>
-      <dgm:spPr/>
-    </dgm:pt>
-    <dgm:pt modelId="{AB9916E6-8FFF-4344-9C82-4E8EDC430910}" type="pres">
-      <dgm:prSet presAssocID="{4E85A17E-10EC-40FC-BC89-9209368B7129}" presName="rootComposite3" presStyleCnt="0"/>
-      <dgm:spPr/>
-    </dgm:pt>
-    <dgm:pt modelId="{16628B9F-A31E-415A-8135-4F45991C26C3}" type="pres">
-      <dgm:prSet presAssocID="{4E85A17E-10EC-40FC-BC89-9209368B7129}" presName="rootText3" presStyleLbl="asst1" presStyleIdx="11" presStyleCnt="14">
-        <dgm:presLayoutVars>
-          <dgm:chPref val="3"/>
-        </dgm:presLayoutVars>
-      </dgm:prSet>
-      <dgm:spPr/>
-    </dgm:pt>
-    <dgm:pt modelId="{A9D98AA6-E990-4E97-8EEC-85D241C3D839}" type="pres">
-      <dgm:prSet presAssocID="{4E85A17E-10EC-40FC-BC89-9209368B7129}" presName="rootConnector3" presStyleLbl="asst1" presStyleIdx="11" presStyleCnt="14"/>
-      <dgm:spPr/>
-    </dgm:pt>
-    <dgm:pt modelId="{F892A149-FF04-4AA8-A1BA-32346A72EB84}" type="pres">
-      <dgm:prSet presAssocID="{4E85A17E-10EC-40FC-BC89-9209368B7129}" presName="hierChild6" presStyleCnt="0"/>
-      <dgm:spPr/>
-    </dgm:pt>
-    <dgm:pt modelId="{CF696F0C-6360-49C2-9A6E-02C5D5857EBB}" type="pres">
-      <dgm:prSet presAssocID="{4E85A17E-10EC-40FC-BC89-9209368B7129}" presName="hierChild7" presStyleCnt="0"/>
-      <dgm:spPr/>
-    </dgm:pt>
-    <dgm:pt modelId="{B8608039-4254-4A97-8BFD-8608AB477D8E}" type="pres">
-      <dgm:prSet presAssocID="{A5A639E0-123E-449B-AAA6-78FACB6B64B7}" presName="Name111" presStyleLbl="parChTrans1D4" presStyleIdx="5" presStyleCnt="7"/>
-      <dgm:spPr/>
-    </dgm:pt>
-    <dgm:pt modelId="{0DF323CF-6FD4-4D89-BE5E-58BB7BB71D9D}" type="pres">
-      <dgm:prSet presAssocID="{AFEFBB6E-5AA1-4F4B-9D8D-2B6FCBCE202E}" presName="hierRoot3" presStyleCnt="0">
-        <dgm:presLayoutVars>
-          <dgm:hierBranch val="init"/>
-        </dgm:presLayoutVars>
-      </dgm:prSet>
-      <dgm:spPr/>
-    </dgm:pt>
-    <dgm:pt modelId="{A316D519-3010-4C01-BAE1-9C7DE3F92EAF}" type="pres">
-      <dgm:prSet presAssocID="{AFEFBB6E-5AA1-4F4B-9D8D-2B6FCBCE202E}" presName="rootComposite3" presStyleCnt="0"/>
-      <dgm:spPr/>
-    </dgm:pt>
-    <dgm:pt modelId="{D7E7819D-BE5A-4C2D-863E-98D41FCE3D35}" type="pres">
-      <dgm:prSet presAssocID="{AFEFBB6E-5AA1-4F4B-9D8D-2B6FCBCE202E}" presName="rootText3" presStyleLbl="asst1" presStyleIdx="12" presStyleCnt="14">
-        <dgm:presLayoutVars>
-          <dgm:chPref val="3"/>
-        </dgm:presLayoutVars>
-      </dgm:prSet>
-      <dgm:spPr/>
-    </dgm:pt>
-    <dgm:pt modelId="{F4D0992F-9E35-4D0D-8545-12F9406D67C3}" type="pres">
-      <dgm:prSet presAssocID="{AFEFBB6E-5AA1-4F4B-9D8D-2B6FCBCE202E}" presName="rootConnector3" presStyleLbl="asst1" presStyleIdx="12" presStyleCnt="14"/>
-      <dgm:spPr/>
-    </dgm:pt>
-    <dgm:pt modelId="{0E240242-9938-4D80-9036-ADBE56C12AA4}" type="pres">
-      <dgm:prSet presAssocID="{AFEFBB6E-5AA1-4F4B-9D8D-2B6FCBCE202E}" presName="hierChild6" presStyleCnt="0"/>
-      <dgm:spPr/>
-    </dgm:pt>
-    <dgm:pt modelId="{70396BA3-1ADA-4D26-92D0-48E0BD0029D2}" type="pres">
-      <dgm:prSet presAssocID="{AFEFBB6E-5AA1-4F4B-9D8D-2B6FCBCE202E}" presName="hierChild7" presStyleCnt="0"/>
-      <dgm:spPr/>
-    </dgm:pt>
-    <dgm:pt modelId="{D26D02D2-9E33-4537-8ECE-AA6EE0F4548F}" type="pres">
-      <dgm:prSet presAssocID="{AE698914-B5E6-46E6-ABC5-FA7C77DD4BFD}" presName="Name111" presStyleLbl="parChTrans1D4" presStyleIdx="6" presStyleCnt="7"/>
-      <dgm:spPr/>
-    </dgm:pt>
-    <dgm:pt modelId="{0FF1C009-348D-4AC4-9BD5-8E394343D68E}" type="pres">
-      <dgm:prSet presAssocID="{35C75F19-636D-4071-9623-CF6F9A8A0749}" presName="hierRoot3" presStyleCnt="0">
-        <dgm:presLayoutVars>
-          <dgm:hierBranch val="init"/>
-        </dgm:presLayoutVars>
-      </dgm:prSet>
-      <dgm:spPr/>
-    </dgm:pt>
-    <dgm:pt modelId="{4F225052-3F30-4F3F-BD33-6D7214D83DEB}" type="pres">
-      <dgm:prSet presAssocID="{35C75F19-636D-4071-9623-CF6F9A8A0749}" presName="rootComposite3" presStyleCnt="0"/>
-      <dgm:spPr/>
-    </dgm:pt>
-    <dgm:pt modelId="{B8A0060D-18B6-436B-8EE4-4E837AA06BE6}" type="pres">
-      <dgm:prSet presAssocID="{35C75F19-636D-4071-9623-CF6F9A8A0749}" presName="rootText3" presStyleLbl="asst1" presStyleIdx="13" presStyleCnt="14">
-        <dgm:presLayoutVars>
-          <dgm:chPref val="3"/>
-        </dgm:presLayoutVars>
-      </dgm:prSet>
-      <dgm:spPr/>
-    </dgm:pt>
-    <dgm:pt modelId="{9B41113E-3BAB-49D9-A5A7-3BD921A74B53}" type="pres">
-      <dgm:prSet presAssocID="{35C75F19-636D-4071-9623-CF6F9A8A0749}" presName="rootConnector3" presStyleLbl="asst1" presStyleIdx="13" presStyleCnt="14"/>
-      <dgm:spPr/>
-    </dgm:pt>
-    <dgm:pt modelId="{9D8E6859-1B81-40A8-8EB2-CDECFEA0B696}" type="pres">
-      <dgm:prSet presAssocID="{35C75F19-636D-4071-9623-CF6F9A8A0749}" presName="hierChild6" presStyleCnt="0"/>
-      <dgm:spPr/>
-    </dgm:pt>
-    <dgm:pt modelId="{BE8D54E2-CBC5-457D-BD83-7E0DA616A21F}" type="pres">
-      <dgm:prSet presAssocID="{35C75F19-636D-4071-9623-CF6F9A8A0749}" presName="hierChild7" presStyleCnt="0"/>
+    <dgm:pt modelId="{1901F37B-15E1-408A-947B-1439FCE9FFF8}" type="pres">
+      <dgm:prSet presAssocID="{5D1F6F73-40FE-43DA-970C-7F2E380842FA}" presName="hierChild7" presStyleCnt="0"/>
       <dgm:spPr/>
     </dgm:pt>
   </dgm:ptLst>
   <dgm:cxnLst>
-    <dgm:cxn modelId="{12D3B30E-DDFE-424F-8F68-55104642B4BA}" type="presOf" srcId="{4E85A17E-10EC-40FC-BC89-9209368B7129}" destId="{A9D98AA6-E990-4E97-8EEC-85D241C3D839}" srcOrd="1" destOrd="0" presId="urn:microsoft.com/office/officeart/2005/8/layout/orgChart1"/>
-    <dgm:cxn modelId="{5F4C815F-8296-4002-912E-6284FC57FE20}" type="presOf" srcId="{A2E8C118-36E7-4CFD-B20C-731E17EFD628}" destId="{19EA03CC-C570-4B80-AF63-88BC9FD1AF94}" srcOrd="1" destOrd="0" presId="urn:microsoft.com/office/officeart/2005/8/layout/orgChart1"/>
-    <dgm:cxn modelId="{4CC36169-563B-49DB-BEE3-B2F84402242C}" type="presOf" srcId="{E14BE7A0-D68F-439F-9E46-1E67E9D647AD}" destId="{9671D427-A6CF-4FBB-A364-F2B641BA1AA4}" srcOrd="0" destOrd="0" presId="urn:microsoft.com/office/officeart/2005/8/layout/orgChart1"/>
-    <dgm:cxn modelId="{4EF76AE2-A570-44CB-9E7F-1DD7E53C3E93}" srcId="{B2BB11EB-6B3E-478F-AF92-BF8BE3034051}" destId="{35C75F19-636D-4071-9623-CF6F9A8A0749}" srcOrd="2" destOrd="0" parTransId="{AE698914-B5E6-46E6-ABC5-FA7C77DD4BFD}" sibTransId="{321D1483-ABDD-4BAE-8446-C9786702F4C8}"/>
-    <dgm:cxn modelId="{3D243B5F-1DC5-43E5-859A-4BE697332749}" type="presOf" srcId="{89D141A3-2077-49D1-ACAC-E1F8CA7A0585}" destId="{7C1BB281-B26B-4876-817A-BA65908F0D9E}" srcOrd="0" destOrd="0" presId="urn:microsoft.com/office/officeart/2005/8/layout/orgChart1"/>
-    <dgm:cxn modelId="{58209149-4D4D-4A60-83DF-94B441AA3DA4}" type="presOf" srcId="{AE698914-B5E6-46E6-ABC5-FA7C77DD4BFD}" destId="{D26D02D2-9E33-4537-8ECE-AA6EE0F4548F}" srcOrd="0" destOrd="0" presId="urn:microsoft.com/office/officeart/2005/8/layout/orgChart1"/>
-    <dgm:cxn modelId="{C42EB934-5168-499B-A13F-8C609CD79D3D}" type="presOf" srcId="{49D3A56E-ABE9-4EE8-8EC6-06DF3B598A2F}" destId="{193351BE-B9BC-4943-A239-828677255160}" srcOrd="1" destOrd="0" presId="urn:microsoft.com/office/officeart/2005/8/layout/orgChart1"/>
-    <dgm:cxn modelId="{C66EBB51-8C8C-491F-877B-704FAA996867}" type="presOf" srcId="{A2E8C118-36E7-4CFD-B20C-731E17EFD628}" destId="{2C1A0EB1-97B2-4B4E-9148-A93F6736BFB2}" srcOrd="0" destOrd="0" presId="urn:microsoft.com/office/officeart/2005/8/layout/orgChart1"/>
-    <dgm:cxn modelId="{D3A9A3E7-183E-45D2-9EEA-86216E59FC17}" srcId="{A2E8C118-36E7-4CFD-B20C-731E17EFD628}" destId="{2383CF53-02E1-4F3F-BE6C-062CBDE7D594}" srcOrd="0" destOrd="0" parTransId="{E14BE7A0-D68F-439F-9E46-1E67E9D647AD}" sibTransId="{DE070276-8ACB-4A95-82A2-C022AC073F68}"/>
-    <dgm:cxn modelId="{03C93436-F794-404A-925A-2DA6BDCFE580}" type="presOf" srcId="{35C75F19-636D-4071-9623-CF6F9A8A0749}" destId="{B8A0060D-18B6-436B-8EE4-4E837AA06BE6}" srcOrd="0" destOrd="0" presId="urn:microsoft.com/office/officeart/2005/8/layout/orgChart1"/>
-    <dgm:cxn modelId="{66D478E2-8E2D-43D7-99B3-39A87D46738F}" srcId="{3EB44D4F-E0DA-4318-8579-C3AD43B9AB08}" destId="{49D3A56E-ABE9-4EE8-8EC6-06DF3B598A2F}" srcOrd="0" destOrd="0" parTransId="{6DDE7781-BBCE-4FC9-B09B-EBC1C8E861BA}" sibTransId="{E8D115D2-7906-4D2C-AF79-D26FFFDD3EC6}"/>
-    <dgm:cxn modelId="{673BF1BF-0BF9-4D01-B8A9-0F7289434A99}" type="presOf" srcId="{CB8D0629-6424-46D8-B083-D3B69B5D6EBE}" destId="{46664753-ABD3-43ED-A8BE-0DDC61EC6682}" srcOrd="1" destOrd="0" presId="urn:microsoft.com/office/officeart/2005/8/layout/orgChart1"/>
-    <dgm:cxn modelId="{6FEBFBAF-0081-4F30-8290-C8141589A4B7}" type="presOf" srcId="{A5A639E0-123E-449B-AAA6-78FACB6B64B7}" destId="{B8608039-4254-4A97-8BFD-8608AB477D8E}" srcOrd="0" destOrd="0" presId="urn:microsoft.com/office/officeart/2005/8/layout/orgChart1"/>
-    <dgm:cxn modelId="{60A2F43D-BE88-44CC-BA9C-02148006D129}" type="presOf" srcId="{3EB44D4F-E0DA-4318-8579-C3AD43B9AB08}" destId="{D6207FE7-3A44-415C-ADBC-93102EAA492C}" srcOrd="1" destOrd="0" presId="urn:microsoft.com/office/officeart/2005/8/layout/orgChart1"/>
-    <dgm:cxn modelId="{821B9CF2-6FB5-4932-9484-8E3C7D87CE1B}" type="presOf" srcId="{6F72523D-3FDA-4CE5-AC38-A9BA6E1C30CB}" destId="{A32BB778-99B3-460D-A008-1A1F9FD7F25F}" srcOrd="0" destOrd="0" presId="urn:microsoft.com/office/officeart/2005/8/layout/orgChart1"/>
-    <dgm:cxn modelId="{047F7F16-EBCF-4283-B7B3-88FED5BDCBAC}" type="presOf" srcId="{6DDE7781-BBCE-4FC9-B09B-EBC1C8E861BA}" destId="{9AA8733F-3439-4F82-8E4E-8B1C5509A1C8}" srcOrd="0" destOrd="0" presId="urn:microsoft.com/office/officeart/2005/8/layout/orgChart1"/>
-    <dgm:cxn modelId="{79371397-79E6-4DB4-933B-F00A09CF28C2}" type="presOf" srcId="{AFEFBB6E-5AA1-4F4B-9D8D-2B6FCBCE202E}" destId="{D7E7819D-BE5A-4C2D-863E-98D41FCE3D35}" srcOrd="0" destOrd="0" presId="urn:microsoft.com/office/officeart/2005/8/layout/orgChart1"/>
-    <dgm:cxn modelId="{EA60D76A-8414-4963-9596-E64534B8F42D}" type="presOf" srcId="{4763B572-D80F-4BDC-ACF8-9C758BFD289E}" destId="{1F8F2A92-A788-4996-B95D-FEA7D1CA4756}" srcOrd="1" destOrd="0" presId="urn:microsoft.com/office/officeart/2005/8/layout/orgChart1"/>
-    <dgm:cxn modelId="{E56C1FA4-4338-4CEC-9068-B10AE69D3D90}" type="presOf" srcId="{AF671B97-65CD-4D5A-8170-530CC4F7A08B}" destId="{23C52E41-00C9-4660-9F7C-E79A721D2A76}" srcOrd="0" destOrd="0" presId="urn:microsoft.com/office/officeart/2005/8/layout/orgChart1"/>
-    <dgm:cxn modelId="{66D2C551-B45F-4A1F-A18F-ACD46B247E0D}" type="presOf" srcId="{0146C9F1-D5F0-4B14-A451-961B269EC42E}" destId="{681C7190-5D7E-4004-9047-024547925004}" srcOrd="1" destOrd="0" presId="urn:microsoft.com/office/officeart/2005/8/layout/orgChart1"/>
-    <dgm:cxn modelId="{FD38F0B4-855B-46F2-9067-F62D65C7E7D8}" srcId="{49D3A56E-ABE9-4EE8-8EC6-06DF3B598A2F}" destId="{4763B572-D80F-4BDC-ACF8-9C758BFD289E}" srcOrd="2" destOrd="0" parTransId="{D46C994E-85C8-4E21-BC37-375F412FD806}" sibTransId="{758E4A18-5CF7-4F8D-863A-29CDBB1EB4E9}"/>
-    <dgm:cxn modelId="{B33E7038-8278-40F0-AE8C-0A414A5FE2D4}" type="presOf" srcId="{AFEFBB6E-5AA1-4F4B-9D8D-2B6FCBCE202E}" destId="{F4D0992F-9E35-4D0D-8545-12F9406D67C3}" srcOrd="1" destOrd="0" presId="urn:microsoft.com/office/officeart/2005/8/layout/orgChart1"/>
-    <dgm:cxn modelId="{63117C3A-DECB-469E-BACD-306C6CA830C3}" type="presOf" srcId="{4763B572-D80F-4BDC-ACF8-9C758BFD289E}" destId="{64239F16-4F55-49BE-88DC-6966CB06462B}" srcOrd="0" destOrd="0" presId="urn:microsoft.com/office/officeart/2005/8/layout/orgChart1"/>
-    <dgm:cxn modelId="{803891ED-DDA2-46F8-97EF-8D40B9AB264D}" srcId="{49D3A56E-ABE9-4EE8-8EC6-06DF3B598A2F}" destId="{B39391BF-21C2-452D-A538-733BED02433E}" srcOrd="4" destOrd="0" parTransId="{F4754B2D-6EC9-4982-85FD-478E91807E18}" sibTransId="{355F9248-CD68-42B7-BB49-C103A6D3C7A4}"/>
-    <dgm:cxn modelId="{D17052FA-E000-41EA-A331-E8C033C14B30}" type="presOf" srcId="{CB8D0629-6424-46D8-B083-D3B69B5D6EBE}" destId="{1E030A24-C840-4CA4-93A9-7740A2A70080}" srcOrd="0" destOrd="0" presId="urn:microsoft.com/office/officeart/2005/8/layout/orgChart1"/>
-    <dgm:cxn modelId="{7CF9AD24-763D-4D21-8D70-8746BE285960}" type="presOf" srcId="{2383CF53-02E1-4F3F-BE6C-062CBDE7D594}" destId="{97D0B171-D747-4050-93EA-AFF2D46A22E5}" srcOrd="0" destOrd="0" presId="urn:microsoft.com/office/officeart/2005/8/layout/orgChart1"/>
-    <dgm:cxn modelId="{5201DCF9-973B-4356-A244-FF1090C4A28D}" type="presOf" srcId="{35C75F19-636D-4071-9623-CF6F9A8A0749}" destId="{9B41113E-3BAB-49D9-A5A7-3BD921A74B53}" srcOrd="1" destOrd="0" presId="urn:microsoft.com/office/officeart/2005/8/layout/orgChart1"/>
-    <dgm:cxn modelId="{01969D48-3A91-4195-B087-7A5CEDFA747E}" type="presOf" srcId="{F66F3758-BED7-4FDF-A3CC-7BF4F2162977}" destId="{CAC482E8-66D6-409D-982D-D5BE40028EC1}" srcOrd="0" destOrd="0" presId="urn:microsoft.com/office/officeart/2005/8/layout/orgChart1"/>
-    <dgm:cxn modelId="{92065611-2BCB-4CFB-A708-5BC27776F6F3}" type="presOf" srcId="{B39391BF-21C2-452D-A538-733BED02433E}" destId="{FBDFA012-C5E2-4143-AC77-97EC51731B91}" srcOrd="0" destOrd="0" presId="urn:microsoft.com/office/officeart/2005/8/layout/orgChart1"/>
-    <dgm:cxn modelId="{402E89C9-21BE-41B6-8375-1638A21B8448}" srcId="{B2BB11EB-6B3E-478F-AF92-BF8BE3034051}" destId="{4E85A17E-10EC-40FC-BC89-9209368B7129}" srcOrd="0" destOrd="0" parTransId="{87C2BEB1-97D3-490C-A4A6-465B43C11494}" sibTransId="{7B57F461-3107-442D-ACA3-D385BF5E4121}"/>
-    <dgm:cxn modelId="{364AAA5C-D3B0-4F26-95E7-4E1B11AD9951}" srcId="{6F72523D-3FDA-4CE5-AC38-A9BA6E1C30CB}" destId="{3EB44D4F-E0DA-4318-8579-C3AD43B9AB08}" srcOrd="0" destOrd="0" parTransId="{CD46E39D-0F04-4850-A5DA-DF377EC19F01}" sibTransId="{0FC80FFD-BDB8-44F2-899C-B056A9C57EF7}"/>
-    <dgm:cxn modelId="{58A10ADC-334E-4E42-B642-FD6729B707DA}" type="presOf" srcId="{D46C994E-85C8-4E21-BC37-375F412FD806}" destId="{1E3562D8-53FD-44BF-AD79-E2E22051C757}" srcOrd="0" destOrd="0" presId="urn:microsoft.com/office/officeart/2005/8/layout/orgChart1"/>
-    <dgm:cxn modelId="{871FA4D0-6CD7-406B-82C9-16AFD160D494}" srcId="{49D3A56E-ABE9-4EE8-8EC6-06DF3B598A2F}" destId="{0146C9F1-D5F0-4B14-A451-961B269EC42E}" srcOrd="1" destOrd="0" parTransId="{4FF8BEAC-078B-4757-AF85-AA8D1F0C6EA8}" sibTransId="{75294C89-6EA9-47F1-BD22-7B5402B9C1EE}"/>
-    <dgm:cxn modelId="{ED2ADFC4-5B52-468C-8760-63288FD777F8}" type="presOf" srcId="{87C2BEB1-97D3-490C-A4A6-465B43C11494}" destId="{311E2D49-366F-4190-95E5-6F15586CB528}" srcOrd="0" destOrd="0" presId="urn:microsoft.com/office/officeart/2005/8/layout/orgChart1"/>
-    <dgm:cxn modelId="{0F38C686-85AD-4A56-953E-BCC1B895B469}" type="presOf" srcId="{70D1DB33-558A-4930-A60F-95648575A2B9}" destId="{84A4997E-AA68-44A1-B49D-095020597CC6}" srcOrd="0" destOrd="0" presId="urn:microsoft.com/office/officeart/2005/8/layout/orgChart1"/>
-    <dgm:cxn modelId="{F17D9E77-99E1-4297-988A-A9D51D9316E1}" type="presOf" srcId="{4FF8BEAC-078B-4757-AF85-AA8D1F0C6EA8}" destId="{DC66C6E7-E03B-4F0A-AA36-D826A08382D1}" srcOrd="0" destOrd="0" presId="urn:microsoft.com/office/officeart/2005/8/layout/orgChart1"/>
-    <dgm:cxn modelId="{2F69C623-B024-4824-857E-19513DCF6E45}" type="presOf" srcId="{2383CF53-02E1-4F3F-BE6C-062CBDE7D594}" destId="{3CF4E510-507E-403B-8F16-C215BF693818}" srcOrd="1" destOrd="0" presId="urn:microsoft.com/office/officeart/2005/8/layout/orgChart1"/>
-    <dgm:cxn modelId="{7F6EC533-0CB2-4FEE-80ED-BD9DDFB64F78}" srcId="{4763B572-D80F-4BDC-ACF8-9C758BFD289E}" destId="{70D1DB33-558A-4930-A60F-95648575A2B9}" srcOrd="0" destOrd="0" parTransId="{61682B32-BF7A-4740-AA92-D84ED75253D6}" sibTransId="{BA6559B8-3160-408B-9E44-6E57327D0456}"/>
-    <dgm:cxn modelId="{4B56ACF7-5ABC-44B3-837B-71D3F9735BC4}" type="presOf" srcId="{967F48A2-52E3-42FE-BFB0-0F6F44BB09EA}" destId="{A9C5A3E1-4B26-4770-85D6-B0E5B7630701}" srcOrd="0" destOrd="0" presId="urn:microsoft.com/office/officeart/2005/8/layout/orgChart1"/>
-    <dgm:cxn modelId="{6399BCF8-85BD-4359-AE92-20FE9F14A09B}" srcId="{49D3A56E-ABE9-4EE8-8EC6-06DF3B598A2F}" destId="{967F48A2-52E3-42FE-BFB0-0F6F44BB09EA}" srcOrd="0" destOrd="0" parTransId="{19E72598-07D7-46C8-A62E-1C3DBD4B9505}" sibTransId="{ECD23172-FCAC-4768-802F-333E0E015B94}"/>
-    <dgm:cxn modelId="{A6463C92-B23C-402A-963B-F4AE8F1C9145}" srcId="{B2BB11EB-6B3E-478F-AF92-BF8BE3034051}" destId="{AFEFBB6E-5AA1-4F4B-9D8D-2B6FCBCE202E}" srcOrd="1" destOrd="0" parTransId="{A5A639E0-123E-449B-AAA6-78FACB6B64B7}" sibTransId="{3533C4AB-C9D6-4747-8DE7-1A91803DB368}"/>
-    <dgm:cxn modelId="{D09B159E-B408-4993-A5F8-28DC835CC328}" type="presOf" srcId="{B2BB11EB-6B3E-478F-AF92-BF8BE3034051}" destId="{6EEA9D6A-07CA-4B8D-9992-7C70A1A8C11D}" srcOrd="0" destOrd="0" presId="urn:microsoft.com/office/officeart/2005/8/layout/orgChart1"/>
-    <dgm:cxn modelId="{7D2C52D0-AA48-4A08-A4F0-300CEDE2A405}" type="presOf" srcId="{70D1DB33-558A-4930-A60F-95648575A2B9}" destId="{D3469E18-6AE0-441F-9D81-24898BAF013F}" srcOrd="1" destOrd="0" presId="urn:microsoft.com/office/officeart/2005/8/layout/orgChart1"/>
-    <dgm:cxn modelId="{1AB2E8EC-B25F-4D35-BB64-DE05C4F56EAB}" type="presOf" srcId="{F4754B2D-6EC9-4982-85FD-478E91807E18}" destId="{7B569ED8-109D-48C6-82EA-DD90994E2391}" srcOrd="0" destOrd="0" presId="urn:microsoft.com/office/officeart/2005/8/layout/orgChart1"/>
-    <dgm:cxn modelId="{06D81A5B-A023-4EA5-BB85-8AA3BB303B77}" type="presOf" srcId="{61682B32-BF7A-4740-AA92-D84ED75253D6}" destId="{79BFB1A5-42BC-49DC-AECD-37FF5B2A9991}" srcOrd="0" destOrd="0" presId="urn:microsoft.com/office/officeart/2005/8/layout/orgChart1"/>
-    <dgm:cxn modelId="{C0C0F889-394B-4393-85C9-B1BA0F9CD196}" type="presOf" srcId="{A5C728E2-6405-4D37-89DF-62339A6E4EA6}" destId="{1FC65B10-387B-4A7F-A3F3-649FCE8FF37C}" srcOrd="0" destOrd="0" presId="urn:microsoft.com/office/officeart/2005/8/layout/orgChart1"/>
-    <dgm:cxn modelId="{ACFB7E31-BA24-4828-AB99-E9EE538618B2}" type="presOf" srcId="{3EB44D4F-E0DA-4318-8579-C3AD43B9AB08}" destId="{D7FB7A5E-8816-4BD8-9D46-B745F7752139}" srcOrd="0" destOrd="0" presId="urn:microsoft.com/office/officeart/2005/8/layout/orgChart1"/>
-    <dgm:cxn modelId="{D21DB1AB-111E-49CA-870A-2EC18D990817}" type="presOf" srcId="{967F48A2-52E3-42FE-BFB0-0F6F44BB09EA}" destId="{F809183E-6CC5-4F2C-BF74-DA04580520CA}" srcOrd="1" destOrd="0" presId="urn:microsoft.com/office/officeart/2005/8/layout/orgChart1"/>
-    <dgm:cxn modelId="{8A57AD24-C8E9-4D97-88E3-EEE4E01D2D8F}" type="presOf" srcId="{0146C9F1-D5F0-4B14-A451-961B269EC42E}" destId="{FDD65648-DB74-42C8-A622-6966DB89CE5D}" srcOrd="0" destOrd="0" presId="urn:microsoft.com/office/officeart/2005/8/layout/orgChart1"/>
-    <dgm:cxn modelId="{59A06073-278A-4B09-B01D-79AAE7280D69}" type="presOf" srcId="{19E72598-07D7-46C8-A62E-1C3DBD4B9505}" destId="{99970878-4EDC-4385-A709-C43B933E0757}" srcOrd="0" destOrd="0" presId="urn:microsoft.com/office/officeart/2005/8/layout/orgChart1"/>
-    <dgm:cxn modelId="{3B5A9929-E6AF-4E17-977D-FD5E8D37DAE7}" srcId="{49D3A56E-ABE9-4EE8-8EC6-06DF3B598A2F}" destId="{B2BB11EB-6B3E-478F-AF92-BF8BE3034051}" srcOrd="5" destOrd="0" parTransId="{A5C728E2-6405-4D37-89DF-62339A6E4EA6}" sibTransId="{E2CF5D79-8355-49F4-958D-A63A252831E4}"/>
-    <dgm:cxn modelId="{C6792CEB-02EF-48A5-901F-18048EE23FFD}" type="presOf" srcId="{A1721267-0235-4C3B-8530-877D5C750476}" destId="{547EBEB2-66F4-49F2-9EC4-FE62025F48E9}" srcOrd="0" destOrd="0" presId="urn:microsoft.com/office/officeart/2005/8/layout/orgChart1"/>
-    <dgm:cxn modelId="{8F40EDFA-CCEE-4346-82AB-12F8F9881B45}" type="presOf" srcId="{4E85A17E-10EC-40FC-BC89-9209368B7129}" destId="{16628B9F-A31E-415A-8135-4F45991C26C3}" srcOrd="0" destOrd="0" presId="urn:microsoft.com/office/officeart/2005/8/layout/orgChart1"/>
-    <dgm:cxn modelId="{550A120B-3483-4289-A93C-D330A48B8212}" type="presOf" srcId="{B39391BF-21C2-452D-A538-733BED02433E}" destId="{6F652C23-9AC9-4AA3-86DF-E7FA7DAEC046}" srcOrd="1" destOrd="0" presId="urn:microsoft.com/office/officeart/2005/8/layout/orgChart1"/>
-    <dgm:cxn modelId="{58C6A1C7-3AB4-41EB-97DF-C29F2734929F}" srcId="{49D3A56E-ABE9-4EE8-8EC6-06DF3B598A2F}" destId="{A2E8C118-36E7-4CFD-B20C-731E17EFD628}" srcOrd="3" destOrd="0" parTransId="{F66F3758-BED7-4FDF-A3CC-7BF4F2162977}" sibTransId="{A39BEF03-7FC6-4D18-B36C-62080EF1DF05}"/>
-    <dgm:cxn modelId="{7957E5B6-74DE-4526-A7D3-3FF624F7F7FA}" srcId="{A2E8C118-36E7-4CFD-B20C-731E17EFD628}" destId="{CB8D0629-6424-46D8-B083-D3B69B5D6EBE}" srcOrd="1" destOrd="0" parTransId="{89D141A3-2077-49D1-ACAC-E1F8CA7A0585}" sibTransId="{E0249DD1-B1FB-40D4-B02E-7E8DFCC3F406}"/>
-    <dgm:cxn modelId="{D54669DD-7A2B-4F55-B8F6-3A6815C687FE}" type="presOf" srcId="{49D3A56E-ABE9-4EE8-8EC6-06DF3B598A2F}" destId="{A98B100C-274F-4765-88F3-AB7621990B39}" srcOrd="0" destOrd="0" presId="urn:microsoft.com/office/officeart/2005/8/layout/orgChart1"/>
-    <dgm:cxn modelId="{A83ED662-8C14-4F67-94B8-9395CA40F21B}" type="presOf" srcId="{B2BB11EB-6B3E-478F-AF92-BF8BE3034051}" destId="{BD04605A-89DC-4A3F-81F7-CB090B7F61D0}" srcOrd="1" destOrd="0" presId="urn:microsoft.com/office/officeart/2005/8/layout/orgChart1"/>
-    <dgm:cxn modelId="{3190A482-A44D-4439-BFBF-B9D9E6C649AF}" srcId="{4763B572-D80F-4BDC-ACF8-9C758BFD289E}" destId="{A1721267-0235-4C3B-8530-877D5C750476}" srcOrd="1" destOrd="0" parTransId="{AF671B97-65CD-4D5A-8170-530CC4F7A08B}" sibTransId="{D0CC0C12-ABC1-49F9-A94A-331807C28899}"/>
-    <dgm:cxn modelId="{04456D9B-A8CB-4F85-A020-10036EBCD46A}" type="presOf" srcId="{A1721267-0235-4C3B-8530-877D5C750476}" destId="{F4E85B78-B2DC-48F8-9AFD-A4121DC125FA}" srcOrd="1" destOrd="0" presId="urn:microsoft.com/office/officeart/2005/8/layout/orgChart1"/>
-    <dgm:cxn modelId="{4088E006-8A42-4B83-95B2-859F5EC04CBE}" type="presParOf" srcId="{A32BB778-99B3-460D-A008-1A1F9FD7F25F}" destId="{543FA7BB-4A70-4F89-AEB4-5471A3891A8E}" srcOrd="0" destOrd="0" presId="urn:microsoft.com/office/officeart/2005/8/layout/orgChart1"/>
-    <dgm:cxn modelId="{07CAADDC-12A3-41A6-8E39-9498E3F429FC}" type="presParOf" srcId="{543FA7BB-4A70-4F89-AEB4-5471A3891A8E}" destId="{0B924AFF-E4A3-466F-B015-B28870A31054}" srcOrd="0" destOrd="0" presId="urn:microsoft.com/office/officeart/2005/8/layout/orgChart1"/>
-    <dgm:cxn modelId="{CF892BC5-00F0-492E-9205-2114A1264366}" type="presParOf" srcId="{0B924AFF-E4A3-466F-B015-B28870A31054}" destId="{D7FB7A5E-8816-4BD8-9D46-B745F7752139}" srcOrd="0" destOrd="0" presId="urn:microsoft.com/office/officeart/2005/8/layout/orgChart1"/>
-    <dgm:cxn modelId="{208BCF3D-5A53-411E-AC65-CBEC20821905}" type="presParOf" srcId="{0B924AFF-E4A3-466F-B015-B28870A31054}" destId="{D6207FE7-3A44-415C-ADBC-93102EAA492C}" srcOrd="1" destOrd="0" presId="urn:microsoft.com/office/officeart/2005/8/layout/orgChart1"/>
-    <dgm:cxn modelId="{322DF2E0-9816-4401-B974-050AA1E46D53}" type="presParOf" srcId="{543FA7BB-4A70-4F89-AEB4-5471A3891A8E}" destId="{922E8F53-E844-41A2-A107-AAC1EDE5C6E3}" srcOrd="1" destOrd="0" presId="urn:microsoft.com/office/officeart/2005/8/layout/orgChart1"/>
-    <dgm:cxn modelId="{995257DE-2EE5-47F7-8C51-810DB30CEDA4}" type="presParOf" srcId="{543FA7BB-4A70-4F89-AEB4-5471A3891A8E}" destId="{E31B5BC4-D426-49A9-B9DE-31E3B0F92D50}" srcOrd="2" destOrd="0" presId="urn:microsoft.com/office/officeart/2005/8/layout/orgChart1"/>
-    <dgm:cxn modelId="{DE85A4D1-4720-4420-A1F9-E2F8ED538599}" type="presParOf" srcId="{E31B5BC4-D426-49A9-B9DE-31E3B0F92D50}" destId="{9AA8733F-3439-4F82-8E4E-8B1C5509A1C8}" srcOrd="0" destOrd="0" presId="urn:microsoft.com/office/officeart/2005/8/layout/orgChart1"/>
-    <dgm:cxn modelId="{1E823783-E3AA-4ABB-AAB6-21BB78E5C3B7}" type="presParOf" srcId="{E31B5BC4-D426-49A9-B9DE-31E3B0F92D50}" destId="{0653F80B-B18F-4E5A-9F0C-9D3165E8CFFD}" srcOrd="1" destOrd="0" presId="urn:microsoft.com/office/officeart/2005/8/layout/orgChart1"/>
-    <dgm:cxn modelId="{17C822B5-19A4-47B4-BD9F-B09476FD6F40}" type="presParOf" srcId="{0653F80B-B18F-4E5A-9F0C-9D3165E8CFFD}" destId="{0A27ED4F-1D88-4EDF-8C8A-632BD6B9DC8A}" srcOrd="0" destOrd="0" presId="urn:microsoft.com/office/officeart/2005/8/layout/orgChart1"/>
-    <dgm:cxn modelId="{C0E57396-CDA7-4705-8717-3A7AE4CEB691}" type="presParOf" srcId="{0A27ED4F-1D88-4EDF-8C8A-632BD6B9DC8A}" destId="{A98B100C-274F-4765-88F3-AB7621990B39}" srcOrd="0" destOrd="0" presId="urn:microsoft.com/office/officeart/2005/8/layout/orgChart1"/>
-    <dgm:cxn modelId="{0F699E8D-3735-4043-94EF-1812835E3602}" type="presParOf" srcId="{0A27ED4F-1D88-4EDF-8C8A-632BD6B9DC8A}" destId="{193351BE-B9BC-4943-A239-828677255160}" srcOrd="1" destOrd="0" presId="urn:microsoft.com/office/officeart/2005/8/layout/orgChart1"/>
-    <dgm:cxn modelId="{A64A98EF-382E-425F-9829-4448B502A71E}" type="presParOf" srcId="{0653F80B-B18F-4E5A-9F0C-9D3165E8CFFD}" destId="{40D07C34-6104-41BB-8758-C17F3D1A5ED5}" srcOrd="1" destOrd="0" presId="urn:microsoft.com/office/officeart/2005/8/layout/orgChart1"/>
-    <dgm:cxn modelId="{0AD5DE33-D71A-4C39-97E3-4160BB06F010}" type="presParOf" srcId="{0653F80B-B18F-4E5A-9F0C-9D3165E8CFFD}" destId="{193CF19A-CDA5-4513-B2AB-1F2847962EDB}" srcOrd="2" destOrd="0" presId="urn:microsoft.com/office/officeart/2005/8/layout/orgChart1"/>
-    <dgm:cxn modelId="{4BD9A269-43F6-42EE-B30C-48AD2291ACC0}" type="presParOf" srcId="{193CF19A-CDA5-4513-B2AB-1F2847962EDB}" destId="{99970878-4EDC-4385-A709-C43B933E0757}" srcOrd="0" destOrd="0" presId="urn:microsoft.com/office/officeart/2005/8/layout/orgChart1"/>
-    <dgm:cxn modelId="{EF0103AB-15F6-480C-BEF9-DCABA4CF1124}" type="presParOf" srcId="{193CF19A-CDA5-4513-B2AB-1F2847962EDB}" destId="{6F80C357-3D70-4052-8E5D-71CD2E2A1D05}" srcOrd="1" destOrd="0" presId="urn:microsoft.com/office/officeart/2005/8/layout/orgChart1"/>
-    <dgm:cxn modelId="{54BCF53F-A432-4B91-81D1-369E68DF5591}" type="presParOf" srcId="{6F80C357-3D70-4052-8E5D-71CD2E2A1D05}" destId="{DB35BF69-13CF-4809-8FD4-C8A5255C2FD0}" srcOrd="0" destOrd="0" presId="urn:microsoft.com/office/officeart/2005/8/layout/orgChart1"/>
-    <dgm:cxn modelId="{95022337-CA1D-4407-8DD6-C35B247D9B2E}" type="presParOf" srcId="{DB35BF69-13CF-4809-8FD4-C8A5255C2FD0}" destId="{A9C5A3E1-4B26-4770-85D6-B0E5B7630701}" srcOrd="0" destOrd="0" presId="urn:microsoft.com/office/officeart/2005/8/layout/orgChart1"/>
-    <dgm:cxn modelId="{9B0F58B2-4E09-4167-9E36-C6F24001248A}" type="presParOf" srcId="{DB35BF69-13CF-4809-8FD4-C8A5255C2FD0}" destId="{F809183E-6CC5-4F2C-BF74-DA04580520CA}" srcOrd="1" destOrd="0" presId="urn:microsoft.com/office/officeart/2005/8/layout/orgChart1"/>
-    <dgm:cxn modelId="{95518E1A-BB39-4DA0-AC7D-EA00DA37CD8F}" type="presParOf" srcId="{6F80C357-3D70-4052-8E5D-71CD2E2A1D05}" destId="{F7810152-F2CB-469C-A96E-EB6A19ACEB50}" srcOrd="1" destOrd="0" presId="urn:microsoft.com/office/officeart/2005/8/layout/orgChart1"/>
-    <dgm:cxn modelId="{C7A2EC75-DCCA-4F36-BE1A-309F46C65E4B}" type="presParOf" srcId="{6F80C357-3D70-4052-8E5D-71CD2E2A1D05}" destId="{03C02855-D8EF-46A3-B227-AB9A888807C1}" srcOrd="2" destOrd="0" presId="urn:microsoft.com/office/officeart/2005/8/layout/orgChart1"/>
-    <dgm:cxn modelId="{60F2F1C1-1846-4292-BB58-3E7D907440C4}" type="presParOf" srcId="{193CF19A-CDA5-4513-B2AB-1F2847962EDB}" destId="{DC66C6E7-E03B-4F0A-AA36-D826A08382D1}" srcOrd="2" destOrd="0" presId="urn:microsoft.com/office/officeart/2005/8/layout/orgChart1"/>
-    <dgm:cxn modelId="{1FB5E1F8-0B03-4037-9744-D7DECE4ADD45}" type="presParOf" srcId="{193CF19A-CDA5-4513-B2AB-1F2847962EDB}" destId="{411B4DB4-5243-407A-9B25-49D9B4ED5C95}" srcOrd="3" destOrd="0" presId="urn:microsoft.com/office/officeart/2005/8/layout/orgChart1"/>
-    <dgm:cxn modelId="{470D4E49-D6FF-4E13-86C0-9F5B37182DA9}" type="presParOf" srcId="{411B4DB4-5243-407A-9B25-49D9B4ED5C95}" destId="{A557BBF7-1F75-480A-AAAA-257B63FD3080}" srcOrd="0" destOrd="0" presId="urn:microsoft.com/office/officeart/2005/8/layout/orgChart1"/>
-    <dgm:cxn modelId="{50D8B178-EB8C-469D-800F-9C907ADDD2B4}" type="presParOf" srcId="{A557BBF7-1F75-480A-AAAA-257B63FD3080}" destId="{FDD65648-DB74-42C8-A622-6966DB89CE5D}" srcOrd="0" destOrd="0" presId="urn:microsoft.com/office/officeart/2005/8/layout/orgChart1"/>
-    <dgm:cxn modelId="{9884FF6A-37F8-4B88-A5C3-CC3D1EAE14AB}" type="presParOf" srcId="{A557BBF7-1F75-480A-AAAA-257B63FD3080}" destId="{681C7190-5D7E-4004-9047-024547925004}" srcOrd="1" destOrd="0" presId="urn:microsoft.com/office/officeart/2005/8/layout/orgChart1"/>
-    <dgm:cxn modelId="{9FC55358-D052-4BE1-8E89-5279EB606C14}" type="presParOf" srcId="{411B4DB4-5243-407A-9B25-49D9B4ED5C95}" destId="{04015F67-3CEC-44CB-9D12-7C95013373CB}" srcOrd="1" destOrd="0" presId="urn:microsoft.com/office/officeart/2005/8/layout/orgChart1"/>
-    <dgm:cxn modelId="{C2835966-3899-4986-9FEB-269A6CFD4C68}" type="presParOf" srcId="{411B4DB4-5243-407A-9B25-49D9B4ED5C95}" destId="{669F75E6-2EA5-48DB-96A8-44B8590E77C4}" srcOrd="2" destOrd="0" presId="urn:microsoft.com/office/officeart/2005/8/layout/orgChart1"/>
-    <dgm:cxn modelId="{EFBEAF8B-1791-407D-9C3B-6310284E024A}" type="presParOf" srcId="{193CF19A-CDA5-4513-B2AB-1F2847962EDB}" destId="{1E3562D8-53FD-44BF-AD79-E2E22051C757}" srcOrd="4" destOrd="0" presId="urn:microsoft.com/office/officeart/2005/8/layout/orgChart1"/>
-    <dgm:cxn modelId="{6FF232EF-4B7E-4234-B189-4B5FB8BB0281}" type="presParOf" srcId="{193CF19A-CDA5-4513-B2AB-1F2847962EDB}" destId="{C5BEA3A2-5F4E-4295-A03D-E8CECBC2E42F}" srcOrd="5" destOrd="0" presId="urn:microsoft.com/office/officeart/2005/8/layout/orgChart1"/>
-    <dgm:cxn modelId="{72E86A03-7781-4076-9AC9-9292B8D4C977}" type="presParOf" srcId="{C5BEA3A2-5F4E-4295-A03D-E8CECBC2E42F}" destId="{2C04EA0A-9A2F-4BC6-8888-C10C55FA1EF3}" srcOrd="0" destOrd="0" presId="urn:microsoft.com/office/officeart/2005/8/layout/orgChart1"/>
-    <dgm:cxn modelId="{F4787137-5AA2-44C7-A3F5-753674F3FDBC}" type="presParOf" srcId="{2C04EA0A-9A2F-4BC6-8888-C10C55FA1EF3}" destId="{64239F16-4F55-49BE-88DC-6966CB06462B}" srcOrd="0" destOrd="0" presId="urn:microsoft.com/office/officeart/2005/8/layout/orgChart1"/>
-    <dgm:cxn modelId="{83C0804F-B3F1-43F7-925B-8DB8FEFC3647}" type="presParOf" srcId="{2C04EA0A-9A2F-4BC6-8888-C10C55FA1EF3}" destId="{1F8F2A92-A788-4996-B95D-FEA7D1CA4756}" srcOrd="1" destOrd="0" presId="urn:microsoft.com/office/officeart/2005/8/layout/orgChart1"/>
-    <dgm:cxn modelId="{D5C9E486-0868-4F31-AB9B-AD547248424E}" type="presParOf" srcId="{C5BEA3A2-5F4E-4295-A03D-E8CECBC2E42F}" destId="{9749930A-3675-4DCD-9B9A-855CC8E95415}" srcOrd="1" destOrd="0" presId="urn:microsoft.com/office/officeart/2005/8/layout/orgChart1"/>
-    <dgm:cxn modelId="{FC9F13B7-FD5D-47F3-AC59-963B637424C5}" type="presParOf" srcId="{C5BEA3A2-5F4E-4295-A03D-E8CECBC2E42F}" destId="{6670A478-F582-4022-8810-5362BA1A6D5C}" srcOrd="2" destOrd="0" presId="urn:microsoft.com/office/officeart/2005/8/layout/orgChart1"/>
-    <dgm:cxn modelId="{F38601D9-C124-4CC2-953C-2514FF570BAA}" type="presParOf" srcId="{6670A478-F582-4022-8810-5362BA1A6D5C}" destId="{79BFB1A5-42BC-49DC-AECD-37FF5B2A9991}" srcOrd="0" destOrd="0" presId="urn:microsoft.com/office/officeart/2005/8/layout/orgChart1"/>
-    <dgm:cxn modelId="{CF7B4105-A35E-49D9-9626-5C9D8A8D4A62}" type="presParOf" srcId="{6670A478-F582-4022-8810-5362BA1A6D5C}" destId="{6469CBE3-2936-4328-8C8E-C772A7FDAFB0}" srcOrd="1" destOrd="0" presId="urn:microsoft.com/office/officeart/2005/8/layout/orgChart1"/>
-    <dgm:cxn modelId="{CFEF05BF-765B-4FA9-BBAC-C26ECE4BD472}" type="presParOf" srcId="{6469CBE3-2936-4328-8C8E-C772A7FDAFB0}" destId="{1622853C-4A65-4C51-B645-F4F2427A9AE6}" srcOrd="0" destOrd="0" presId="urn:microsoft.com/office/officeart/2005/8/layout/orgChart1"/>
-    <dgm:cxn modelId="{A5A3DC79-ACC5-497C-966B-1ADE1A0B4D21}" type="presParOf" srcId="{1622853C-4A65-4C51-B645-F4F2427A9AE6}" destId="{84A4997E-AA68-44A1-B49D-095020597CC6}" srcOrd="0" destOrd="0" presId="urn:microsoft.com/office/officeart/2005/8/layout/orgChart1"/>
-    <dgm:cxn modelId="{2A5D8F53-1848-41ED-994B-E5ABB10C0722}" type="presParOf" srcId="{1622853C-4A65-4C51-B645-F4F2427A9AE6}" destId="{D3469E18-6AE0-441F-9D81-24898BAF013F}" srcOrd="1" destOrd="0" presId="urn:microsoft.com/office/officeart/2005/8/layout/orgChart1"/>
-    <dgm:cxn modelId="{D1BFA0F3-6CD1-4DD9-8816-3D67985F2A5C}" type="presParOf" srcId="{6469CBE3-2936-4328-8C8E-C772A7FDAFB0}" destId="{47C930B1-D4FD-4FA7-9AB1-9273FBA8B826}" srcOrd="1" destOrd="0" presId="urn:microsoft.com/office/officeart/2005/8/layout/orgChart1"/>
-    <dgm:cxn modelId="{B21B6BCE-3E31-4000-B32E-41BD087AE3CD}" type="presParOf" srcId="{6469CBE3-2936-4328-8C8E-C772A7FDAFB0}" destId="{4601E1FE-E5E6-4840-811C-CDD4B3EDCDD0}" srcOrd="2" destOrd="0" presId="urn:microsoft.com/office/officeart/2005/8/layout/orgChart1"/>
-    <dgm:cxn modelId="{C50AA235-0224-4C82-9BA1-A025A5F8C766}" type="presParOf" srcId="{6670A478-F582-4022-8810-5362BA1A6D5C}" destId="{23C52E41-00C9-4660-9F7C-E79A721D2A76}" srcOrd="2" destOrd="0" presId="urn:microsoft.com/office/officeart/2005/8/layout/orgChart1"/>
-    <dgm:cxn modelId="{B5E1E42E-DE0C-414D-AEA3-319F896C0D94}" type="presParOf" srcId="{6670A478-F582-4022-8810-5362BA1A6D5C}" destId="{BCF7C666-6EA8-45C1-97D1-47F787128265}" srcOrd="3" destOrd="0" presId="urn:microsoft.com/office/officeart/2005/8/layout/orgChart1"/>
-    <dgm:cxn modelId="{37FC728D-9228-4E68-8BCB-04D17D449912}" type="presParOf" srcId="{BCF7C666-6EA8-45C1-97D1-47F787128265}" destId="{3324DC7F-D3FE-4C7B-A63C-65FB20743974}" srcOrd="0" destOrd="0" presId="urn:microsoft.com/office/officeart/2005/8/layout/orgChart1"/>
-    <dgm:cxn modelId="{47C90FB4-C05C-45D4-A3C9-7D831EBB8770}" type="presParOf" srcId="{3324DC7F-D3FE-4C7B-A63C-65FB20743974}" destId="{547EBEB2-66F4-49F2-9EC4-FE62025F48E9}" srcOrd="0" destOrd="0" presId="urn:microsoft.com/office/officeart/2005/8/layout/orgChart1"/>
-    <dgm:cxn modelId="{A9907EFE-FF33-41B2-8BE8-515DE995CB84}" type="presParOf" srcId="{3324DC7F-D3FE-4C7B-A63C-65FB20743974}" destId="{F4E85B78-B2DC-48F8-9AFD-A4121DC125FA}" srcOrd="1" destOrd="0" presId="urn:microsoft.com/office/officeart/2005/8/layout/orgChart1"/>
-    <dgm:cxn modelId="{D53B070B-F8B9-425A-A0AF-D2ECEC63B652}" type="presParOf" srcId="{BCF7C666-6EA8-45C1-97D1-47F787128265}" destId="{3258806D-B0C7-47ED-8945-A74C40DBFCF1}" srcOrd="1" destOrd="0" presId="urn:microsoft.com/office/officeart/2005/8/layout/orgChart1"/>
-    <dgm:cxn modelId="{5011144A-4650-49E9-A209-270FA252DB25}" type="presParOf" srcId="{BCF7C666-6EA8-45C1-97D1-47F787128265}" destId="{A2F5E6FA-7D86-40CB-B6AA-6898D5D568D7}" srcOrd="2" destOrd="0" presId="urn:microsoft.com/office/officeart/2005/8/layout/orgChart1"/>
-    <dgm:cxn modelId="{68B7D977-59FA-4871-BA64-D177A45A73B1}" type="presParOf" srcId="{193CF19A-CDA5-4513-B2AB-1F2847962EDB}" destId="{CAC482E8-66D6-409D-982D-D5BE40028EC1}" srcOrd="6" destOrd="0" presId="urn:microsoft.com/office/officeart/2005/8/layout/orgChart1"/>
-    <dgm:cxn modelId="{6D45B8E3-83FB-4063-B657-B3276F4C14A9}" type="presParOf" srcId="{193CF19A-CDA5-4513-B2AB-1F2847962EDB}" destId="{30822E55-6EF1-47FD-88B8-BE35AF712B54}" srcOrd="7" destOrd="0" presId="urn:microsoft.com/office/officeart/2005/8/layout/orgChart1"/>
-    <dgm:cxn modelId="{0EEF4099-2A61-4EBD-A9D7-97F02474C7A8}" type="presParOf" srcId="{30822E55-6EF1-47FD-88B8-BE35AF712B54}" destId="{E5621E7C-A655-4C96-819F-54511D8A7EC2}" srcOrd="0" destOrd="0" presId="urn:microsoft.com/office/officeart/2005/8/layout/orgChart1"/>
-    <dgm:cxn modelId="{DE9599C6-FEF0-43D6-97C8-0387DFDFB509}" type="presParOf" srcId="{E5621E7C-A655-4C96-819F-54511D8A7EC2}" destId="{2C1A0EB1-97B2-4B4E-9148-A93F6736BFB2}" srcOrd="0" destOrd="0" presId="urn:microsoft.com/office/officeart/2005/8/layout/orgChart1"/>
-    <dgm:cxn modelId="{792D0300-E1DB-4974-9C53-2D2C22498789}" type="presParOf" srcId="{E5621E7C-A655-4C96-819F-54511D8A7EC2}" destId="{19EA03CC-C570-4B80-AF63-88BC9FD1AF94}" srcOrd="1" destOrd="0" presId="urn:microsoft.com/office/officeart/2005/8/layout/orgChart1"/>
-    <dgm:cxn modelId="{945703FF-E15B-46E6-9462-FCF9FE559507}" type="presParOf" srcId="{30822E55-6EF1-47FD-88B8-BE35AF712B54}" destId="{75B01115-03B5-4CBC-A3C0-5790BAEE5CC7}" srcOrd="1" destOrd="0" presId="urn:microsoft.com/office/officeart/2005/8/layout/orgChart1"/>
-    <dgm:cxn modelId="{BFD2C272-2ECB-4E13-A734-E0A6F3CE8300}" type="presParOf" srcId="{30822E55-6EF1-47FD-88B8-BE35AF712B54}" destId="{6560CCD2-927B-49E0-BA15-F8103F56444F}" srcOrd="2" destOrd="0" presId="urn:microsoft.com/office/officeart/2005/8/layout/orgChart1"/>
-    <dgm:cxn modelId="{85BB4E17-CEBA-4C97-9E42-6CBA1040221A}" type="presParOf" srcId="{6560CCD2-927B-49E0-BA15-F8103F56444F}" destId="{9671D427-A6CF-4FBB-A364-F2B641BA1AA4}" srcOrd="0" destOrd="0" presId="urn:microsoft.com/office/officeart/2005/8/layout/orgChart1"/>
-    <dgm:cxn modelId="{74DD7FBE-9BB7-4113-A575-ACB6A811B965}" type="presParOf" srcId="{6560CCD2-927B-49E0-BA15-F8103F56444F}" destId="{3FA6A51C-AC81-4173-98F0-902A56345BD9}" srcOrd="1" destOrd="0" presId="urn:microsoft.com/office/officeart/2005/8/layout/orgChart1"/>
-    <dgm:cxn modelId="{0C0163E1-DD89-441E-AAD7-A72BC7B701AF}" type="presParOf" srcId="{3FA6A51C-AC81-4173-98F0-902A56345BD9}" destId="{712FDEBD-26A1-40C1-95A6-1A0A16B77E49}" srcOrd="0" destOrd="0" presId="urn:microsoft.com/office/officeart/2005/8/layout/orgChart1"/>
-    <dgm:cxn modelId="{02F68698-BF39-4C7A-9EB2-0FD37E2E04AA}" type="presParOf" srcId="{712FDEBD-26A1-40C1-95A6-1A0A16B77E49}" destId="{97D0B171-D747-4050-93EA-AFF2D46A22E5}" srcOrd="0" destOrd="0" presId="urn:microsoft.com/office/officeart/2005/8/layout/orgChart1"/>
-    <dgm:cxn modelId="{62D23CAF-25B3-4B8D-B20F-8D0EB1709351}" type="presParOf" srcId="{712FDEBD-26A1-40C1-95A6-1A0A16B77E49}" destId="{3CF4E510-507E-403B-8F16-C215BF693818}" srcOrd="1" destOrd="0" presId="urn:microsoft.com/office/officeart/2005/8/layout/orgChart1"/>
-    <dgm:cxn modelId="{8581C4BF-E3B5-4010-8601-23D3BA02C58E}" type="presParOf" srcId="{3FA6A51C-AC81-4173-98F0-902A56345BD9}" destId="{6F0E5D34-D03E-402C-A596-BA6F59196352}" srcOrd="1" destOrd="0" presId="urn:microsoft.com/office/officeart/2005/8/layout/orgChart1"/>
-    <dgm:cxn modelId="{D8FFA9E3-D1AC-4675-B99A-7B68D86A7F92}" type="presParOf" srcId="{3FA6A51C-AC81-4173-98F0-902A56345BD9}" destId="{3CEE8101-A518-4E95-9155-780D93A7D6D6}" srcOrd="2" destOrd="0" presId="urn:microsoft.com/office/officeart/2005/8/layout/orgChart1"/>
-    <dgm:cxn modelId="{044C7B64-7511-4E08-9ABD-ECBBF3A90F44}" type="presParOf" srcId="{6560CCD2-927B-49E0-BA15-F8103F56444F}" destId="{7C1BB281-B26B-4876-817A-BA65908F0D9E}" srcOrd="2" destOrd="0" presId="urn:microsoft.com/office/officeart/2005/8/layout/orgChart1"/>
-    <dgm:cxn modelId="{0F757D04-C5CE-41D3-BD4D-81368176382C}" type="presParOf" srcId="{6560CCD2-927B-49E0-BA15-F8103F56444F}" destId="{06395DF6-541B-4A2E-BA4F-AD9A6EDADEC7}" srcOrd="3" destOrd="0" presId="urn:microsoft.com/office/officeart/2005/8/layout/orgChart1"/>
-    <dgm:cxn modelId="{1C0F3DA0-10A6-4900-8563-C2BF0B291DA1}" type="presParOf" srcId="{06395DF6-541B-4A2E-BA4F-AD9A6EDADEC7}" destId="{A41E8D22-DFF8-4C64-BA2F-E04FEDDA0162}" srcOrd="0" destOrd="0" presId="urn:microsoft.com/office/officeart/2005/8/layout/orgChart1"/>
-    <dgm:cxn modelId="{E476A3D5-5328-44EC-BBA1-95325E88F571}" type="presParOf" srcId="{A41E8D22-DFF8-4C64-BA2F-E04FEDDA0162}" destId="{1E030A24-C840-4CA4-93A9-7740A2A70080}" srcOrd="0" destOrd="0" presId="urn:microsoft.com/office/officeart/2005/8/layout/orgChart1"/>
-    <dgm:cxn modelId="{1EEC9FEF-51B0-44F3-A6B9-C49DAAC3AC66}" type="presParOf" srcId="{A41E8D22-DFF8-4C64-BA2F-E04FEDDA0162}" destId="{46664753-ABD3-43ED-A8BE-0DDC61EC6682}" srcOrd="1" destOrd="0" presId="urn:microsoft.com/office/officeart/2005/8/layout/orgChart1"/>
-    <dgm:cxn modelId="{61542B00-55F3-4A82-857F-B87F61F647B2}" type="presParOf" srcId="{06395DF6-541B-4A2E-BA4F-AD9A6EDADEC7}" destId="{0CBF2825-2B36-40D5-B657-2E32D7DBE3B3}" srcOrd="1" destOrd="0" presId="urn:microsoft.com/office/officeart/2005/8/layout/orgChart1"/>
-    <dgm:cxn modelId="{9E1295AC-CBF8-47DD-AE2C-71CDE0FFC927}" type="presParOf" srcId="{06395DF6-541B-4A2E-BA4F-AD9A6EDADEC7}" destId="{7667CBEA-AEE5-4B13-8F40-07074D18B94C}" srcOrd="2" destOrd="0" presId="urn:microsoft.com/office/officeart/2005/8/layout/orgChart1"/>
-    <dgm:cxn modelId="{F220E18D-A3B5-43F2-9634-AA946370F6C4}" type="presParOf" srcId="{193CF19A-CDA5-4513-B2AB-1F2847962EDB}" destId="{7B569ED8-109D-48C6-82EA-DD90994E2391}" srcOrd="8" destOrd="0" presId="urn:microsoft.com/office/officeart/2005/8/layout/orgChart1"/>
-    <dgm:cxn modelId="{FB891719-D940-4083-B7AC-FABC4449B829}" type="presParOf" srcId="{193CF19A-CDA5-4513-B2AB-1F2847962EDB}" destId="{E2AD70A4-3565-4CC0-B164-8581C6A82CC5}" srcOrd="9" destOrd="0" presId="urn:microsoft.com/office/officeart/2005/8/layout/orgChart1"/>
-    <dgm:cxn modelId="{08B87D84-B462-483C-90F4-761BF77E588A}" type="presParOf" srcId="{E2AD70A4-3565-4CC0-B164-8581C6A82CC5}" destId="{FF5F8DDD-DA52-4233-80B5-F2BF1E5C563F}" srcOrd="0" destOrd="0" presId="urn:microsoft.com/office/officeart/2005/8/layout/orgChart1"/>
-    <dgm:cxn modelId="{B4F06C65-751C-415E-85FA-1E79783A6422}" type="presParOf" srcId="{FF5F8DDD-DA52-4233-80B5-F2BF1E5C563F}" destId="{FBDFA012-C5E2-4143-AC77-97EC51731B91}" srcOrd="0" destOrd="0" presId="urn:microsoft.com/office/officeart/2005/8/layout/orgChart1"/>
-    <dgm:cxn modelId="{3F79F3C4-1AAB-47AD-AE4E-8B2802A2CC46}" type="presParOf" srcId="{FF5F8DDD-DA52-4233-80B5-F2BF1E5C563F}" destId="{6F652C23-9AC9-4AA3-86DF-E7FA7DAEC046}" srcOrd="1" destOrd="0" presId="urn:microsoft.com/office/officeart/2005/8/layout/orgChart1"/>
-    <dgm:cxn modelId="{C49B5FFF-F56C-43B2-999C-BB5BB15A2FAD}" type="presParOf" srcId="{E2AD70A4-3565-4CC0-B164-8581C6A82CC5}" destId="{0455B36A-F8DD-4EC9-82AF-0AAFE8064D44}" srcOrd="1" destOrd="0" presId="urn:microsoft.com/office/officeart/2005/8/layout/orgChart1"/>
-    <dgm:cxn modelId="{737E2D66-FBA7-40AA-856A-C2F231F4184C}" type="presParOf" srcId="{E2AD70A4-3565-4CC0-B164-8581C6A82CC5}" destId="{6881D86F-9149-45AB-BC40-311179E34C3E}" srcOrd="2" destOrd="0" presId="urn:microsoft.com/office/officeart/2005/8/layout/orgChart1"/>
-    <dgm:cxn modelId="{FCC9BDB8-B663-4009-BAB6-0544BC4C981D}" type="presParOf" srcId="{193CF19A-CDA5-4513-B2AB-1F2847962EDB}" destId="{1FC65B10-387B-4A7F-A3F3-649FCE8FF37C}" srcOrd="10" destOrd="0" presId="urn:microsoft.com/office/officeart/2005/8/layout/orgChart1"/>
-    <dgm:cxn modelId="{6D30E9EB-082C-44C4-A84E-32027055A8D8}" type="presParOf" srcId="{193CF19A-CDA5-4513-B2AB-1F2847962EDB}" destId="{E94EE334-8E19-4CDC-BF57-FBCB5332D7F5}" srcOrd="11" destOrd="0" presId="urn:microsoft.com/office/officeart/2005/8/layout/orgChart1"/>
-    <dgm:cxn modelId="{418C1DB8-0463-4258-9D11-2983ECBAF7C1}" type="presParOf" srcId="{E94EE334-8E19-4CDC-BF57-FBCB5332D7F5}" destId="{6A3305EA-EA88-439E-B261-16E068E73801}" srcOrd="0" destOrd="0" presId="urn:microsoft.com/office/officeart/2005/8/layout/orgChart1"/>
-    <dgm:cxn modelId="{0D4B037D-FA16-49F3-8628-0E8E6986D772}" type="presParOf" srcId="{6A3305EA-EA88-439E-B261-16E068E73801}" destId="{6EEA9D6A-07CA-4B8D-9992-7C70A1A8C11D}" srcOrd="0" destOrd="0" presId="urn:microsoft.com/office/officeart/2005/8/layout/orgChart1"/>
-    <dgm:cxn modelId="{4449010D-3F94-41BA-8ADD-42DE2A610CD0}" type="presParOf" srcId="{6A3305EA-EA88-439E-B261-16E068E73801}" destId="{BD04605A-89DC-4A3F-81F7-CB090B7F61D0}" srcOrd="1" destOrd="0" presId="urn:microsoft.com/office/officeart/2005/8/layout/orgChart1"/>
-    <dgm:cxn modelId="{CC06BB5D-2316-477A-81BB-EDAC91EADE3D}" type="presParOf" srcId="{E94EE334-8E19-4CDC-BF57-FBCB5332D7F5}" destId="{424803A1-94D1-4E22-A476-AEF2329BB8E5}" srcOrd="1" destOrd="0" presId="urn:microsoft.com/office/officeart/2005/8/layout/orgChart1"/>
-    <dgm:cxn modelId="{A62EEA38-9884-4749-A039-4061F9056214}" type="presParOf" srcId="{E94EE334-8E19-4CDC-BF57-FBCB5332D7F5}" destId="{49FD9BA5-C901-4889-A9EA-38EBB531FA14}" srcOrd="2" destOrd="0" presId="urn:microsoft.com/office/officeart/2005/8/layout/orgChart1"/>
-    <dgm:cxn modelId="{AE4BCA4E-0F12-4B84-90C1-9A94ED64805B}" type="presParOf" srcId="{49FD9BA5-C901-4889-A9EA-38EBB531FA14}" destId="{311E2D49-366F-4190-95E5-6F15586CB528}" srcOrd="0" destOrd="0" presId="urn:microsoft.com/office/officeart/2005/8/layout/orgChart1"/>
-    <dgm:cxn modelId="{F26C875A-BCEC-4D51-9FC4-C3AE19D67BFE}" type="presParOf" srcId="{49FD9BA5-C901-4889-A9EA-38EBB531FA14}" destId="{8125067C-719E-4C5A-996F-E0D9208985A6}" srcOrd="1" destOrd="0" presId="urn:microsoft.com/office/officeart/2005/8/layout/orgChart1"/>
-    <dgm:cxn modelId="{E623030B-89EC-4EDD-A875-52074E633F19}" type="presParOf" srcId="{8125067C-719E-4C5A-996F-E0D9208985A6}" destId="{AB9916E6-8FFF-4344-9C82-4E8EDC430910}" srcOrd="0" destOrd="0" presId="urn:microsoft.com/office/officeart/2005/8/layout/orgChart1"/>
-    <dgm:cxn modelId="{54386372-47BB-4047-83EB-897BAAA68FF6}" type="presParOf" srcId="{AB9916E6-8FFF-4344-9C82-4E8EDC430910}" destId="{16628B9F-A31E-415A-8135-4F45991C26C3}" srcOrd="0" destOrd="0" presId="urn:microsoft.com/office/officeart/2005/8/layout/orgChart1"/>
-    <dgm:cxn modelId="{7FFC583F-7CAF-4BF3-9D38-012E385EBD27}" type="presParOf" srcId="{AB9916E6-8FFF-4344-9C82-4E8EDC430910}" destId="{A9D98AA6-E990-4E97-8EEC-85D241C3D839}" srcOrd="1" destOrd="0" presId="urn:microsoft.com/office/officeart/2005/8/layout/orgChart1"/>
-    <dgm:cxn modelId="{8098B24A-A2D1-44BD-B2C0-78031E529181}" type="presParOf" srcId="{8125067C-719E-4C5A-996F-E0D9208985A6}" destId="{F892A149-FF04-4AA8-A1BA-32346A72EB84}" srcOrd="1" destOrd="0" presId="urn:microsoft.com/office/officeart/2005/8/layout/orgChart1"/>
-    <dgm:cxn modelId="{FF5F4703-F170-4E6A-8FDC-2DA6ADC67BA6}" type="presParOf" srcId="{8125067C-719E-4C5A-996F-E0D9208985A6}" destId="{CF696F0C-6360-49C2-9A6E-02C5D5857EBB}" srcOrd="2" destOrd="0" presId="urn:microsoft.com/office/officeart/2005/8/layout/orgChart1"/>
-    <dgm:cxn modelId="{4172175F-FB33-42B2-82C5-73CD523B0AEB}" type="presParOf" srcId="{49FD9BA5-C901-4889-A9EA-38EBB531FA14}" destId="{B8608039-4254-4A97-8BFD-8608AB477D8E}" srcOrd="2" destOrd="0" presId="urn:microsoft.com/office/officeart/2005/8/layout/orgChart1"/>
-    <dgm:cxn modelId="{25C13524-4F83-4471-B563-F9C32E662BAC}" type="presParOf" srcId="{49FD9BA5-C901-4889-A9EA-38EBB531FA14}" destId="{0DF323CF-6FD4-4D89-BE5E-58BB7BB71D9D}" srcOrd="3" destOrd="0" presId="urn:microsoft.com/office/officeart/2005/8/layout/orgChart1"/>
-    <dgm:cxn modelId="{8A9ADE5C-ABC5-4E4C-9EA9-EC355806D532}" type="presParOf" srcId="{0DF323CF-6FD4-4D89-BE5E-58BB7BB71D9D}" destId="{A316D519-3010-4C01-BAE1-9C7DE3F92EAF}" srcOrd="0" destOrd="0" presId="urn:microsoft.com/office/officeart/2005/8/layout/orgChart1"/>
-    <dgm:cxn modelId="{CB075897-3D5B-41AE-9939-ECA3E76FCB8F}" type="presParOf" srcId="{A316D519-3010-4C01-BAE1-9C7DE3F92EAF}" destId="{D7E7819D-BE5A-4C2D-863E-98D41FCE3D35}" srcOrd="0" destOrd="0" presId="urn:microsoft.com/office/officeart/2005/8/layout/orgChart1"/>
-    <dgm:cxn modelId="{37D893C7-2344-4521-9A71-309350E5852E}" type="presParOf" srcId="{A316D519-3010-4C01-BAE1-9C7DE3F92EAF}" destId="{F4D0992F-9E35-4D0D-8545-12F9406D67C3}" srcOrd="1" destOrd="0" presId="urn:microsoft.com/office/officeart/2005/8/layout/orgChart1"/>
-    <dgm:cxn modelId="{F5AC8C09-FF4B-45C7-A9B5-7BB77D7E843F}" type="presParOf" srcId="{0DF323CF-6FD4-4D89-BE5E-58BB7BB71D9D}" destId="{0E240242-9938-4D80-9036-ADBE56C12AA4}" srcOrd="1" destOrd="0" presId="urn:microsoft.com/office/officeart/2005/8/layout/orgChart1"/>
-    <dgm:cxn modelId="{7D0D5579-B3C6-473D-897C-33778121C5F4}" type="presParOf" srcId="{0DF323CF-6FD4-4D89-BE5E-58BB7BB71D9D}" destId="{70396BA3-1ADA-4D26-92D0-48E0BD0029D2}" srcOrd="2" destOrd="0" presId="urn:microsoft.com/office/officeart/2005/8/layout/orgChart1"/>
-    <dgm:cxn modelId="{AF61363A-2188-40B5-ACAE-FD1A45313773}" type="presParOf" srcId="{49FD9BA5-C901-4889-A9EA-38EBB531FA14}" destId="{D26D02D2-9E33-4537-8ECE-AA6EE0F4548F}" srcOrd="4" destOrd="0" presId="urn:microsoft.com/office/officeart/2005/8/layout/orgChart1"/>
-    <dgm:cxn modelId="{58A15A9D-912F-41CF-B21F-ED57B111CC3C}" type="presParOf" srcId="{49FD9BA5-C901-4889-A9EA-38EBB531FA14}" destId="{0FF1C009-348D-4AC4-9BD5-8E394343D68E}" srcOrd="5" destOrd="0" presId="urn:microsoft.com/office/officeart/2005/8/layout/orgChart1"/>
-    <dgm:cxn modelId="{3427DD44-FE7D-4910-AB2E-D40DE040C6D3}" type="presParOf" srcId="{0FF1C009-348D-4AC4-9BD5-8E394343D68E}" destId="{4F225052-3F30-4F3F-BD33-6D7214D83DEB}" srcOrd="0" destOrd="0" presId="urn:microsoft.com/office/officeart/2005/8/layout/orgChart1"/>
-    <dgm:cxn modelId="{CFD8D544-6DB2-477C-95B7-162AC703B1FE}" type="presParOf" srcId="{4F225052-3F30-4F3F-BD33-6D7214D83DEB}" destId="{B8A0060D-18B6-436B-8EE4-4E837AA06BE6}" srcOrd="0" destOrd="0" presId="urn:microsoft.com/office/officeart/2005/8/layout/orgChart1"/>
-    <dgm:cxn modelId="{23DC1616-C04E-40AF-B87C-07D81E9F005D}" type="presParOf" srcId="{4F225052-3F30-4F3F-BD33-6D7214D83DEB}" destId="{9B41113E-3BAB-49D9-A5A7-3BD921A74B53}" srcOrd="1" destOrd="0" presId="urn:microsoft.com/office/officeart/2005/8/layout/orgChart1"/>
-    <dgm:cxn modelId="{FBDA55F9-BBC8-4E1E-8E4B-FC1994CDCACA}" type="presParOf" srcId="{0FF1C009-348D-4AC4-9BD5-8E394343D68E}" destId="{9D8E6859-1B81-40A8-8EB2-CDECFEA0B696}" srcOrd="1" destOrd="0" presId="urn:microsoft.com/office/officeart/2005/8/layout/orgChart1"/>
-    <dgm:cxn modelId="{244751BF-D7EC-4AA5-8BAB-16C1DCCB940B}" type="presParOf" srcId="{0FF1C009-348D-4AC4-9BD5-8E394343D68E}" destId="{BE8D54E2-CBC5-457D-BD83-7E0DA616A21F}" srcOrd="2" destOrd="0" presId="urn:microsoft.com/office/officeart/2005/8/layout/orgChart1"/>
+    <dgm:cxn modelId="{3074C82E-1130-4433-82EE-0F9300533605}" type="presOf" srcId="{A97E5E2E-ED55-4E69-BD13-1911951DA18F}" destId="{7C7D2C7E-8266-41A9-B7F0-0E6D7FA2CAAE}" srcOrd="0" destOrd="0" presId="urn:microsoft.com/office/officeart/2005/8/layout/orgChart1"/>
+    <dgm:cxn modelId="{2F9156A3-63F9-4E70-A6CB-25966DC88CE2}" srcId="{A97E5E2E-ED55-4E69-BD13-1911951DA18F}" destId="{AF11656C-4FE8-4560-B8B1-F5FBDF16A4EE}" srcOrd="4" destOrd="0" parTransId="{8E8E8CD9-99B5-4652-AD5D-4F2C537D4E66}" sibTransId="{818FE496-2610-4080-9B94-2CE3FF4475F7}"/>
+    <dgm:cxn modelId="{3FE7A371-A5E2-4DCB-9788-DFD86DA3D732}" type="presOf" srcId="{B19DC9A7-610C-4A48-8810-E75EBF37A42F}" destId="{B180B330-3089-44ED-BFDC-2199E241C39E}" srcOrd="0" destOrd="0" presId="urn:microsoft.com/office/officeart/2005/8/layout/orgChart1"/>
+    <dgm:cxn modelId="{3A8B15A8-B2B6-4742-933B-A89ACB6644CA}" type="presOf" srcId="{6015B824-730D-469F-A2C7-F2FC0FC2833A}" destId="{B20FF7CE-438F-4BD1-A0E9-7EC4E918C8F8}" srcOrd="1" destOrd="0" presId="urn:microsoft.com/office/officeart/2005/8/layout/orgChart1"/>
+    <dgm:cxn modelId="{0583FC3F-D3EC-4AF5-988F-5DAC5068C098}" srcId="{B19DC9A7-610C-4A48-8810-E75EBF37A42F}" destId="{A97E5E2E-ED55-4E69-BD13-1911951DA18F}" srcOrd="0" destOrd="0" parTransId="{B6AFF7E3-757B-4AA6-B0AC-2C07A1ECB43B}" sibTransId="{17260005-1550-4918-9422-23453F465509}"/>
+    <dgm:cxn modelId="{1A5E14D6-F6B8-4971-8400-A51DAF7A54B7}" type="presOf" srcId="{9E44B917-975A-4930-A553-33451827BF43}" destId="{66CCEE48-8CA8-44DB-85E2-34D6AF639985}" srcOrd="0" destOrd="0" presId="urn:microsoft.com/office/officeart/2005/8/layout/orgChart1"/>
+    <dgm:cxn modelId="{98415D45-757C-40EF-BBB4-3110935FE062}" type="presOf" srcId="{B84CDA71-2B05-4FF3-B9DE-6738078FD03C}" destId="{7C705CD8-85A3-410A-B3AC-1F896FE7E6B5}" srcOrd="0" destOrd="0" presId="urn:microsoft.com/office/officeart/2005/8/layout/orgChart1"/>
+    <dgm:cxn modelId="{EF536997-D766-446D-8FF2-4DCE3B1B45A1}" type="presOf" srcId="{79F72359-2A5D-45D9-BC20-81FA3BEAECC5}" destId="{3E1E9609-3069-4C9F-A138-450DE62CF0F1}" srcOrd="0" destOrd="0" presId="urn:microsoft.com/office/officeart/2005/8/layout/orgChart1"/>
+    <dgm:cxn modelId="{207440B3-98DD-4203-A7B3-83A7B676E671}" type="presOf" srcId="{5D1F6F73-40FE-43DA-970C-7F2E380842FA}" destId="{20ED53F9-7948-4F65-A333-7291D67269E2}" srcOrd="1" destOrd="0" presId="urn:microsoft.com/office/officeart/2005/8/layout/orgChart1"/>
+    <dgm:cxn modelId="{4A478809-2E2A-4C97-A3E6-AFEEEFECE707}" type="presOf" srcId="{D6823304-69A5-409B-AE13-574908B3BE83}" destId="{1280358D-5C16-49D0-93E5-A29B636B6D27}" srcOrd="0" destOrd="0" presId="urn:microsoft.com/office/officeart/2005/8/layout/orgChart1"/>
+    <dgm:cxn modelId="{B3C398FF-8B4A-44C8-AFC8-DBC632FA5847}" type="presOf" srcId="{5D1F6F73-40FE-43DA-970C-7F2E380842FA}" destId="{6A17E83B-A51A-48BF-AEAB-13C83E0E1E3D}" srcOrd="0" destOrd="0" presId="urn:microsoft.com/office/officeart/2005/8/layout/orgChart1"/>
+    <dgm:cxn modelId="{2DF1595D-6610-4F8F-B4C3-A2A77030DBA0}" type="presOf" srcId="{8E8E8CD9-99B5-4652-AD5D-4F2C537D4E66}" destId="{DE86A25E-3391-4FC7-AF41-4E6256991058}" srcOrd="0" destOrd="0" presId="urn:microsoft.com/office/officeart/2005/8/layout/orgChart1"/>
+    <dgm:cxn modelId="{87F73A7A-8350-441E-AAF6-F87B93185265}" type="presOf" srcId="{D6823304-69A5-409B-AE13-574908B3BE83}" destId="{EB5F4D9D-A1B8-476C-95BB-BCF550B4E885}" srcOrd="1" destOrd="0" presId="urn:microsoft.com/office/officeart/2005/8/layout/orgChart1"/>
+    <dgm:cxn modelId="{F0802F7B-4741-45F7-8C47-DC90BB1CDE8B}" type="presOf" srcId="{A9CD4C57-9B4C-41A0-8289-F4D11843F47A}" destId="{D43BC50E-2873-49AA-B25B-120155FA3219}" srcOrd="1" destOrd="0" presId="urn:microsoft.com/office/officeart/2005/8/layout/orgChart1"/>
+    <dgm:cxn modelId="{A1877050-F5C3-4D30-97EB-609176417691}" type="presOf" srcId="{AF11656C-4FE8-4560-B8B1-F5FBDF16A4EE}" destId="{56BBB9BA-E45F-40AF-A212-67D77FF51EAC}" srcOrd="0" destOrd="0" presId="urn:microsoft.com/office/officeart/2005/8/layout/orgChart1"/>
+    <dgm:cxn modelId="{E015E450-6D38-4407-9500-EC7386950A35}" type="presOf" srcId="{A8A4DDBB-0C24-4CC0-BD4F-DA78F4128661}" destId="{DF59ECB3-FA60-4AF3-ADB4-DD157DE2D6E5}" srcOrd="0" destOrd="0" presId="urn:microsoft.com/office/officeart/2005/8/layout/orgChart1"/>
+    <dgm:cxn modelId="{CC57A906-6F9F-4047-A08F-2A4AB1621342}" type="presOf" srcId="{A9CD4C57-9B4C-41A0-8289-F4D11843F47A}" destId="{C8EF3C95-F073-43EA-8A54-504A01F394B5}" srcOrd="0" destOrd="0" presId="urn:microsoft.com/office/officeart/2005/8/layout/orgChart1"/>
+    <dgm:cxn modelId="{D2D8C062-EA47-47BC-8575-8A56B95DC9ED}" srcId="{A97E5E2E-ED55-4E69-BD13-1911951DA18F}" destId="{D6823304-69A5-409B-AE13-574908B3BE83}" srcOrd="3" destOrd="0" parTransId="{9E44B917-975A-4930-A553-33451827BF43}" sibTransId="{B39B0788-C57D-4F6F-9C32-7D71F8284458}"/>
+    <dgm:cxn modelId="{AC930BEC-3FB6-4247-A45C-58BCED9F56F2}" type="presOf" srcId="{6015B824-730D-469F-A2C7-F2FC0FC2833A}" destId="{5768DA00-30DE-4444-B4E5-B3EF52F0821A}" srcOrd="0" destOrd="0" presId="urn:microsoft.com/office/officeart/2005/8/layout/orgChart1"/>
+    <dgm:cxn modelId="{FE727BA8-73AE-484B-A6F3-2B1828E3312D}" srcId="{A97E5E2E-ED55-4E69-BD13-1911951DA18F}" destId="{5D1F6F73-40FE-43DA-970C-7F2E380842FA}" srcOrd="0" destOrd="0" parTransId="{A8A4DDBB-0C24-4CC0-BD4F-DA78F4128661}" sibTransId="{E91ACD3F-6F59-4A37-B909-7BEA7824FC9A}"/>
+    <dgm:cxn modelId="{290F04D7-D81B-4B01-8651-81A87F11814A}" srcId="{A97E5E2E-ED55-4E69-BD13-1911951DA18F}" destId="{A9CD4C57-9B4C-41A0-8289-F4D11843F47A}" srcOrd="2" destOrd="0" parTransId="{B84CDA71-2B05-4FF3-B9DE-6738078FD03C}" sibTransId="{F942E3A9-C219-4097-88B4-FB1BAE669E61}"/>
+    <dgm:cxn modelId="{189AE080-9540-43F6-BB0E-85C14AD9BA8C}" type="presOf" srcId="{AF11656C-4FE8-4560-B8B1-F5FBDF16A4EE}" destId="{3B6B2862-BDCA-4946-A920-B2413AD4A356}" srcOrd="1" destOrd="0" presId="urn:microsoft.com/office/officeart/2005/8/layout/orgChart1"/>
+    <dgm:cxn modelId="{0202E1BA-4E10-4601-B767-9276E6AD17D8}" srcId="{A97E5E2E-ED55-4E69-BD13-1911951DA18F}" destId="{6015B824-730D-469F-A2C7-F2FC0FC2833A}" srcOrd="1" destOrd="0" parTransId="{79F72359-2A5D-45D9-BC20-81FA3BEAECC5}" sibTransId="{A84CDBB8-4C23-4817-A576-415D883080E5}"/>
+    <dgm:cxn modelId="{8660B3CA-051B-4F04-9E1A-928839D06752}" type="presOf" srcId="{A97E5E2E-ED55-4E69-BD13-1911951DA18F}" destId="{90CFF9E7-D2DE-4A24-B2EE-D2BC4135F735}" srcOrd="1" destOrd="0" presId="urn:microsoft.com/office/officeart/2005/8/layout/orgChart1"/>
+    <dgm:cxn modelId="{0E07982D-DA5C-482E-8E7B-25DB538C9B41}" type="presParOf" srcId="{B180B330-3089-44ED-BFDC-2199E241C39E}" destId="{29B0EF56-2AA5-4076-8399-B374591DE18A}" srcOrd="0" destOrd="0" presId="urn:microsoft.com/office/officeart/2005/8/layout/orgChart1"/>
+    <dgm:cxn modelId="{CC97CCB9-18F9-4FBC-A3C4-6E150ACF17E8}" type="presParOf" srcId="{29B0EF56-2AA5-4076-8399-B374591DE18A}" destId="{96BB7865-FF8B-4908-8B11-21449F159097}" srcOrd="0" destOrd="0" presId="urn:microsoft.com/office/officeart/2005/8/layout/orgChart1"/>
+    <dgm:cxn modelId="{EADAF893-8DF4-4432-A6C7-3DE06DE178BD}" type="presParOf" srcId="{96BB7865-FF8B-4908-8B11-21449F159097}" destId="{7C7D2C7E-8266-41A9-B7F0-0E6D7FA2CAAE}" srcOrd="0" destOrd="0" presId="urn:microsoft.com/office/officeart/2005/8/layout/orgChart1"/>
+    <dgm:cxn modelId="{5EE224EB-87D6-4C4F-8C55-2075798B21E6}" type="presParOf" srcId="{96BB7865-FF8B-4908-8B11-21449F159097}" destId="{90CFF9E7-D2DE-4A24-B2EE-D2BC4135F735}" srcOrd="1" destOrd="0" presId="urn:microsoft.com/office/officeart/2005/8/layout/orgChart1"/>
+    <dgm:cxn modelId="{AC60C082-0ECE-4573-B8B2-086B202372D2}" type="presParOf" srcId="{29B0EF56-2AA5-4076-8399-B374591DE18A}" destId="{2E603EAC-4888-42A8-82E5-BD74853F7660}" srcOrd="1" destOrd="0" presId="urn:microsoft.com/office/officeart/2005/8/layout/orgChart1"/>
+    <dgm:cxn modelId="{667BC358-0211-4CA0-A6D2-884BE2DE21F7}" type="presParOf" srcId="{2E603EAC-4888-42A8-82E5-BD74853F7660}" destId="{3E1E9609-3069-4C9F-A138-450DE62CF0F1}" srcOrd="0" destOrd="0" presId="urn:microsoft.com/office/officeart/2005/8/layout/orgChart1"/>
+    <dgm:cxn modelId="{DCD4E81F-F128-4A0B-9EF8-3799C7F20D61}" type="presParOf" srcId="{2E603EAC-4888-42A8-82E5-BD74853F7660}" destId="{212F956F-969A-443B-9139-2137CC9A9AC0}" srcOrd="1" destOrd="0" presId="urn:microsoft.com/office/officeart/2005/8/layout/orgChart1"/>
+    <dgm:cxn modelId="{B61AF3FC-C79E-4FBB-8E5F-0D9BC20C8A65}" type="presParOf" srcId="{212F956F-969A-443B-9139-2137CC9A9AC0}" destId="{103DEDF5-BF94-4015-A73C-98D905D3386F}" srcOrd="0" destOrd="0" presId="urn:microsoft.com/office/officeart/2005/8/layout/orgChart1"/>
+    <dgm:cxn modelId="{C0A6ABD7-C93F-4626-8EA0-2C1002FDDD91}" type="presParOf" srcId="{103DEDF5-BF94-4015-A73C-98D905D3386F}" destId="{5768DA00-30DE-4444-B4E5-B3EF52F0821A}" srcOrd="0" destOrd="0" presId="urn:microsoft.com/office/officeart/2005/8/layout/orgChart1"/>
+    <dgm:cxn modelId="{B7D30AFA-6BC8-4C87-B810-787D079292B4}" type="presParOf" srcId="{103DEDF5-BF94-4015-A73C-98D905D3386F}" destId="{B20FF7CE-438F-4BD1-A0E9-7EC4E918C8F8}" srcOrd="1" destOrd="0" presId="urn:microsoft.com/office/officeart/2005/8/layout/orgChart1"/>
+    <dgm:cxn modelId="{8BB0EDC9-6B09-4316-96A0-1B93EBF4E8F8}" type="presParOf" srcId="{212F956F-969A-443B-9139-2137CC9A9AC0}" destId="{2FFFCB1E-90DD-4B97-9299-18EF8355B94D}" srcOrd="1" destOrd="0" presId="urn:microsoft.com/office/officeart/2005/8/layout/orgChart1"/>
+    <dgm:cxn modelId="{3736201C-7111-4405-8762-CE1DA6572B09}" type="presParOf" srcId="{212F956F-969A-443B-9139-2137CC9A9AC0}" destId="{2842FC25-9A77-4A39-BB99-921D3ABBBCEA}" srcOrd="2" destOrd="0" presId="urn:microsoft.com/office/officeart/2005/8/layout/orgChart1"/>
+    <dgm:cxn modelId="{58BB72F2-4CCF-43CB-A56A-624EE5C51F41}" type="presParOf" srcId="{2E603EAC-4888-42A8-82E5-BD74853F7660}" destId="{7C705CD8-85A3-410A-B3AC-1F896FE7E6B5}" srcOrd="2" destOrd="0" presId="urn:microsoft.com/office/officeart/2005/8/layout/orgChart1"/>
+    <dgm:cxn modelId="{56CB61E9-4E72-4770-A7D9-45503DD62451}" type="presParOf" srcId="{2E603EAC-4888-42A8-82E5-BD74853F7660}" destId="{A118E8C6-79D8-40B5-A76F-3854EDDE8615}" srcOrd="3" destOrd="0" presId="urn:microsoft.com/office/officeart/2005/8/layout/orgChart1"/>
+    <dgm:cxn modelId="{57882575-C59F-4A8D-855D-4DF6A5864420}" type="presParOf" srcId="{A118E8C6-79D8-40B5-A76F-3854EDDE8615}" destId="{5049A462-7017-4E0F-A697-7060931CED6E}" srcOrd="0" destOrd="0" presId="urn:microsoft.com/office/officeart/2005/8/layout/orgChart1"/>
+    <dgm:cxn modelId="{FDA84D4B-245C-4D57-B1DD-A6598B8F110E}" type="presParOf" srcId="{5049A462-7017-4E0F-A697-7060931CED6E}" destId="{C8EF3C95-F073-43EA-8A54-504A01F394B5}" srcOrd="0" destOrd="0" presId="urn:microsoft.com/office/officeart/2005/8/layout/orgChart1"/>
+    <dgm:cxn modelId="{739CB60C-BBCE-4BB7-BB45-631BD9A4C55D}" type="presParOf" srcId="{5049A462-7017-4E0F-A697-7060931CED6E}" destId="{D43BC50E-2873-49AA-B25B-120155FA3219}" srcOrd="1" destOrd="0" presId="urn:microsoft.com/office/officeart/2005/8/layout/orgChart1"/>
+    <dgm:cxn modelId="{39F8A46A-533F-4DA5-B5F9-28139101C819}" type="presParOf" srcId="{A118E8C6-79D8-40B5-A76F-3854EDDE8615}" destId="{BBBB646D-54A2-4ABB-8DA6-9D522FF48CC0}" srcOrd="1" destOrd="0" presId="urn:microsoft.com/office/officeart/2005/8/layout/orgChart1"/>
+    <dgm:cxn modelId="{392BB81E-FB73-40AD-8E21-BBA6A1CC476C}" type="presParOf" srcId="{A118E8C6-79D8-40B5-A76F-3854EDDE8615}" destId="{EEA24CB1-9F92-4F7A-90EE-54A65FC78CD7}" srcOrd="2" destOrd="0" presId="urn:microsoft.com/office/officeart/2005/8/layout/orgChart1"/>
+    <dgm:cxn modelId="{E84EAB32-FB25-43DE-8E15-4F10B9115DC6}" type="presParOf" srcId="{2E603EAC-4888-42A8-82E5-BD74853F7660}" destId="{66CCEE48-8CA8-44DB-85E2-34D6AF639985}" srcOrd="4" destOrd="0" presId="urn:microsoft.com/office/officeart/2005/8/layout/orgChart1"/>
+    <dgm:cxn modelId="{786D5ECC-615E-40F8-8F69-EFF4774ED007}" type="presParOf" srcId="{2E603EAC-4888-42A8-82E5-BD74853F7660}" destId="{E04D28C1-2ED0-4CBF-9C14-9DDC0BA37CA9}" srcOrd="5" destOrd="0" presId="urn:microsoft.com/office/officeart/2005/8/layout/orgChart1"/>
+    <dgm:cxn modelId="{D3DFACF6-9B2F-460F-8284-9BC666DF40F9}" type="presParOf" srcId="{E04D28C1-2ED0-4CBF-9C14-9DDC0BA37CA9}" destId="{D8EC4C82-2C95-4D08-AE5B-507F46E02E24}" srcOrd="0" destOrd="0" presId="urn:microsoft.com/office/officeart/2005/8/layout/orgChart1"/>
+    <dgm:cxn modelId="{151E5945-68E5-4A63-B4D8-53878D8A1860}" type="presParOf" srcId="{D8EC4C82-2C95-4D08-AE5B-507F46E02E24}" destId="{1280358D-5C16-49D0-93E5-A29B636B6D27}" srcOrd="0" destOrd="0" presId="urn:microsoft.com/office/officeart/2005/8/layout/orgChart1"/>
+    <dgm:cxn modelId="{255C83AE-4A7B-481A-8E80-D3592B6088AA}" type="presParOf" srcId="{D8EC4C82-2C95-4D08-AE5B-507F46E02E24}" destId="{EB5F4D9D-A1B8-476C-95BB-BCF550B4E885}" srcOrd="1" destOrd="0" presId="urn:microsoft.com/office/officeart/2005/8/layout/orgChart1"/>
+    <dgm:cxn modelId="{31349348-478A-416D-9CD8-8D98EBC752A1}" type="presParOf" srcId="{E04D28C1-2ED0-4CBF-9C14-9DDC0BA37CA9}" destId="{3709983F-B2FA-45EB-AD46-312D9CD4256F}" srcOrd="1" destOrd="0" presId="urn:microsoft.com/office/officeart/2005/8/layout/orgChart1"/>
+    <dgm:cxn modelId="{848BDEDF-2101-4BFA-ABBA-14283588BEC2}" type="presParOf" srcId="{E04D28C1-2ED0-4CBF-9C14-9DDC0BA37CA9}" destId="{AF7CFFD1-F125-479A-976D-6FB0FCBA3610}" srcOrd="2" destOrd="0" presId="urn:microsoft.com/office/officeart/2005/8/layout/orgChart1"/>
+    <dgm:cxn modelId="{B7F8F028-6BC5-4BBF-BED2-0CFAF38F1C87}" type="presParOf" srcId="{2E603EAC-4888-42A8-82E5-BD74853F7660}" destId="{DE86A25E-3391-4FC7-AF41-4E6256991058}" srcOrd="6" destOrd="0" presId="urn:microsoft.com/office/officeart/2005/8/layout/orgChart1"/>
+    <dgm:cxn modelId="{8A5C1647-B9F7-47C6-ADFE-41B08F51C3D4}" type="presParOf" srcId="{2E603EAC-4888-42A8-82E5-BD74853F7660}" destId="{BA471C71-6613-4C17-B34F-A687A2705181}" srcOrd="7" destOrd="0" presId="urn:microsoft.com/office/officeart/2005/8/layout/orgChart1"/>
+    <dgm:cxn modelId="{C1C1E46A-ABD4-4C08-A0AF-3CDAA2A5DD4B}" type="presParOf" srcId="{BA471C71-6613-4C17-B34F-A687A2705181}" destId="{287C0023-FFD9-4352-A7E9-67B422837B43}" srcOrd="0" destOrd="0" presId="urn:microsoft.com/office/officeart/2005/8/layout/orgChart1"/>
+    <dgm:cxn modelId="{526EF14A-E51D-4D39-9E74-22AADA80AF3D}" type="presParOf" srcId="{287C0023-FFD9-4352-A7E9-67B422837B43}" destId="{56BBB9BA-E45F-40AF-A212-67D77FF51EAC}" srcOrd="0" destOrd="0" presId="urn:microsoft.com/office/officeart/2005/8/layout/orgChart1"/>
+    <dgm:cxn modelId="{B2C34521-DB6C-49B0-9392-0196C30E20AA}" type="presParOf" srcId="{287C0023-FFD9-4352-A7E9-67B422837B43}" destId="{3B6B2862-BDCA-4946-A920-B2413AD4A356}" srcOrd="1" destOrd="0" presId="urn:microsoft.com/office/officeart/2005/8/layout/orgChart1"/>
+    <dgm:cxn modelId="{51A9364D-B503-4F3D-B3CB-CEB661603CAD}" type="presParOf" srcId="{BA471C71-6613-4C17-B34F-A687A2705181}" destId="{213577AE-9EAA-4CB6-B65C-DB7F2C960A65}" srcOrd="1" destOrd="0" presId="urn:microsoft.com/office/officeart/2005/8/layout/orgChart1"/>
+    <dgm:cxn modelId="{E0FF8C9F-DE49-45E0-95DD-434BE028373A}" type="presParOf" srcId="{BA471C71-6613-4C17-B34F-A687A2705181}" destId="{EE0A607F-F356-4B9D-BEC7-81F6147292BB}" srcOrd="2" destOrd="0" presId="urn:microsoft.com/office/officeart/2005/8/layout/orgChart1"/>
+    <dgm:cxn modelId="{831B12B1-8C5C-495E-833A-65F25B818888}" type="presParOf" srcId="{29B0EF56-2AA5-4076-8399-B374591DE18A}" destId="{1B019B9D-71BF-4D29-B533-4DB1A3924954}" srcOrd="2" destOrd="0" presId="urn:microsoft.com/office/officeart/2005/8/layout/orgChart1"/>
+    <dgm:cxn modelId="{F28D5E17-5969-4558-946D-4A7620C28166}" type="presParOf" srcId="{1B019B9D-71BF-4D29-B533-4DB1A3924954}" destId="{DF59ECB3-FA60-4AF3-ADB4-DD157DE2D6E5}" srcOrd="0" destOrd="0" presId="urn:microsoft.com/office/officeart/2005/8/layout/orgChart1"/>
+    <dgm:cxn modelId="{36D8BEDF-F46B-45A7-863A-C0843BA03FEA}" type="presParOf" srcId="{1B019B9D-71BF-4D29-B533-4DB1A3924954}" destId="{A0179212-1DF9-4885-8F5F-76E4009441E5}" srcOrd="1" destOrd="0" presId="urn:microsoft.com/office/officeart/2005/8/layout/orgChart1"/>
+    <dgm:cxn modelId="{9E8E847D-36F9-4B18-93D5-380FB11DFD13}" type="presParOf" srcId="{A0179212-1DF9-4885-8F5F-76E4009441E5}" destId="{6D71E08D-BC99-4AEB-9873-FFD991FF76DE}" srcOrd="0" destOrd="0" presId="urn:microsoft.com/office/officeart/2005/8/layout/orgChart1"/>
+    <dgm:cxn modelId="{220D2222-0B72-4C18-A535-349750F36E48}" type="presParOf" srcId="{6D71E08D-BC99-4AEB-9873-FFD991FF76DE}" destId="{6A17E83B-A51A-48BF-AEAB-13C83E0E1E3D}" srcOrd="0" destOrd="0" presId="urn:microsoft.com/office/officeart/2005/8/layout/orgChart1"/>
+    <dgm:cxn modelId="{1C778D0C-E5A4-4ED1-B47F-FD35E1E7A7F9}" type="presParOf" srcId="{6D71E08D-BC99-4AEB-9873-FFD991FF76DE}" destId="{20ED53F9-7948-4F65-A333-7291D67269E2}" srcOrd="1" destOrd="0" presId="urn:microsoft.com/office/officeart/2005/8/layout/orgChart1"/>
+    <dgm:cxn modelId="{C8B4BC41-9032-4110-80DE-75B816D8EF68}" type="presParOf" srcId="{A0179212-1DF9-4885-8F5F-76E4009441E5}" destId="{676F5775-3BF1-4FDD-B666-69D1EC9E1F7B}" srcOrd="1" destOrd="0" presId="urn:microsoft.com/office/officeart/2005/8/layout/orgChart1"/>
+    <dgm:cxn modelId="{DCF91238-9E42-48FC-BC87-B33A34881E19}" type="presParOf" srcId="{A0179212-1DF9-4885-8F5F-76E4009441E5}" destId="{1901F37B-15E1-408A-947B-1439FCE9FFF8}" srcOrd="2" destOrd="0" presId="urn:microsoft.com/office/officeart/2005/8/layout/orgChart1"/>
   </dgm:cxnLst>
   <dgm:bg/>
   <dgm:whole/>
@@ -2192,15 +1448,15 @@
       <dsp:cNvGrpSpPr/>
     </dsp:nvGrpSpPr>
     <dsp:grpSpPr/>
-    <dsp:sp modelId="{D26D02D2-9E33-4537-8ECE-AA6EE0F4548F}">
+    <dsp:sp modelId="{DF59ECB3-FA60-4AF3-ADB4-DD157DE2D6E5}">
       <dsp:nvSpPr>
         <dsp:cNvPr id="0" name=""/>
         <dsp:cNvSpPr/>
       </dsp:nvSpPr>
       <dsp:spPr>
         <a:xfrm>
-          <a:off x="4858239" y="4010798"/>
-          <a:ext cx="103919" cy="1157957"/>
+          <a:off x="5819793" y="2218953"/>
+          <a:ext cx="276206" cy="1210046"/>
         </a:xfrm>
         <a:custGeom>
           <a:avLst/>
@@ -2211,780 +1467,13 @@
           <a:pathLst>
             <a:path>
               <a:moveTo>
-                <a:pt x="103919" y="0"/>
+                <a:pt x="276206" y="0"/>
               </a:moveTo>
               <a:lnTo>
-                <a:pt x="103919" y="1157957"/>
+                <a:pt x="276206" y="1210046"/>
               </a:lnTo>
               <a:lnTo>
-                <a:pt x="0" y="1157957"/>
-              </a:lnTo>
-            </a:path>
-          </a:pathLst>
-        </a:custGeom>
-        <a:noFill/>
-        <a:ln w="12700" cap="flat" cmpd="sng" algn="ctr">
-          <a:solidFill>
-            <a:schemeClr val="accent1">
-              <a:shade val="80000"/>
-              <a:hueOff val="0"/>
-              <a:satOff val="0"/>
-              <a:lumOff val="0"/>
-              <a:alphaOff val="0"/>
-            </a:schemeClr>
-          </a:solidFill>
-          <a:prstDash val="solid"/>
-          <a:miter lim="800000"/>
-        </a:ln>
-        <a:effectLst/>
-      </dsp:spPr>
-      <dsp:style>
-        <a:lnRef idx="2">
-          <a:scrgbClr r="0" g="0" b="0"/>
-        </a:lnRef>
-        <a:fillRef idx="0">
-          <a:scrgbClr r="0" g="0" b="0"/>
-        </a:fillRef>
-        <a:effectRef idx="0">
-          <a:scrgbClr r="0" g="0" b="0"/>
-        </a:effectRef>
-        <a:fontRef idx="minor"/>
-      </dsp:style>
-    </dsp:sp>
-    <dsp:sp modelId="{B8608039-4254-4A97-8BFD-8608AB477D8E}">
-      <dsp:nvSpPr>
-        <dsp:cNvPr id="0" name=""/>
-        <dsp:cNvSpPr/>
-      </dsp:nvSpPr>
-      <dsp:spPr>
-        <a:xfrm>
-          <a:off x="4962159" y="4010798"/>
-          <a:ext cx="103919" cy="455265"/>
-        </a:xfrm>
-        <a:custGeom>
-          <a:avLst/>
-          <a:gdLst/>
-          <a:ahLst/>
-          <a:cxnLst/>
-          <a:rect l="0" t="0" r="0" b="0"/>
-          <a:pathLst>
-            <a:path>
-              <a:moveTo>
-                <a:pt x="0" y="0"/>
-              </a:moveTo>
-              <a:lnTo>
-                <a:pt x="0" y="455265"/>
-              </a:lnTo>
-              <a:lnTo>
-                <a:pt x="103919" y="455265"/>
-              </a:lnTo>
-            </a:path>
-          </a:pathLst>
-        </a:custGeom>
-        <a:noFill/>
-        <a:ln w="12700" cap="flat" cmpd="sng" algn="ctr">
-          <a:solidFill>
-            <a:schemeClr val="accent1">
-              <a:shade val="80000"/>
-              <a:hueOff val="0"/>
-              <a:satOff val="0"/>
-              <a:lumOff val="0"/>
-              <a:alphaOff val="0"/>
-            </a:schemeClr>
-          </a:solidFill>
-          <a:prstDash val="solid"/>
-          <a:miter lim="800000"/>
-        </a:ln>
-        <a:effectLst/>
-      </dsp:spPr>
-      <dsp:style>
-        <a:lnRef idx="2">
-          <a:scrgbClr r="0" g="0" b="0"/>
-        </a:lnRef>
-        <a:fillRef idx="0">
-          <a:scrgbClr r="0" g="0" b="0"/>
-        </a:fillRef>
-        <a:effectRef idx="0">
-          <a:scrgbClr r="0" g="0" b="0"/>
-        </a:effectRef>
-        <a:fontRef idx="minor"/>
-      </dsp:style>
-    </dsp:sp>
-    <dsp:sp modelId="{311E2D49-366F-4190-95E5-6F15586CB528}">
-      <dsp:nvSpPr>
-        <dsp:cNvPr id="0" name=""/>
-        <dsp:cNvSpPr/>
-      </dsp:nvSpPr>
-      <dsp:spPr>
-        <a:xfrm>
-          <a:off x="4858239" y="4010798"/>
-          <a:ext cx="103919" cy="455265"/>
-        </a:xfrm>
-        <a:custGeom>
-          <a:avLst/>
-          <a:gdLst/>
-          <a:ahLst/>
-          <a:cxnLst/>
-          <a:rect l="0" t="0" r="0" b="0"/>
-          <a:pathLst>
-            <a:path>
-              <a:moveTo>
-                <a:pt x="103919" y="0"/>
-              </a:moveTo>
-              <a:lnTo>
-                <a:pt x="103919" y="455265"/>
-              </a:lnTo>
-              <a:lnTo>
-                <a:pt x="0" y="455265"/>
-              </a:lnTo>
-            </a:path>
-          </a:pathLst>
-        </a:custGeom>
-        <a:noFill/>
-        <a:ln w="12700" cap="flat" cmpd="sng" algn="ctr">
-          <a:solidFill>
-            <a:schemeClr val="accent1">
-              <a:shade val="80000"/>
-              <a:hueOff val="0"/>
-              <a:satOff val="0"/>
-              <a:lumOff val="0"/>
-              <a:alphaOff val="0"/>
-            </a:schemeClr>
-          </a:solidFill>
-          <a:prstDash val="solid"/>
-          <a:miter lim="800000"/>
-        </a:ln>
-        <a:effectLst/>
-      </dsp:spPr>
-      <dsp:style>
-        <a:lnRef idx="2">
-          <a:scrgbClr r="0" g="0" b="0"/>
-        </a:lnRef>
-        <a:fillRef idx="0">
-          <a:scrgbClr r="0" g="0" b="0"/>
-        </a:fillRef>
-        <a:effectRef idx="0">
-          <a:scrgbClr r="0" g="0" b="0"/>
-        </a:effectRef>
-        <a:fontRef idx="minor"/>
-      </dsp:style>
-    </dsp:sp>
-    <dsp:sp modelId="{1FC65B10-387B-4A7F-A3F3-649FCE8FF37C}">
-      <dsp:nvSpPr>
-        <dsp:cNvPr id="0" name=""/>
-        <dsp:cNvSpPr/>
-      </dsp:nvSpPr>
-      <dsp:spPr>
-        <a:xfrm>
-          <a:off x="3764613" y="1200030"/>
-          <a:ext cx="702691" cy="2563341"/>
-        </a:xfrm>
-        <a:custGeom>
-          <a:avLst/>
-          <a:gdLst/>
-          <a:ahLst/>
-          <a:cxnLst/>
-          <a:rect l="0" t="0" r="0" b="0"/>
-          <a:pathLst>
-            <a:path>
-              <a:moveTo>
-                <a:pt x="0" y="0"/>
-              </a:moveTo>
-              <a:lnTo>
-                <a:pt x="0" y="2563341"/>
-              </a:lnTo>
-              <a:lnTo>
-                <a:pt x="702691" y="2563341"/>
-              </a:lnTo>
-            </a:path>
-          </a:pathLst>
-        </a:custGeom>
-        <a:noFill/>
-        <a:ln w="12700" cap="flat" cmpd="sng" algn="ctr">
-          <a:solidFill>
-            <a:schemeClr val="accent1">
-              <a:shade val="80000"/>
-              <a:hueOff val="0"/>
-              <a:satOff val="0"/>
-              <a:lumOff val="0"/>
-              <a:alphaOff val="0"/>
-            </a:schemeClr>
-          </a:solidFill>
-          <a:prstDash val="solid"/>
-          <a:miter lim="800000"/>
-        </a:ln>
-        <a:effectLst/>
-      </dsp:spPr>
-      <dsp:style>
-        <a:lnRef idx="2">
-          <a:scrgbClr r="0" g="0" b="0"/>
-        </a:lnRef>
-        <a:fillRef idx="0">
-          <a:scrgbClr r="0" g="0" b="0"/>
-        </a:fillRef>
-        <a:effectRef idx="0">
-          <a:scrgbClr r="0" g="0" b="0"/>
-        </a:effectRef>
-        <a:fontRef idx="minor"/>
-      </dsp:style>
-    </dsp:sp>
-    <dsp:sp modelId="{7B569ED8-109D-48C6-82EA-DD90994E2391}">
-      <dsp:nvSpPr>
-        <dsp:cNvPr id="0" name=""/>
-        <dsp:cNvSpPr/>
-      </dsp:nvSpPr>
-      <dsp:spPr>
-        <a:xfrm>
-          <a:off x="2463148" y="1200030"/>
-          <a:ext cx="1301464" cy="2563341"/>
-        </a:xfrm>
-        <a:custGeom>
-          <a:avLst/>
-          <a:gdLst/>
-          <a:ahLst/>
-          <a:cxnLst/>
-          <a:rect l="0" t="0" r="0" b="0"/>
-          <a:pathLst>
-            <a:path>
-              <a:moveTo>
-                <a:pt x="1301464" y="0"/>
-              </a:moveTo>
-              <a:lnTo>
-                <a:pt x="1301464" y="2563341"/>
-              </a:lnTo>
-              <a:lnTo>
-                <a:pt x="0" y="2563341"/>
-              </a:lnTo>
-            </a:path>
-          </a:pathLst>
-        </a:custGeom>
-        <a:noFill/>
-        <a:ln w="12700" cap="flat" cmpd="sng" algn="ctr">
-          <a:solidFill>
-            <a:schemeClr val="accent1">
-              <a:shade val="80000"/>
-              <a:hueOff val="0"/>
-              <a:satOff val="0"/>
-              <a:lumOff val="0"/>
-              <a:alphaOff val="0"/>
-            </a:schemeClr>
-          </a:solidFill>
-          <a:prstDash val="solid"/>
-          <a:miter lim="800000"/>
-        </a:ln>
-        <a:effectLst/>
-      </dsp:spPr>
-      <dsp:style>
-        <a:lnRef idx="2">
-          <a:scrgbClr r="0" g="0" b="0"/>
-        </a:lnRef>
-        <a:fillRef idx="0">
-          <a:scrgbClr r="0" g="0" b="0"/>
-        </a:fillRef>
-        <a:effectRef idx="0">
-          <a:scrgbClr r="0" g="0" b="0"/>
-        </a:effectRef>
-        <a:fontRef idx="minor"/>
-      </dsp:style>
-    </dsp:sp>
-    <dsp:sp modelId="{7C1BB281-B26B-4876-817A-BA65908F0D9E}">
-      <dsp:nvSpPr>
-        <dsp:cNvPr id="0" name=""/>
-        <dsp:cNvSpPr/>
-      </dsp:nvSpPr>
-      <dsp:spPr>
-        <a:xfrm>
-          <a:off x="4962159" y="2605414"/>
-          <a:ext cx="103919" cy="455265"/>
-        </a:xfrm>
-        <a:custGeom>
-          <a:avLst/>
-          <a:gdLst/>
-          <a:ahLst/>
-          <a:cxnLst/>
-          <a:rect l="0" t="0" r="0" b="0"/>
-          <a:pathLst>
-            <a:path>
-              <a:moveTo>
-                <a:pt x="0" y="0"/>
-              </a:moveTo>
-              <a:lnTo>
-                <a:pt x="0" y="455265"/>
-              </a:lnTo>
-              <a:lnTo>
-                <a:pt x="103919" y="455265"/>
-              </a:lnTo>
-            </a:path>
-          </a:pathLst>
-        </a:custGeom>
-        <a:noFill/>
-        <a:ln w="12700" cap="flat" cmpd="sng" algn="ctr">
-          <a:solidFill>
-            <a:schemeClr val="accent1">
-              <a:shade val="80000"/>
-              <a:hueOff val="0"/>
-              <a:satOff val="0"/>
-              <a:lumOff val="0"/>
-              <a:alphaOff val="0"/>
-            </a:schemeClr>
-          </a:solidFill>
-          <a:prstDash val="solid"/>
-          <a:miter lim="800000"/>
-        </a:ln>
-        <a:effectLst/>
-      </dsp:spPr>
-      <dsp:style>
-        <a:lnRef idx="2">
-          <a:scrgbClr r="0" g="0" b="0"/>
-        </a:lnRef>
-        <a:fillRef idx="0">
-          <a:scrgbClr r="0" g="0" b="0"/>
-        </a:fillRef>
-        <a:effectRef idx="0">
-          <a:scrgbClr r="0" g="0" b="0"/>
-        </a:effectRef>
-        <a:fontRef idx="minor"/>
-      </dsp:style>
-    </dsp:sp>
-    <dsp:sp modelId="{9671D427-A6CF-4FBB-A364-F2B641BA1AA4}">
-      <dsp:nvSpPr>
-        <dsp:cNvPr id="0" name=""/>
-        <dsp:cNvSpPr/>
-      </dsp:nvSpPr>
-      <dsp:spPr>
-        <a:xfrm>
-          <a:off x="4858239" y="2605414"/>
-          <a:ext cx="103919" cy="455265"/>
-        </a:xfrm>
-        <a:custGeom>
-          <a:avLst/>
-          <a:gdLst/>
-          <a:ahLst/>
-          <a:cxnLst/>
-          <a:rect l="0" t="0" r="0" b="0"/>
-          <a:pathLst>
-            <a:path>
-              <a:moveTo>
-                <a:pt x="103919" y="0"/>
-              </a:moveTo>
-              <a:lnTo>
-                <a:pt x="103919" y="455265"/>
-              </a:lnTo>
-              <a:lnTo>
-                <a:pt x="0" y="455265"/>
-              </a:lnTo>
-            </a:path>
-          </a:pathLst>
-        </a:custGeom>
-        <a:noFill/>
-        <a:ln w="12700" cap="flat" cmpd="sng" algn="ctr">
-          <a:solidFill>
-            <a:schemeClr val="accent1">
-              <a:shade val="80000"/>
-              <a:hueOff val="0"/>
-              <a:satOff val="0"/>
-              <a:lumOff val="0"/>
-              <a:alphaOff val="0"/>
-            </a:schemeClr>
-          </a:solidFill>
-          <a:prstDash val="solid"/>
-          <a:miter lim="800000"/>
-        </a:ln>
-        <a:effectLst/>
-      </dsp:spPr>
-      <dsp:style>
-        <a:lnRef idx="2">
-          <a:scrgbClr r="0" g="0" b="0"/>
-        </a:lnRef>
-        <a:fillRef idx="0">
-          <a:scrgbClr r="0" g="0" b="0"/>
-        </a:fillRef>
-        <a:effectRef idx="0">
-          <a:scrgbClr r="0" g="0" b="0"/>
-        </a:effectRef>
-        <a:fontRef idx="minor"/>
-      </dsp:style>
-    </dsp:sp>
-    <dsp:sp modelId="{CAC482E8-66D6-409D-982D-D5BE40028EC1}">
-      <dsp:nvSpPr>
-        <dsp:cNvPr id="0" name=""/>
-        <dsp:cNvSpPr/>
-      </dsp:nvSpPr>
-      <dsp:spPr>
-        <a:xfrm>
-          <a:off x="3764613" y="1200030"/>
-          <a:ext cx="702691" cy="1157957"/>
-        </a:xfrm>
-        <a:custGeom>
-          <a:avLst/>
-          <a:gdLst/>
-          <a:ahLst/>
-          <a:cxnLst/>
-          <a:rect l="0" t="0" r="0" b="0"/>
-          <a:pathLst>
-            <a:path>
-              <a:moveTo>
-                <a:pt x="0" y="0"/>
-              </a:moveTo>
-              <a:lnTo>
-                <a:pt x="0" y="1157957"/>
-              </a:lnTo>
-              <a:lnTo>
-                <a:pt x="702691" y="1157957"/>
-              </a:lnTo>
-            </a:path>
-          </a:pathLst>
-        </a:custGeom>
-        <a:noFill/>
-        <a:ln w="12700" cap="flat" cmpd="sng" algn="ctr">
-          <a:solidFill>
-            <a:schemeClr val="accent1">
-              <a:shade val="80000"/>
-              <a:hueOff val="0"/>
-              <a:satOff val="0"/>
-              <a:lumOff val="0"/>
-              <a:alphaOff val="0"/>
-            </a:schemeClr>
-          </a:solidFill>
-          <a:prstDash val="solid"/>
-          <a:miter lim="800000"/>
-        </a:ln>
-        <a:effectLst/>
-      </dsp:spPr>
-      <dsp:style>
-        <a:lnRef idx="2">
-          <a:scrgbClr r="0" g="0" b="0"/>
-        </a:lnRef>
-        <a:fillRef idx="0">
-          <a:scrgbClr r="0" g="0" b="0"/>
-        </a:fillRef>
-        <a:effectRef idx="0">
-          <a:scrgbClr r="0" g="0" b="0"/>
-        </a:effectRef>
-        <a:fontRef idx="minor"/>
-      </dsp:style>
-    </dsp:sp>
-    <dsp:sp modelId="{23C52E41-00C9-4660-9F7C-E79A721D2A76}">
-      <dsp:nvSpPr>
-        <dsp:cNvPr id="0" name=""/>
-        <dsp:cNvSpPr/>
-      </dsp:nvSpPr>
-      <dsp:spPr>
-        <a:xfrm>
-          <a:off x="2567068" y="2605414"/>
-          <a:ext cx="103919" cy="455265"/>
-        </a:xfrm>
-        <a:custGeom>
-          <a:avLst/>
-          <a:gdLst/>
-          <a:ahLst/>
-          <a:cxnLst/>
-          <a:rect l="0" t="0" r="0" b="0"/>
-          <a:pathLst>
-            <a:path>
-              <a:moveTo>
-                <a:pt x="0" y="0"/>
-              </a:moveTo>
-              <a:lnTo>
-                <a:pt x="0" y="455265"/>
-              </a:lnTo>
-              <a:lnTo>
-                <a:pt x="103919" y="455265"/>
-              </a:lnTo>
-            </a:path>
-          </a:pathLst>
-        </a:custGeom>
-        <a:noFill/>
-        <a:ln w="12700" cap="flat" cmpd="sng" algn="ctr">
-          <a:solidFill>
-            <a:schemeClr val="accent1">
-              <a:shade val="80000"/>
-              <a:hueOff val="0"/>
-              <a:satOff val="0"/>
-              <a:lumOff val="0"/>
-              <a:alphaOff val="0"/>
-            </a:schemeClr>
-          </a:solidFill>
-          <a:prstDash val="solid"/>
-          <a:miter lim="800000"/>
-        </a:ln>
-        <a:effectLst/>
-      </dsp:spPr>
-      <dsp:style>
-        <a:lnRef idx="2">
-          <a:scrgbClr r="0" g="0" b="0"/>
-        </a:lnRef>
-        <a:fillRef idx="0">
-          <a:scrgbClr r="0" g="0" b="0"/>
-        </a:fillRef>
-        <a:effectRef idx="0">
-          <a:scrgbClr r="0" g="0" b="0"/>
-        </a:effectRef>
-        <a:fontRef idx="minor"/>
-      </dsp:style>
-    </dsp:sp>
-    <dsp:sp modelId="{79BFB1A5-42BC-49DC-AECD-37FF5B2A9991}">
-      <dsp:nvSpPr>
-        <dsp:cNvPr id="0" name=""/>
-        <dsp:cNvSpPr/>
-      </dsp:nvSpPr>
-      <dsp:spPr>
-        <a:xfrm>
-          <a:off x="2463148" y="2605414"/>
-          <a:ext cx="103919" cy="455265"/>
-        </a:xfrm>
-        <a:custGeom>
-          <a:avLst/>
-          <a:gdLst/>
-          <a:ahLst/>
-          <a:cxnLst/>
-          <a:rect l="0" t="0" r="0" b="0"/>
-          <a:pathLst>
-            <a:path>
-              <a:moveTo>
-                <a:pt x="103919" y="0"/>
-              </a:moveTo>
-              <a:lnTo>
-                <a:pt x="103919" y="455265"/>
-              </a:lnTo>
-              <a:lnTo>
-                <a:pt x="0" y="455265"/>
-              </a:lnTo>
-            </a:path>
-          </a:pathLst>
-        </a:custGeom>
-        <a:noFill/>
-        <a:ln w="12700" cap="flat" cmpd="sng" algn="ctr">
-          <a:solidFill>
-            <a:schemeClr val="accent1">
-              <a:shade val="80000"/>
-              <a:hueOff val="0"/>
-              <a:satOff val="0"/>
-              <a:lumOff val="0"/>
-              <a:alphaOff val="0"/>
-            </a:schemeClr>
-          </a:solidFill>
-          <a:prstDash val="solid"/>
-          <a:miter lim="800000"/>
-        </a:ln>
-        <a:effectLst/>
-      </dsp:spPr>
-      <dsp:style>
-        <a:lnRef idx="2">
-          <a:scrgbClr r="0" g="0" b="0"/>
-        </a:lnRef>
-        <a:fillRef idx="0">
-          <a:scrgbClr r="0" g="0" b="0"/>
-        </a:fillRef>
-        <a:effectRef idx="0">
-          <a:scrgbClr r="0" g="0" b="0"/>
-        </a:effectRef>
-        <a:fontRef idx="minor"/>
-      </dsp:style>
-    </dsp:sp>
-    <dsp:sp modelId="{1E3562D8-53FD-44BF-AD79-E2E22051C757}">
-      <dsp:nvSpPr>
-        <dsp:cNvPr id="0" name=""/>
-        <dsp:cNvSpPr/>
-      </dsp:nvSpPr>
-      <dsp:spPr>
-        <a:xfrm>
-          <a:off x="3061921" y="1200030"/>
-          <a:ext cx="702691" cy="1157957"/>
-        </a:xfrm>
-        <a:custGeom>
-          <a:avLst/>
-          <a:gdLst/>
-          <a:ahLst/>
-          <a:cxnLst/>
-          <a:rect l="0" t="0" r="0" b="0"/>
-          <a:pathLst>
-            <a:path>
-              <a:moveTo>
-                <a:pt x="702691" y="0"/>
-              </a:moveTo>
-              <a:lnTo>
-                <a:pt x="702691" y="1157957"/>
-              </a:lnTo>
-              <a:lnTo>
-                <a:pt x="0" y="1157957"/>
-              </a:lnTo>
-            </a:path>
-          </a:pathLst>
-        </a:custGeom>
-        <a:noFill/>
-        <a:ln w="12700" cap="flat" cmpd="sng" algn="ctr">
-          <a:solidFill>
-            <a:schemeClr val="accent1">
-              <a:shade val="80000"/>
-              <a:hueOff val="0"/>
-              <a:satOff val="0"/>
-              <a:lumOff val="0"/>
-              <a:alphaOff val="0"/>
-            </a:schemeClr>
-          </a:solidFill>
-          <a:prstDash val="solid"/>
-          <a:miter lim="800000"/>
-        </a:ln>
-        <a:effectLst/>
-      </dsp:spPr>
-      <dsp:style>
-        <a:lnRef idx="2">
-          <a:scrgbClr r="0" g="0" b="0"/>
-        </a:lnRef>
-        <a:fillRef idx="0">
-          <a:scrgbClr r="0" g="0" b="0"/>
-        </a:fillRef>
-        <a:effectRef idx="0">
-          <a:scrgbClr r="0" g="0" b="0"/>
-        </a:effectRef>
-        <a:fontRef idx="minor"/>
-      </dsp:style>
-    </dsp:sp>
-    <dsp:sp modelId="{DC66C6E7-E03B-4F0A-AA36-D826A08382D1}">
-      <dsp:nvSpPr>
-        <dsp:cNvPr id="0" name=""/>
-        <dsp:cNvSpPr/>
-      </dsp:nvSpPr>
-      <dsp:spPr>
-        <a:xfrm>
-          <a:off x="3764613" y="1200030"/>
-          <a:ext cx="103919" cy="455265"/>
-        </a:xfrm>
-        <a:custGeom>
-          <a:avLst/>
-          <a:gdLst/>
-          <a:ahLst/>
-          <a:cxnLst/>
-          <a:rect l="0" t="0" r="0" b="0"/>
-          <a:pathLst>
-            <a:path>
-              <a:moveTo>
-                <a:pt x="0" y="0"/>
-              </a:moveTo>
-              <a:lnTo>
-                <a:pt x="0" y="455265"/>
-              </a:lnTo>
-              <a:lnTo>
-                <a:pt x="103919" y="455265"/>
-              </a:lnTo>
-            </a:path>
-          </a:pathLst>
-        </a:custGeom>
-        <a:noFill/>
-        <a:ln w="12700" cap="flat" cmpd="sng" algn="ctr">
-          <a:solidFill>
-            <a:schemeClr val="accent1">
-              <a:shade val="80000"/>
-              <a:hueOff val="0"/>
-              <a:satOff val="0"/>
-              <a:lumOff val="0"/>
-              <a:alphaOff val="0"/>
-            </a:schemeClr>
-          </a:solidFill>
-          <a:prstDash val="solid"/>
-          <a:miter lim="800000"/>
-        </a:ln>
-        <a:effectLst/>
-      </dsp:spPr>
-      <dsp:style>
-        <a:lnRef idx="2">
-          <a:scrgbClr r="0" g="0" b="0"/>
-        </a:lnRef>
-        <a:fillRef idx="0">
-          <a:scrgbClr r="0" g="0" b="0"/>
-        </a:fillRef>
-        <a:effectRef idx="0">
-          <a:scrgbClr r="0" g="0" b="0"/>
-        </a:effectRef>
-        <a:fontRef idx="minor"/>
-      </dsp:style>
-    </dsp:sp>
-    <dsp:sp modelId="{99970878-4EDC-4385-A709-C43B933E0757}">
-      <dsp:nvSpPr>
-        <dsp:cNvPr id="0" name=""/>
-        <dsp:cNvSpPr/>
-      </dsp:nvSpPr>
-      <dsp:spPr>
-        <a:xfrm>
-          <a:off x="2463148" y="1200030"/>
-          <a:ext cx="1301464" cy="455265"/>
-        </a:xfrm>
-        <a:custGeom>
-          <a:avLst/>
-          <a:gdLst/>
-          <a:ahLst/>
-          <a:cxnLst/>
-          <a:rect l="0" t="0" r="0" b="0"/>
-          <a:pathLst>
-            <a:path>
-              <a:moveTo>
-                <a:pt x="1301464" y="0"/>
-              </a:moveTo>
-              <a:lnTo>
-                <a:pt x="1301464" y="455265"/>
-              </a:lnTo>
-              <a:lnTo>
-                <a:pt x="0" y="455265"/>
-              </a:lnTo>
-            </a:path>
-          </a:pathLst>
-        </a:custGeom>
-        <a:noFill/>
-        <a:ln w="12700" cap="flat" cmpd="sng" algn="ctr">
-          <a:solidFill>
-            <a:schemeClr val="accent1">
-              <a:shade val="80000"/>
-              <a:hueOff val="0"/>
-              <a:satOff val="0"/>
-              <a:lumOff val="0"/>
-              <a:alphaOff val="0"/>
-            </a:schemeClr>
-          </a:solidFill>
-          <a:prstDash val="solid"/>
-          <a:miter lim="800000"/>
-        </a:ln>
-        <a:effectLst/>
-      </dsp:spPr>
-      <dsp:style>
-        <a:lnRef idx="2">
-          <a:scrgbClr r="0" g="0" b="0"/>
-        </a:lnRef>
-        <a:fillRef idx="0">
-          <a:scrgbClr r="0" g="0" b="0"/>
-        </a:fillRef>
-        <a:effectRef idx="0">
-          <a:scrgbClr r="0" g="0" b="0"/>
-        </a:effectRef>
-        <a:fontRef idx="minor"/>
-      </dsp:style>
-    </dsp:sp>
-    <dsp:sp modelId="{9AA8733F-3439-4F82-8E4E-8B1C5509A1C8}">
-      <dsp:nvSpPr>
-        <dsp:cNvPr id="0" name=""/>
-        <dsp:cNvSpPr/>
-      </dsp:nvSpPr>
-      <dsp:spPr>
-        <a:xfrm>
-          <a:off x="4259467" y="497338"/>
-          <a:ext cx="1900237" cy="455265"/>
-        </a:xfrm>
-        <a:custGeom>
-          <a:avLst/>
-          <a:gdLst/>
-          <a:ahLst/>
-          <a:cxnLst/>
-          <a:rect l="0" t="0" r="0" b="0"/>
-          <a:pathLst>
-            <a:path>
-              <a:moveTo>
-                <a:pt x="1900237" y="0"/>
-              </a:moveTo>
-              <a:lnTo>
-                <a:pt x="1900237" y="455265"/>
-              </a:lnTo>
-              <a:lnTo>
-                <a:pt x="0" y="455265"/>
+                <a:pt x="0" y="1210046"/>
               </a:lnTo>
             </a:path>
           </a:pathLst>
@@ -3018,15 +1507,263 @@
         <a:fontRef idx="minor"/>
       </dsp:style>
     </dsp:sp>
-    <dsp:sp modelId="{D7FB7A5E-8816-4BD8-9D46-B745F7752139}">
+    <dsp:sp modelId="{DE86A25E-3391-4FC7-AF41-4E6256991058}">
       <dsp:nvSpPr>
         <dsp:cNvPr id="0" name=""/>
         <dsp:cNvSpPr/>
       </dsp:nvSpPr>
       <dsp:spPr>
         <a:xfrm>
-          <a:off x="5664851" y="2484"/>
-          <a:ext cx="989707" cy="494853"/>
+          <a:off x="6095999" y="2218953"/>
+          <a:ext cx="4774424" cy="2420093"/>
+        </a:xfrm>
+        <a:custGeom>
+          <a:avLst/>
+          <a:gdLst/>
+          <a:ahLst/>
+          <a:cxnLst/>
+          <a:rect l="0" t="0" r="0" b="0"/>
+          <a:pathLst>
+            <a:path>
+              <a:moveTo>
+                <a:pt x="0" y="0"/>
+              </a:moveTo>
+              <a:lnTo>
+                <a:pt x="0" y="2143887"/>
+              </a:lnTo>
+              <a:lnTo>
+                <a:pt x="4774424" y="2143887"/>
+              </a:lnTo>
+              <a:lnTo>
+                <a:pt x="4774424" y="2420093"/>
+              </a:lnTo>
+            </a:path>
+          </a:pathLst>
+        </a:custGeom>
+        <a:noFill/>
+        <a:ln w="12700" cap="flat" cmpd="sng" algn="ctr">
+          <a:solidFill>
+            <a:schemeClr val="accent1">
+              <a:shade val="60000"/>
+              <a:hueOff val="0"/>
+              <a:satOff val="0"/>
+              <a:lumOff val="0"/>
+              <a:alphaOff val="0"/>
+            </a:schemeClr>
+          </a:solidFill>
+          <a:prstDash val="solid"/>
+          <a:miter lim="800000"/>
+        </a:ln>
+        <a:effectLst/>
+      </dsp:spPr>
+      <dsp:style>
+        <a:lnRef idx="2">
+          <a:scrgbClr r="0" g="0" b="0"/>
+        </a:lnRef>
+        <a:fillRef idx="0">
+          <a:scrgbClr r="0" g="0" b="0"/>
+        </a:fillRef>
+        <a:effectRef idx="0">
+          <a:scrgbClr r="0" g="0" b="0"/>
+        </a:effectRef>
+        <a:fontRef idx="minor"/>
+      </dsp:style>
+    </dsp:sp>
+    <dsp:sp modelId="{66CCEE48-8CA8-44DB-85E2-34D6AF639985}">
+      <dsp:nvSpPr>
+        <dsp:cNvPr id="0" name=""/>
+        <dsp:cNvSpPr/>
+      </dsp:nvSpPr>
+      <dsp:spPr>
+        <a:xfrm>
+          <a:off x="6095999" y="2218953"/>
+          <a:ext cx="1591474" cy="2420093"/>
+        </a:xfrm>
+        <a:custGeom>
+          <a:avLst/>
+          <a:gdLst/>
+          <a:ahLst/>
+          <a:cxnLst/>
+          <a:rect l="0" t="0" r="0" b="0"/>
+          <a:pathLst>
+            <a:path>
+              <a:moveTo>
+                <a:pt x="0" y="0"/>
+              </a:moveTo>
+              <a:lnTo>
+                <a:pt x="0" y="2143887"/>
+              </a:lnTo>
+              <a:lnTo>
+                <a:pt x="1591474" y="2143887"/>
+              </a:lnTo>
+              <a:lnTo>
+                <a:pt x="1591474" y="2420093"/>
+              </a:lnTo>
+            </a:path>
+          </a:pathLst>
+        </a:custGeom>
+        <a:noFill/>
+        <a:ln w="12700" cap="flat" cmpd="sng" algn="ctr">
+          <a:solidFill>
+            <a:schemeClr val="accent1">
+              <a:shade val="60000"/>
+              <a:hueOff val="0"/>
+              <a:satOff val="0"/>
+              <a:lumOff val="0"/>
+              <a:alphaOff val="0"/>
+            </a:schemeClr>
+          </a:solidFill>
+          <a:prstDash val="solid"/>
+          <a:miter lim="800000"/>
+        </a:ln>
+        <a:effectLst/>
+      </dsp:spPr>
+      <dsp:style>
+        <a:lnRef idx="2">
+          <a:scrgbClr r="0" g="0" b="0"/>
+        </a:lnRef>
+        <a:fillRef idx="0">
+          <a:scrgbClr r="0" g="0" b="0"/>
+        </a:fillRef>
+        <a:effectRef idx="0">
+          <a:scrgbClr r="0" g="0" b="0"/>
+        </a:effectRef>
+        <a:fontRef idx="minor"/>
+      </dsp:style>
+    </dsp:sp>
+    <dsp:sp modelId="{7C705CD8-85A3-410A-B3AC-1F896FE7E6B5}">
+      <dsp:nvSpPr>
+        <dsp:cNvPr id="0" name=""/>
+        <dsp:cNvSpPr/>
+      </dsp:nvSpPr>
+      <dsp:spPr>
+        <a:xfrm>
+          <a:off x="4504524" y="2218953"/>
+          <a:ext cx="1591474" cy="2420093"/>
+        </a:xfrm>
+        <a:custGeom>
+          <a:avLst/>
+          <a:gdLst/>
+          <a:ahLst/>
+          <a:cxnLst/>
+          <a:rect l="0" t="0" r="0" b="0"/>
+          <a:pathLst>
+            <a:path>
+              <a:moveTo>
+                <a:pt x="1591474" y="0"/>
+              </a:moveTo>
+              <a:lnTo>
+                <a:pt x="1591474" y="2143887"/>
+              </a:lnTo>
+              <a:lnTo>
+                <a:pt x="0" y="2143887"/>
+              </a:lnTo>
+              <a:lnTo>
+                <a:pt x="0" y="2420093"/>
+              </a:lnTo>
+            </a:path>
+          </a:pathLst>
+        </a:custGeom>
+        <a:noFill/>
+        <a:ln w="12700" cap="flat" cmpd="sng" algn="ctr">
+          <a:solidFill>
+            <a:schemeClr val="accent1">
+              <a:shade val="60000"/>
+              <a:hueOff val="0"/>
+              <a:satOff val="0"/>
+              <a:lumOff val="0"/>
+              <a:alphaOff val="0"/>
+            </a:schemeClr>
+          </a:solidFill>
+          <a:prstDash val="solid"/>
+          <a:miter lim="800000"/>
+        </a:ln>
+        <a:effectLst/>
+      </dsp:spPr>
+      <dsp:style>
+        <a:lnRef idx="2">
+          <a:scrgbClr r="0" g="0" b="0"/>
+        </a:lnRef>
+        <a:fillRef idx="0">
+          <a:scrgbClr r="0" g="0" b="0"/>
+        </a:fillRef>
+        <a:effectRef idx="0">
+          <a:scrgbClr r="0" g="0" b="0"/>
+        </a:effectRef>
+        <a:fontRef idx="minor"/>
+      </dsp:style>
+    </dsp:sp>
+    <dsp:sp modelId="{3E1E9609-3069-4C9F-A138-450DE62CF0F1}">
+      <dsp:nvSpPr>
+        <dsp:cNvPr id="0" name=""/>
+        <dsp:cNvSpPr/>
+      </dsp:nvSpPr>
+      <dsp:spPr>
+        <a:xfrm>
+          <a:off x="1321575" y="2218953"/>
+          <a:ext cx="4774424" cy="2420093"/>
+        </a:xfrm>
+        <a:custGeom>
+          <a:avLst/>
+          <a:gdLst/>
+          <a:ahLst/>
+          <a:cxnLst/>
+          <a:rect l="0" t="0" r="0" b="0"/>
+          <a:pathLst>
+            <a:path>
+              <a:moveTo>
+                <a:pt x="4774424" y="0"/>
+              </a:moveTo>
+              <a:lnTo>
+                <a:pt x="4774424" y="2143887"/>
+              </a:lnTo>
+              <a:lnTo>
+                <a:pt x="0" y="2143887"/>
+              </a:lnTo>
+              <a:lnTo>
+                <a:pt x="0" y="2420093"/>
+              </a:lnTo>
+            </a:path>
+          </a:pathLst>
+        </a:custGeom>
+        <a:noFill/>
+        <a:ln w="12700" cap="flat" cmpd="sng" algn="ctr">
+          <a:solidFill>
+            <a:schemeClr val="accent1">
+              <a:shade val="60000"/>
+              <a:hueOff val="0"/>
+              <a:satOff val="0"/>
+              <a:lumOff val="0"/>
+              <a:alphaOff val="0"/>
+            </a:schemeClr>
+          </a:solidFill>
+          <a:prstDash val="solid"/>
+          <a:miter lim="800000"/>
+        </a:ln>
+        <a:effectLst/>
+      </dsp:spPr>
+      <dsp:style>
+        <a:lnRef idx="2">
+          <a:scrgbClr r="0" g="0" b="0"/>
+        </a:lnRef>
+        <a:fillRef idx="0">
+          <a:scrgbClr r="0" g="0" b="0"/>
+        </a:fillRef>
+        <a:effectRef idx="0">
+          <a:scrgbClr r="0" g="0" b="0"/>
+        </a:effectRef>
+        <a:fontRef idx="minor"/>
+      </dsp:style>
+    </dsp:sp>
+    <dsp:sp modelId="{7C7D2C7E-8266-41A9-B7F0-0E6D7FA2CAAE}">
+      <dsp:nvSpPr>
+        <dsp:cNvPr id="0" name=""/>
+        <dsp:cNvSpPr/>
+      </dsp:nvSpPr>
+      <dsp:spPr>
+        <a:xfrm>
+          <a:off x="4780731" y="903684"/>
+          <a:ext cx="2630536" cy="1315268"/>
         </a:xfrm>
         <a:prstGeom prst="rect">
           <a:avLst/>
@@ -3068,12 +1805,12 @@
         </a:fontRef>
       </dsp:style>
       <dsp:txBody>
-        <a:bodyPr spcFirstLastPara="0" vert="horz" wrap="square" lIns="6350" tIns="6350" rIns="6350" bIns="6350" numCol="1" spcCol="1270" anchor="ctr" anchorCtr="0">
+        <a:bodyPr spcFirstLastPara="0" vert="horz" wrap="square" lIns="13970" tIns="13970" rIns="13970" bIns="13970" numCol="1" spcCol="1270" anchor="ctr" anchorCtr="0">
           <a:noAutofit/>
         </a:bodyPr>
         <a:lstStyle/>
         <a:p>
-          <a:pPr marL="0" lvl="0" indent="0" algn="ctr" defTabSz="444500">
+          <a:pPr marL="0" lvl="0" indent="0" algn="ctr" defTabSz="977900">
             <a:lnSpc>
               <a:spcPct val="90000"/>
             </a:lnSpc>
@@ -3086,26 +1823,33 @@
             <a:buNone/>
           </a:pPr>
           <a:r>
-            <a:rPr lang="en-US" sz="1000" kern="1200" dirty="0"/>
-            <a:t>Welcome page (index)</a:t>
+            <a:rPr lang="ru-RU" sz="2200" kern="1200" dirty="0"/>
+            <a:t>Главная страница (</a:t>
           </a:r>
-          <a:endParaRPr lang="ru-RU" sz="1000" kern="1200" dirty="0"/>
+          <a:r>
+            <a:rPr lang="en-US" sz="2200" kern="1200" dirty="0"/>
+            <a:t>index.html</a:t>
+          </a:r>
+          <a:r>
+            <a:rPr lang="ru-RU" sz="2200" kern="1200" dirty="0"/>
+            <a:t>)</a:t>
+          </a:r>
         </a:p>
       </dsp:txBody>
       <dsp:txXfrm>
-        <a:off x="5664851" y="2484"/>
-        <a:ext cx="989707" cy="494853"/>
+        <a:off x="4780731" y="903684"/>
+        <a:ext cx="2630536" cy="1315268"/>
       </dsp:txXfrm>
     </dsp:sp>
-    <dsp:sp modelId="{A98B100C-274F-4765-88F3-AB7621990B39}">
+    <dsp:sp modelId="{5768DA00-30DE-4444-B4E5-B3EF52F0821A}">
       <dsp:nvSpPr>
         <dsp:cNvPr id="0" name=""/>
         <dsp:cNvSpPr/>
       </dsp:nvSpPr>
       <dsp:spPr>
         <a:xfrm>
-          <a:off x="3269760" y="705176"/>
-          <a:ext cx="989707" cy="494853"/>
+          <a:off x="6306" y="4639046"/>
+          <a:ext cx="2630536" cy="1315268"/>
         </a:xfrm>
         <a:prstGeom prst="rect">
           <a:avLst/>
@@ -3147,12 +1891,12 @@
         </a:fontRef>
       </dsp:style>
       <dsp:txBody>
-        <a:bodyPr spcFirstLastPara="0" vert="horz" wrap="square" lIns="6350" tIns="6350" rIns="6350" bIns="6350" numCol="1" spcCol="1270" anchor="ctr" anchorCtr="0">
+        <a:bodyPr spcFirstLastPara="0" vert="horz" wrap="square" lIns="13970" tIns="13970" rIns="13970" bIns="13970" numCol="1" spcCol="1270" anchor="ctr" anchorCtr="0">
           <a:noAutofit/>
         </a:bodyPr>
         <a:lstStyle/>
         <a:p>
-          <a:pPr marL="0" lvl="0" indent="0" algn="ctr" defTabSz="444500">
+          <a:pPr marL="0" lvl="0" indent="0" algn="ctr" defTabSz="977900">
             <a:lnSpc>
               <a:spcPct val="90000"/>
             </a:lnSpc>
@@ -3165,37 +1909,33 @@
             <a:buNone/>
           </a:pPr>
           <a:r>
-            <a:rPr lang="en-US" sz="1000" kern="1200" dirty="0"/>
-            <a:t>Main page </a:t>
+            <a:rPr lang="ru-RU" sz="2200" kern="1200" dirty="0"/>
+            <a:t>Путешествуем (</a:t>
           </a:r>
           <a:r>
-            <a:rPr lang="ru-RU" sz="1000" kern="1200" dirty="0"/>
-            <a:t>(</a:t>
+            <a:rPr lang="en-US" sz="2200" kern="1200" dirty="0"/>
+            <a:t>traveling.html</a:t>
           </a:r>
           <a:r>
-            <a:rPr lang="en-US" sz="1000" kern="1200" dirty="0"/>
-            <a:t>main</a:t>
-          </a:r>
-          <a:r>
-            <a:rPr lang="ru-RU" sz="1000" kern="1200" dirty="0"/>
+            <a:rPr lang="ru-RU" sz="2200" kern="1200" dirty="0"/>
             <a:t>)</a:t>
           </a:r>
         </a:p>
       </dsp:txBody>
       <dsp:txXfrm>
-        <a:off x="3269760" y="705176"/>
-        <a:ext cx="989707" cy="494853"/>
+        <a:off x="6306" y="4639046"/>
+        <a:ext cx="2630536" cy="1315268"/>
       </dsp:txXfrm>
     </dsp:sp>
-    <dsp:sp modelId="{A9C5A3E1-4B26-4770-85D6-B0E5B7630701}">
+    <dsp:sp modelId="{C8EF3C95-F073-43EA-8A54-504A01F394B5}">
       <dsp:nvSpPr>
         <dsp:cNvPr id="0" name=""/>
         <dsp:cNvSpPr/>
       </dsp:nvSpPr>
       <dsp:spPr>
         <a:xfrm>
-          <a:off x="1473441" y="1407868"/>
-          <a:ext cx="989707" cy="494853"/>
+          <a:off x="3189256" y="4639046"/>
+          <a:ext cx="2630536" cy="1315268"/>
         </a:xfrm>
         <a:prstGeom prst="rect">
           <a:avLst/>
@@ -3237,12 +1977,12 @@
         </a:fontRef>
       </dsp:style>
       <dsp:txBody>
-        <a:bodyPr spcFirstLastPara="0" vert="horz" wrap="square" lIns="6350" tIns="6350" rIns="6350" bIns="6350" numCol="1" spcCol="1270" anchor="ctr" anchorCtr="0">
+        <a:bodyPr spcFirstLastPara="0" vert="horz" wrap="square" lIns="13970" tIns="13970" rIns="13970" bIns="13970" numCol="1" spcCol="1270" anchor="ctr" anchorCtr="0">
           <a:noAutofit/>
         </a:bodyPr>
         <a:lstStyle/>
         <a:p>
-          <a:pPr marL="0" lvl="0" indent="0" algn="ctr" defTabSz="444500">
+          <a:pPr marL="0" lvl="0" indent="0" algn="ctr" defTabSz="977900">
             <a:lnSpc>
               <a:spcPct val="90000"/>
             </a:lnSpc>
@@ -3255,26 +1995,33 @@
             <a:buNone/>
           </a:pPr>
           <a:r>
-            <a:rPr lang="en-US" sz="1000" kern="1200" dirty="0"/>
-            <a:t>About page (about)</a:t>
+            <a:rPr lang="ru-RU" sz="2200" kern="1200" dirty="0"/>
+            <a:t>Изучаем страны (</a:t>
           </a:r>
-          <a:endParaRPr lang="ru-RU" sz="1000" kern="1200" dirty="0"/>
+          <a:r>
+            <a:rPr lang="en-US" sz="2200" kern="1200" dirty="0"/>
+            <a:t>countries_study.html</a:t>
+          </a:r>
+          <a:r>
+            <a:rPr lang="ru-RU" sz="2200" kern="1200" dirty="0"/>
+            <a:t>)</a:t>
+          </a:r>
         </a:p>
       </dsp:txBody>
       <dsp:txXfrm>
-        <a:off x="1473441" y="1407868"/>
-        <a:ext cx="989707" cy="494853"/>
+        <a:off x="3189256" y="4639046"/>
+        <a:ext cx="2630536" cy="1315268"/>
       </dsp:txXfrm>
     </dsp:sp>
-    <dsp:sp modelId="{FDD65648-DB74-42C8-A622-6966DB89CE5D}">
+    <dsp:sp modelId="{1280358D-5C16-49D0-93E5-A29B636B6D27}">
       <dsp:nvSpPr>
         <dsp:cNvPr id="0" name=""/>
         <dsp:cNvSpPr/>
       </dsp:nvSpPr>
       <dsp:spPr>
         <a:xfrm>
-          <a:off x="3868532" y="1407868"/>
-          <a:ext cx="989707" cy="494853"/>
+          <a:off x="6372205" y="4639046"/>
+          <a:ext cx="2630536" cy="1315268"/>
         </a:xfrm>
         <a:prstGeom prst="rect">
           <a:avLst/>
@@ -3316,12 +2063,12 @@
         </a:fontRef>
       </dsp:style>
       <dsp:txBody>
-        <a:bodyPr spcFirstLastPara="0" vert="horz" wrap="square" lIns="6350" tIns="6350" rIns="6350" bIns="6350" numCol="1" spcCol="1270" anchor="ctr" anchorCtr="0">
+        <a:bodyPr spcFirstLastPara="0" vert="horz" wrap="square" lIns="13970" tIns="13970" rIns="13970" bIns="13970" numCol="1" spcCol="1270" anchor="ctr" anchorCtr="0">
           <a:noAutofit/>
         </a:bodyPr>
         <a:lstStyle/>
         <a:p>
-          <a:pPr marL="0" lvl="0" indent="0" algn="ctr" defTabSz="444500">
+          <a:pPr marL="0" lvl="0" indent="0" algn="ctr" defTabSz="977900">
             <a:lnSpc>
               <a:spcPct val="90000"/>
             </a:lnSpc>
@@ -3334,34 +2081,33 @@
             <a:buNone/>
           </a:pPr>
           <a:r>
-            <a:rPr lang="en-US" sz="1000" kern="1200" dirty="0"/>
-            <a:t>Contacts page (</a:t>
+            <a:rPr lang="ru-RU" sz="2200" kern="1200" dirty="0"/>
+            <a:t>Советы путешественникам (</a:t>
           </a:r>
           <a:r>
-            <a:rPr lang="en-US" sz="1000" kern="1200" dirty="0" err="1"/>
-            <a:t>sontacts</a:t>
+            <a:rPr lang="en-US" sz="2200" kern="1200" dirty="0"/>
+            <a:t>traveling_tips.html</a:t>
           </a:r>
           <a:r>
-            <a:rPr lang="en-US" sz="1000" kern="1200" dirty="0"/>
+            <a:rPr lang="ru-RU" sz="2200" kern="1200" dirty="0"/>
             <a:t>)</a:t>
           </a:r>
-          <a:endParaRPr lang="ru-RU" sz="1000" kern="1200" dirty="0"/>
         </a:p>
       </dsp:txBody>
       <dsp:txXfrm>
-        <a:off x="3868532" y="1407868"/>
-        <a:ext cx="989707" cy="494853"/>
+        <a:off x="6372205" y="4639046"/>
+        <a:ext cx="2630536" cy="1315268"/>
       </dsp:txXfrm>
     </dsp:sp>
-    <dsp:sp modelId="{64239F16-4F55-49BE-88DC-6966CB06462B}">
+    <dsp:sp modelId="{56BBB9BA-E45F-40AF-A212-67D77FF51EAC}">
       <dsp:nvSpPr>
         <dsp:cNvPr id="0" name=""/>
         <dsp:cNvSpPr/>
       </dsp:nvSpPr>
       <dsp:spPr>
         <a:xfrm>
-          <a:off x="2072214" y="2110560"/>
-          <a:ext cx="989707" cy="494853"/>
+          <a:off x="9555155" y="4639046"/>
+          <a:ext cx="2630536" cy="1315268"/>
         </a:xfrm>
         <a:prstGeom prst="rect">
           <a:avLst/>
@@ -3403,12 +2149,12 @@
         </a:fontRef>
       </dsp:style>
       <dsp:txBody>
-        <a:bodyPr spcFirstLastPara="0" vert="horz" wrap="square" lIns="6350" tIns="6350" rIns="6350" bIns="6350" numCol="1" spcCol="1270" anchor="ctr" anchorCtr="0">
+        <a:bodyPr spcFirstLastPara="0" vert="horz" wrap="square" lIns="13970" tIns="13970" rIns="13970" bIns="13970" numCol="1" spcCol="1270" anchor="ctr" anchorCtr="0">
           <a:noAutofit/>
         </a:bodyPr>
         <a:lstStyle/>
         <a:p>
-          <a:pPr marL="0" lvl="0" indent="0" algn="ctr" defTabSz="444500">
+          <a:pPr marL="0" lvl="0" indent="0" algn="ctr" defTabSz="977900">
             <a:lnSpc>
               <a:spcPct val="90000"/>
             </a:lnSpc>
@@ -3421,26 +2167,33 @@
             <a:buNone/>
           </a:pPr>
           <a:r>
-            <a:rPr lang="en-US" sz="1000" kern="1200" dirty="0"/>
-            <a:t>Traveling page (traveling)</a:t>
+            <a:rPr lang="ru-RU" sz="2200" kern="1200" dirty="0"/>
+            <a:t>О нас (</a:t>
           </a:r>
-          <a:endParaRPr lang="ru-RU" sz="1000" kern="1200" dirty="0"/>
+          <a:r>
+            <a:rPr lang="en-US" sz="2200" kern="1200" dirty="0"/>
+            <a:t>about_us.html</a:t>
+          </a:r>
+          <a:r>
+            <a:rPr lang="ru-RU" sz="2200" kern="1200" dirty="0"/>
+            <a:t>)</a:t>
+          </a:r>
         </a:p>
       </dsp:txBody>
       <dsp:txXfrm>
-        <a:off x="2072214" y="2110560"/>
-        <a:ext cx="989707" cy="494853"/>
+        <a:off x="9555155" y="4639046"/>
+        <a:ext cx="2630536" cy="1315268"/>
       </dsp:txXfrm>
     </dsp:sp>
-    <dsp:sp modelId="{84A4997E-AA68-44A1-B49D-095020597CC6}">
+    <dsp:sp modelId="{6A17E83B-A51A-48BF-AEAB-13C83E0E1E3D}">
       <dsp:nvSpPr>
         <dsp:cNvPr id="0" name=""/>
         <dsp:cNvSpPr/>
       </dsp:nvSpPr>
       <dsp:spPr>
         <a:xfrm>
-          <a:off x="1473441" y="2813252"/>
-          <a:ext cx="989707" cy="494853"/>
+          <a:off x="3189256" y="2771365"/>
+          <a:ext cx="2630536" cy="1315268"/>
         </a:xfrm>
         <a:prstGeom prst="rect">
           <a:avLst/>
@@ -3482,12 +2235,12 @@
         </a:fontRef>
       </dsp:style>
       <dsp:txBody>
-        <a:bodyPr spcFirstLastPara="0" vert="horz" wrap="square" lIns="6350" tIns="6350" rIns="6350" bIns="6350" numCol="1" spcCol="1270" anchor="ctr" anchorCtr="0">
+        <a:bodyPr spcFirstLastPara="0" vert="horz" wrap="square" lIns="13970" tIns="13970" rIns="13970" bIns="13970" numCol="1" spcCol="1270" anchor="ctr" anchorCtr="0">
           <a:noAutofit/>
         </a:bodyPr>
         <a:lstStyle/>
         <a:p>
-          <a:pPr marL="0" lvl="0" indent="0" algn="ctr" defTabSz="444500">
+          <a:pPr marL="0" lvl="0" indent="0" algn="ctr" defTabSz="977900">
             <a:lnSpc>
               <a:spcPct val="90000"/>
             </a:lnSpc>
@@ -3500,742 +2253,22 @@
             <a:buNone/>
           </a:pPr>
           <a:r>
-            <a:rPr lang="en-US" sz="1000" kern="1200" dirty="0"/>
-            <a:t>Traveling blog</a:t>
+            <a:rPr lang="ru-RU" sz="2200" kern="1200" dirty="0"/>
+            <a:t>Учим языки (</a:t>
           </a:r>
-          <a:endParaRPr lang="ru-RU" sz="1000" kern="1200" dirty="0"/>
+          <a:r>
+            <a:rPr lang="en-US" sz="2200" kern="1200" dirty="0"/>
+            <a:t>language_study.html</a:t>
+          </a:r>
+          <a:r>
+            <a:rPr lang="ru-RU" sz="2200" kern="1200" dirty="0"/>
+            <a:t>)</a:t>
+          </a:r>
         </a:p>
       </dsp:txBody>
       <dsp:txXfrm>
-        <a:off x="1473441" y="2813252"/>
-        <a:ext cx="989707" cy="494853"/>
-      </dsp:txXfrm>
-    </dsp:sp>
-    <dsp:sp modelId="{547EBEB2-66F4-49F2-9EC4-FE62025F48E9}">
-      <dsp:nvSpPr>
-        <dsp:cNvPr id="0" name=""/>
-        <dsp:cNvSpPr/>
-      </dsp:nvSpPr>
-      <dsp:spPr>
-        <a:xfrm>
-          <a:off x="2670987" y="2813252"/>
-          <a:ext cx="989707" cy="494853"/>
-        </a:xfrm>
-        <a:prstGeom prst="rect">
-          <a:avLst/>
-        </a:prstGeom>
-        <a:solidFill>
-          <a:schemeClr val="accent1">
-            <a:hueOff val="0"/>
-            <a:satOff val="0"/>
-            <a:lumOff val="0"/>
-            <a:alphaOff val="0"/>
-          </a:schemeClr>
-        </a:solidFill>
-        <a:ln w="12700" cap="flat" cmpd="sng" algn="ctr">
-          <a:solidFill>
-            <a:schemeClr val="lt1">
-              <a:hueOff val="0"/>
-              <a:satOff val="0"/>
-              <a:lumOff val="0"/>
-              <a:alphaOff val="0"/>
-            </a:schemeClr>
-          </a:solidFill>
-          <a:prstDash val="solid"/>
-          <a:miter lim="800000"/>
-        </a:ln>
-        <a:effectLst/>
-      </dsp:spPr>
-      <dsp:style>
-        <a:lnRef idx="2">
-          <a:scrgbClr r="0" g="0" b="0"/>
-        </a:lnRef>
-        <a:fillRef idx="1">
-          <a:scrgbClr r="0" g="0" b="0"/>
-        </a:fillRef>
-        <a:effectRef idx="0">
-          <a:scrgbClr r="0" g="0" b="0"/>
-        </a:effectRef>
-        <a:fontRef idx="minor">
-          <a:schemeClr val="lt1"/>
-        </a:fontRef>
-      </dsp:style>
-      <dsp:txBody>
-        <a:bodyPr spcFirstLastPara="0" vert="horz" wrap="square" lIns="6350" tIns="6350" rIns="6350" bIns="6350" numCol="1" spcCol="1270" anchor="ctr" anchorCtr="0">
-          <a:noAutofit/>
-        </a:bodyPr>
-        <a:lstStyle/>
-        <a:p>
-          <a:pPr marL="0" lvl="0" indent="0" algn="ctr" defTabSz="444500">
-            <a:lnSpc>
-              <a:spcPct val="90000"/>
-            </a:lnSpc>
-            <a:spcBef>
-              <a:spcPct val="0"/>
-            </a:spcBef>
-            <a:spcAft>
-              <a:spcPct val="35000"/>
-            </a:spcAft>
-            <a:buNone/>
-          </a:pPr>
-          <a:r>
-            <a:rPr lang="en-US" sz="1000" kern="1200" dirty="0"/>
-            <a:t>Offers</a:t>
-          </a:r>
-          <a:endParaRPr lang="ru-RU" sz="1000" kern="1200" dirty="0"/>
-        </a:p>
-      </dsp:txBody>
-      <dsp:txXfrm>
-        <a:off x="2670987" y="2813252"/>
-        <a:ext cx="989707" cy="494853"/>
-      </dsp:txXfrm>
-    </dsp:sp>
-    <dsp:sp modelId="{2C1A0EB1-97B2-4B4E-9148-A93F6736BFB2}">
-      <dsp:nvSpPr>
-        <dsp:cNvPr id="0" name=""/>
-        <dsp:cNvSpPr/>
-      </dsp:nvSpPr>
-      <dsp:spPr>
-        <a:xfrm>
-          <a:off x="4467305" y="2110560"/>
-          <a:ext cx="989707" cy="494853"/>
-        </a:xfrm>
-        <a:prstGeom prst="rect">
-          <a:avLst/>
-        </a:prstGeom>
-        <a:solidFill>
-          <a:schemeClr val="accent1">
-            <a:hueOff val="0"/>
-            <a:satOff val="0"/>
-            <a:lumOff val="0"/>
-            <a:alphaOff val="0"/>
-          </a:schemeClr>
-        </a:solidFill>
-        <a:ln w="12700" cap="flat" cmpd="sng" algn="ctr">
-          <a:solidFill>
-            <a:schemeClr val="lt1">
-              <a:hueOff val="0"/>
-              <a:satOff val="0"/>
-              <a:lumOff val="0"/>
-              <a:alphaOff val="0"/>
-            </a:schemeClr>
-          </a:solidFill>
-          <a:prstDash val="solid"/>
-          <a:miter lim="800000"/>
-        </a:ln>
-        <a:effectLst/>
-      </dsp:spPr>
-      <dsp:style>
-        <a:lnRef idx="2">
-          <a:scrgbClr r="0" g="0" b="0"/>
-        </a:lnRef>
-        <a:fillRef idx="1">
-          <a:scrgbClr r="0" g="0" b="0"/>
-        </a:fillRef>
-        <a:effectRef idx="0">
-          <a:scrgbClr r="0" g="0" b="0"/>
-        </a:effectRef>
-        <a:fontRef idx="minor">
-          <a:schemeClr val="lt1"/>
-        </a:fontRef>
-      </dsp:style>
-      <dsp:txBody>
-        <a:bodyPr spcFirstLastPara="0" vert="horz" wrap="square" lIns="6350" tIns="6350" rIns="6350" bIns="6350" numCol="1" spcCol="1270" anchor="ctr" anchorCtr="0">
-          <a:noAutofit/>
-        </a:bodyPr>
-        <a:lstStyle/>
-        <a:p>
-          <a:pPr marL="0" lvl="0" indent="0" algn="ctr" defTabSz="444500">
-            <a:lnSpc>
-              <a:spcPct val="90000"/>
-            </a:lnSpc>
-            <a:spcBef>
-              <a:spcPct val="0"/>
-            </a:spcBef>
-            <a:spcAft>
-              <a:spcPct val="35000"/>
-            </a:spcAft>
-            <a:buNone/>
-          </a:pPr>
-          <a:r>
-            <a:rPr lang="en-US" sz="1000" kern="1200" dirty="0"/>
-            <a:t>Gifts shop page (</a:t>
-          </a:r>
-          <a:r>
-            <a:rPr lang="en-US" sz="1000" kern="1200" dirty="0" err="1"/>
-            <a:t>gifts_shop</a:t>
-          </a:r>
-          <a:r>
-            <a:rPr lang="en-US" sz="1000" kern="1200" dirty="0"/>
-            <a:t>)</a:t>
-          </a:r>
-          <a:endParaRPr lang="ru-RU" sz="1000" kern="1200" dirty="0"/>
-        </a:p>
-      </dsp:txBody>
-      <dsp:txXfrm>
-        <a:off x="4467305" y="2110560"/>
-        <a:ext cx="989707" cy="494853"/>
-      </dsp:txXfrm>
-    </dsp:sp>
-    <dsp:sp modelId="{97D0B171-D747-4050-93EA-AFF2D46A22E5}">
-      <dsp:nvSpPr>
-        <dsp:cNvPr id="0" name=""/>
-        <dsp:cNvSpPr/>
-      </dsp:nvSpPr>
-      <dsp:spPr>
-        <a:xfrm>
-          <a:off x="3868532" y="2813252"/>
-          <a:ext cx="989707" cy="494853"/>
-        </a:xfrm>
-        <a:prstGeom prst="rect">
-          <a:avLst/>
-        </a:prstGeom>
-        <a:solidFill>
-          <a:schemeClr val="accent1">
-            <a:hueOff val="0"/>
-            <a:satOff val="0"/>
-            <a:lumOff val="0"/>
-            <a:alphaOff val="0"/>
-          </a:schemeClr>
-        </a:solidFill>
-        <a:ln w="12700" cap="flat" cmpd="sng" algn="ctr">
-          <a:solidFill>
-            <a:schemeClr val="lt1">
-              <a:hueOff val="0"/>
-              <a:satOff val="0"/>
-              <a:lumOff val="0"/>
-              <a:alphaOff val="0"/>
-            </a:schemeClr>
-          </a:solidFill>
-          <a:prstDash val="solid"/>
-          <a:miter lim="800000"/>
-        </a:ln>
-        <a:effectLst/>
-      </dsp:spPr>
-      <dsp:style>
-        <a:lnRef idx="2">
-          <a:scrgbClr r="0" g="0" b="0"/>
-        </a:lnRef>
-        <a:fillRef idx="1">
-          <a:scrgbClr r="0" g="0" b="0"/>
-        </a:fillRef>
-        <a:effectRef idx="0">
-          <a:scrgbClr r="0" g="0" b="0"/>
-        </a:effectRef>
-        <a:fontRef idx="minor">
-          <a:schemeClr val="lt1"/>
-        </a:fontRef>
-      </dsp:style>
-      <dsp:txBody>
-        <a:bodyPr spcFirstLastPara="0" vert="horz" wrap="square" lIns="6350" tIns="6350" rIns="6350" bIns="6350" numCol="1" spcCol="1270" anchor="ctr" anchorCtr="0">
-          <a:noAutofit/>
-        </a:bodyPr>
-        <a:lstStyle/>
-        <a:p>
-          <a:pPr marL="0" lvl="0" indent="0" algn="ctr" defTabSz="444500">
-            <a:lnSpc>
-              <a:spcPct val="90000"/>
-            </a:lnSpc>
-            <a:spcBef>
-              <a:spcPct val="0"/>
-            </a:spcBef>
-            <a:spcAft>
-              <a:spcPct val="35000"/>
-            </a:spcAft>
-            <a:buNone/>
-          </a:pPr>
-          <a:r>
-            <a:rPr lang="en-US" sz="1000" kern="1200" dirty="0"/>
-            <a:t>Flowers</a:t>
-          </a:r>
-          <a:endParaRPr lang="ru-RU" sz="1000" kern="1200" dirty="0"/>
-        </a:p>
-      </dsp:txBody>
-      <dsp:txXfrm>
-        <a:off x="3868532" y="2813252"/>
-        <a:ext cx="989707" cy="494853"/>
-      </dsp:txXfrm>
-    </dsp:sp>
-    <dsp:sp modelId="{1E030A24-C840-4CA4-93A9-7740A2A70080}">
-      <dsp:nvSpPr>
-        <dsp:cNvPr id="0" name=""/>
-        <dsp:cNvSpPr/>
-      </dsp:nvSpPr>
-      <dsp:spPr>
-        <a:xfrm>
-          <a:off x="5066078" y="2813252"/>
-          <a:ext cx="989707" cy="494853"/>
-        </a:xfrm>
-        <a:prstGeom prst="rect">
-          <a:avLst/>
-        </a:prstGeom>
-        <a:solidFill>
-          <a:schemeClr val="accent1">
-            <a:hueOff val="0"/>
-            <a:satOff val="0"/>
-            <a:lumOff val="0"/>
-            <a:alphaOff val="0"/>
-          </a:schemeClr>
-        </a:solidFill>
-        <a:ln w="12700" cap="flat" cmpd="sng" algn="ctr">
-          <a:solidFill>
-            <a:schemeClr val="lt1">
-              <a:hueOff val="0"/>
-              <a:satOff val="0"/>
-              <a:lumOff val="0"/>
-              <a:alphaOff val="0"/>
-            </a:schemeClr>
-          </a:solidFill>
-          <a:prstDash val="solid"/>
-          <a:miter lim="800000"/>
-        </a:ln>
-        <a:effectLst/>
-      </dsp:spPr>
-      <dsp:style>
-        <a:lnRef idx="2">
-          <a:scrgbClr r="0" g="0" b="0"/>
-        </a:lnRef>
-        <a:fillRef idx="1">
-          <a:scrgbClr r="0" g="0" b="0"/>
-        </a:fillRef>
-        <a:effectRef idx="0">
-          <a:scrgbClr r="0" g="0" b="0"/>
-        </a:effectRef>
-        <a:fontRef idx="minor">
-          <a:schemeClr val="lt1"/>
-        </a:fontRef>
-      </dsp:style>
-      <dsp:txBody>
-        <a:bodyPr spcFirstLastPara="0" vert="horz" wrap="square" lIns="6350" tIns="6350" rIns="6350" bIns="6350" numCol="1" spcCol="1270" anchor="ctr" anchorCtr="0">
-          <a:noAutofit/>
-        </a:bodyPr>
-        <a:lstStyle/>
-        <a:p>
-          <a:pPr marL="0" lvl="0" indent="0" algn="ctr" defTabSz="444500">
-            <a:lnSpc>
-              <a:spcPct val="90000"/>
-            </a:lnSpc>
-            <a:spcBef>
-              <a:spcPct val="0"/>
-            </a:spcBef>
-            <a:spcAft>
-              <a:spcPct val="35000"/>
-            </a:spcAft>
-            <a:buNone/>
-          </a:pPr>
-          <a:r>
-            <a:rPr lang="en-US" sz="1000" kern="1200" dirty="0"/>
-            <a:t>Other ?</a:t>
-          </a:r>
-          <a:endParaRPr lang="ru-RU" sz="1000" kern="1200" dirty="0"/>
-        </a:p>
-      </dsp:txBody>
-      <dsp:txXfrm>
-        <a:off x="5066078" y="2813252"/>
-        <a:ext cx="989707" cy="494853"/>
-      </dsp:txXfrm>
-    </dsp:sp>
-    <dsp:sp modelId="{FBDFA012-C5E2-4143-AC77-97EC51731B91}">
-      <dsp:nvSpPr>
-        <dsp:cNvPr id="0" name=""/>
-        <dsp:cNvSpPr/>
-      </dsp:nvSpPr>
-      <dsp:spPr>
-        <a:xfrm>
-          <a:off x="1473441" y="3515944"/>
-          <a:ext cx="989707" cy="494853"/>
-        </a:xfrm>
-        <a:prstGeom prst="rect">
-          <a:avLst/>
-        </a:prstGeom>
-        <a:solidFill>
-          <a:schemeClr val="accent1">
-            <a:hueOff val="0"/>
-            <a:satOff val="0"/>
-            <a:lumOff val="0"/>
-            <a:alphaOff val="0"/>
-          </a:schemeClr>
-        </a:solidFill>
-        <a:ln w="12700" cap="flat" cmpd="sng" algn="ctr">
-          <a:solidFill>
-            <a:schemeClr val="lt1">
-              <a:hueOff val="0"/>
-              <a:satOff val="0"/>
-              <a:lumOff val="0"/>
-              <a:alphaOff val="0"/>
-            </a:schemeClr>
-          </a:solidFill>
-          <a:prstDash val="solid"/>
-          <a:miter lim="800000"/>
-        </a:ln>
-        <a:effectLst/>
-      </dsp:spPr>
-      <dsp:style>
-        <a:lnRef idx="2">
-          <a:scrgbClr r="0" g="0" b="0"/>
-        </a:lnRef>
-        <a:fillRef idx="1">
-          <a:scrgbClr r="0" g="0" b="0"/>
-        </a:fillRef>
-        <a:effectRef idx="0">
-          <a:scrgbClr r="0" g="0" b="0"/>
-        </a:effectRef>
-        <a:fontRef idx="minor">
-          <a:schemeClr val="lt1"/>
-        </a:fontRef>
-      </dsp:style>
-      <dsp:txBody>
-        <a:bodyPr spcFirstLastPara="0" vert="horz" wrap="square" lIns="6350" tIns="6350" rIns="6350" bIns="6350" numCol="1" spcCol="1270" anchor="ctr" anchorCtr="0">
-          <a:noAutofit/>
-        </a:bodyPr>
-        <a:lstStyle/>
-        <a:p>
-          <a:pPr marL="0" lvl="0" indent="0" algn="ctr" defTabSz="444500">
-            <a:lnSpc>
-              <a:spcPct val="90000"/>
-            </a:lnSpc>
-            <a:spcBef>
-              <a:spcPct val="0"/>
-            </a:spcBef>
-            <a:spcAft>
-              <a:spcPct val="35000"/>
-            </a:spcAft>
-            <a:buNone/>
-          </a:pPr>
-          <a:r>
-            <a:rPr lang="en-US" sz="1000" kern="1200" dirty="0"/>
-            <a:t>Events organization page (</a:t>
-          </a:r>
-          <a:r>
-            <a:rPr lang="en-US" sz="1000" kern="1200" dirty="0" err="1"/>
-            <a:t>events_shop</a:t>
-          </a:r>
-          <a:r>
-            <a:rPr lang="en-US" sz="1000" kern="1200" dirty="0"/>
-            <a:t>)</a:t>
-          </a:r>
-          <a:endParaRPr lang="ru-RU" sz="1000" kern="1200" dirty="0"/>
-        </a:p>
-      </dsp:txBody>
-      <dsp:txXfrm>
-        <a:off x="1473441" y="3515944"/>
-        <a:ext cx="989707" cy="494853"/>
-      </dsp:txXfrm>
-    </dsp:sp>
-    <dsp:sp modelId="{6EEA9D6A-07CA-4B8D-9992-7C70A1A8C11D}">
-      <dsp:nvSpPr>
-        <dsp:cNvPr id="0" name=""/>
-        <dsp:cNvSpPr/>
-      </dsp:nvSpPr>
-      <dsp:spPr>
-        <a:xfrm>
-          <a:off x="4467305" y="3515944"/>
-          <a:ext cx="989707" cy="494853"/>
-        </a:xfrm>
-        <a:prstGeom prst="rect">
-          <a:avLst/>
-        </a:prstGeom>
-        <a:solidFill>
-          <a:schemeClr val="accent1">
-            <a:hueOff val="0"/>
-            <a:satOff val="0"/>
-            <a:lumOff val="0"/>
-            <a:alphaOff val="0"/>
-          </a:schemeClr>
-        </a:solidFill>
-        <a:ln w="12700" cap="flat" cmpd="sng" algn="ctr">
-          <a:solidFill>
-            <a:schemeClr val="lt1">
-              <a:hueOff val="0"/>
-              <a:satOff val="0"/>
-              <a:lumOff val="0"/>
-              <a:alphaOff val="0"/>
-            </a:schemeClr>
-          </a:solidFill>
-          <a:prstDash val="solid"/>
-          <a:miter lim="800000"/>
-        </a:ln>
-        <a:effectLst/>
-      </dsp:spPr>
-      <dsp:style>
-        <a:lnRef idx="2">
-          <a:scrgbClr r="0" g="0" b="0"/>
-        </a:lnRef>
-        <a:fillRef idx="1">
-          <a:scrgbClr r="0" g="0" b="0"/>
-        </a:fillRef>
-        <a:effectRef idx="0">
-          <a:scrgbClr r="0" g="0" b="0"/>
-        </a:effectRef>
-        <a:fontRef idx="minor">
-          <a:schemeClr val="lt1"/>
-        </a:fontRef>
-      </dsp:style>
-      <dsp:txBody>
-        <a:bodyPr spcFirstLastPara="0" vert="horz" wrap="square" lIns="6350" tIns="6350" rIns="6350" bIns="6350" numCol="1" spcCol="1270" anchor="ctr" anchorCtr="0">
-          <a:noAutofit/>
-        </a:bodyPr>
-        <a:lstStyle/>
-        <a:p>
-          <a:pPr marL="0" lvl="0" indent="0" algn="ctr" defTabSz="444500">
-            <a:lnSpc>
-              <a:spcPct val="90000"/>
-            </a:lnSpc>
-            <a:spcBef>
-              <a:spcPct val="0"/>
-            </a:spcBef>
-            <a:spcAft>
-              <a:spcPct val="35000"/>
-            </a:spcAft>
-            <a:buNone/>
-          </a:pPr>
-          <a:r>
-            <a:rPr lang="en-US" sz="1000" kern="1200" dirty="0"/>
-            <a:t>Languages page (languages)</a:t>
-          </a:r>
-          <a:endParaRPr lang="ru-RU" sz="1000" kern="1200" dirty="0"/>
-        </a:p>
-      </dsp:txBody>
-      <dsp:txXfrm>
-        <a:off x="4467305" y="3515944"/>
-        <a:ext cx="989707" cy="494853"/>
-      </dsp:txXfrm>
-    </dsp:sp>
-    <dsp:sp modelId="{16628B9F-A31E-415A-8135-4F45991C26C3}">
-      <dsp:nvSpPr>
-        <dsp:cNvPr id="0" name=""/>
-        <dsp:cNvSpPr/>
-      </dsp:nvSpPr>
-      <dsp:spPr>
-        <a:xfrm>
-          <a:off x="3868532" y="4218636"/>
-          <a:ext cx="989707" cy="494853"/>
-        </a:xfrm>
-        <a:prstGeom prst="rect">
-          <a:avLst/>
-        </a:prstGeom>
-        <a:solidFill>
-          <a:schemeClr val="accent1">
-            <a:hueOff val="0"/>
-            <a:satOff val="0"/>
-            <a:lumOff val="0"/>
-            <a:alphaOff val="0"/>
-          </a:schemeClr>
-        </a:solidFill>
-        <a:ln w="12700" cap="flat" cmpd="sng" algn="ctr">
-          <a:solidFill>
-            <a:schemeClr val="lt1">
-              <a:hueOff val="0"/>
-              <a:satOff val="0"/>
-              <a:lumOff val="0"/>
-              <a:alphaOff val="0"/>
-            </a:schemeClr>
-          </a:solidFill>
-          <a:prstDash val="solid"/>
-          <a:miter lim="800000"/>
-        </a:ln>
-        <a:effectLst/>
-      </dsp:spPr>
-      <dsp:style>
-        <a:lnRef idx="2">
-          <a:scrgbClr r="0" g="0" b="0"/>
-        </a:lnRef>
-        <a:fillRef idx="1">
-          <a:scrgbClr r="0" g="0" b="0"/>
-        </a:fillRef>
-        <a:effectRef idx="0">
-          <a:scrgbClr r="0" g="0" b="0"/>
-        </a:effectRef>
-        <a:fontRef idx="minor">
-          <a:schemeClr val="lt1"/>
-        </a:fontRef>
-      </dsp:style>
-      <dsp:txBody>
-        <a:bodyPr spcFirstLastPara="0" vert="horz" wrap="square" lIns="6350" tIns="6350" rIns="6350" bIns="6350" numCol="1" spcCol="1270" anchor="ctr" anchorCtr="0">
-          <a:noAutofit/>
-        </a:bodyPr>
-        <a:lstStyle/>
-        <a:p>
-          <a:pPr marL="0" lvl="0" indent="0" algn="ctr" defTabSz="444500">
-            <a:lnSpc>
-              <a:spcPct val="90000"/>
-            </a:lnSpc>
-            <a:spcBef>
-              <a:spcPct val="0"/>
-            </a:spcBef>
-            <a:spcAft>
-              <a:spcPct val="35000"/>
-            </a:spcAft>
-            <a:buNone/>
-          </a:pPr>
-          <a:r>
-            <a:rPr lang="en-US" sz="1000" kern="1200" dirty="0"/>
-            <a:t>Learning page / games</a:t>
-          </a:r>
-          <a:endParaRPr lang="ru-RU" sz="1000" kern="1200" dirty="0"/>
-        </a:p>
-      </dsp:txBody>
-      <dsp:txXfrm>
-        <a:off x="3868532" y="4218636"/>
-        <a:ext cx="989707" cy="494853"/>
-      </dsp:txXfrm>
-    </dsp:sp>
-    <dsp:sp modelId="{D7E7819D-BE5A-4C2D-863E-98D41FCE3D35}">
-      <dsp:nvSpPr>
-        <dsp:cNvPr id="0" name=""/>
-        <dsp:cNvSpPr/>
-      </dsp:nvSpPr>
-      <dsp:spPr>
-        <a:xfrm>
-          <a:off x="5066078" y="4218636"/>
-          <a:ext cx="989707" cy="494853"/>
-        </a:xfrm>
-        <a:prstGeom prst="rect">
-          <a:avLst/>
-        </a:prstGeom>
-        <a:solidFill>
-          <a:schemeClr val="accent1">
-            <a:hueOff val="0"/>
-            <a:satOff val="0"/>
-            <a:lumOff val="0"/>
-            <a:alphaOff val="0"/>
-          </a:schemeClr>
-        </a:solidFill>
-        <a:ln w="12700" cap="flat" cmpd="sng" algn="ctr">
-          <a:solidFill>
-            <a:schemeClr val="lt1">
-              <a:hueOff val="0"/>
-              <a:satOff val="0"/>
-              <a:lumOff val="0"/>
-              <a:alphaOff val="0"/>
-            </a:schemeClr>
-          </a:solidFill>
-          <a:prstDash val="solid"/>
-          <a:miter lim="800000"/>
-        </a:ln>
-        <a:effectLst/>
-      </dsp:spPr>
-      <dsp:style>
-        <a:lnRef idx="2">
-          <a:scrgbClr r="0" g="0" b="0"/>
-        </a:lnRef>
-        <a:fillRef idx="1">
-          <a:scrgbClr r="0" g="0" b="0"/>
-        </a:fillRef>
-        <a:effectRef idx="0">
-          <a:scrgbClr r="0" g="0" b="0"/>
-        </a:effectRef>
-        <a:fontRef idx="minor">
-          <a:schemeClr val="lt1"/>
-        </a:fontRef>
-      </dsp:style>
-      <dsp:txBody>
-        <a:bodyPr spcFirstLastPara="0" vert="horz" wrap="square" lIns="6350" tIns="6350" rIns="6350" bIns="6350" numCol="1" spcCol="1270" anchor="ctr" anchorCtr="0">
-          <a:noAutofit/>
-        </a:bodyPr>
-        <a:lstStyle/>
-        <a:p>
-          <a:pPr marL="0" lvl="0" indent="0" algn="ctr" defTabSz="444500">
-            <a:lnSpc>
-              <a:spcPct val="90000"/>
-            </a:lnSpc>
-            <a:spcBef>
-              <a:spcPct val="0"/>
-            </a:spcBef>
-            <a:spcAft>
-              <a:spcPct val="35000"/>
-            </a:spcAft>
-            <a:buNone/>
-          </a:pPr>
-          <a:r>
-            <a:rPr lang="en-US" sz="1000" kern="1200" dirty="0"/>
-            <a:t>All about languages</a:t>
-          </a:r>
-          <a:endParaRPr lang="ru-RU" sz="1000" kern="1200" dirty="0"/>
-        </a:p>
-      </dsp:txBody>
-      <dsp:txXfrm>
-        <a:off x="5066078" y="4218636"/>
-        <a:ext cx="989707" cy="494853"/>
-      </dsp:txXfrm>
-    </dsp:sp>
-    <dsp:sp modelId="{B8A0060D-18B6-436B-8EE4-4E837AA06BE6}">
-      <dsp:nvSpPr>
-        <dsp:cNvPr id="0" name=""/>
-        <dsp:cNvSpPr/>
-      </dsp:nvSpPr>
-      <dsp:spPr>
-        <a:xfrm>
-          <a:off x="3868532" y="4921328"/>
-          <a:ext cx="989707" cy="494853"/>
-        </a:xfrm>
-        <a:prstGeom prst="rect">
-          <a:avLst/>
-        </a:prstGeom>
-        <a:solidFill>
-          <a:schemeClr val="accent1">
-            <a:hueOff val="0"/>
-            <a:satOff val="0"/>
-            <a:lumOff val="0"/>
-            <a:alphaOff val="0"/>
-          </a:schemeClr>
-        </a:solidFill>
-        <a:ln w="12700" cap="flat" cmpd="sng" algn="ctr">
-          <a:solidFill>
-            <a:schemeClr val="lt1">
-              <a:hueOff val="0"/>
-              <a:satOff val="0"/>
-              <a:lumOff val="0"/>
-              <a:alphaOff val="0"/>
-            </a:schemeClr>
-          </a:solidFill>
-          <a:prstDash val="solid"/>
-          <a:miter lim="800000"/>
-        </a:ln>
-        <a:effectLst/>
-      </dsp:spPr>
-      <dsp:style>
-        <a:lnRef idx="2">
-          <a:scrgbClr r="0" g="0" b="0"/>
-        </a:lnRef>
-        <a:fillRef idx="1">
-          <a:scrgbClr r="0" g="0" b="0"/>
-        </a:fillRef>
-        <a:effectRef idx="0">
-          <a:scrgbClr r="0" g="0" b="0"/>
-        </a:effectRef>
-        <a:fontRef idx="minor">
-          <a:schemeClr val="lt1"/>
-        </a:fontRef>
-      </dsp:style>
-      <dsp:txBody>
-        <a:bodyPr spcFirstLastPara="0" vert="horz" wrap="square" lIns="6350" tIns="6350" rIns="6350" bIns="6350" numCol="1" spcCol="1270" anchor="ctr" anchorCtr="0">
-          <a:noAutofit/>
-        </a:bodyPr>
-        <a:lstStyle/>
-        <a:p>
-          <a:pPr marL="0" lvl="0" indent="0" algn="ctr" defTabSz="444500">
-            <a:lnSpc>
-              <a:spcPct val="90000"/>
-            </a:lnSpc>
-            <a:spcBef>
-              <a:spcPct val="0"/>
-            </a:spcBef>
-            <a:spcAft>
-              <a:spcPct val="35000"/>
-            </a:spcAft>
-            <a:buNone/>
-          </a:pPr>
-          <a:r>
-            <a:rPr lang="en-US" sz="1000" kern="1200" dirty="0"/>
-            <a:t>Courses</a:t>
-          </a:r>
-          <a:endParaRPr lang="ru-RU" sz="1000" kern="1200" dirty="0"/>
-        </a:p>
-      </dsp:txBody>
-      <dsp:txXfrm>
-        <a:off x="3868532" y="4921328"/>
-        <a:ext cx="989707" cy="494853"/>
+        <a:off x="3189256" y="2771365"/>
+        <a:ext cx="2630536" cy="1315268"/>
       </dsp:txXfrm>
     </dsp:sp>
   </dsp:spTree>
@@ -6467,7 +4500,6 @@
               <a:rPr lang="ru-RU"/>
               <a:t>Образец заголовка</a:t>
             </a:r>
-            <a:endParaRPr lang="ru-RU"/>
           </a:p>
         </p:txBody>
       </p:sp>
@@ -6532,7 +4564,6 @@
               <a:rPr lang="ru-RU"/>
               <a:t>Образец подзаголовка</a:t>
             </a:r>
-            <a:endParaRPr lang="ru-RU"/>
           </a:p>
         </p:txBody>
       </p:sp>
@@ -6553,7 +4584,7 @@
           <a:p>
             <a:fld id="{D4F0CBB7-6BAD-4AC4-BD78-10C1BA832273}" type="datetimeFigureOut">
               <a:rPr lang="ru-RU" smtClean="0"/>
-              <a:t>26.11.2016</a:t>
+              <a:t>28.11.2016</a:t>
             </a:fld>
             <a:endParaRPr lang="ru-RU"/>
           </a:p>
@@ -6650,7 +4681,6 @@
               <a:rPr lang="ru-RU"/>
               <a:t>Образец заголовка</a:t>
             </a:r>
-            <a:endParaRPr lang="ru-RU"/>
           </a:p>
         </p:txBody>
       </p:sp>
@@ -6702,7 +4732,6 @@
               <a:rPr lang="ru-RU"/>
               <a:t>Пятый уровень</a:t>
             </a:r>
-            <a:endParaRPr lang="ru-RU"/>
           </a:p>
         </p:txBody>
       </p:sp>
@@ -6723,7 +4752,7 @@
           <a:p>
             <a:fld id="{D4F0CBB7-6BAD-4AC4-BD78-10C1BA832273}" type="datetimeFigureOut">
               <a:rPr lang="ru-RU" smtClean="0"/>
-              <a:t>26.11.2016</a:t>
+              <a:t>28.11.2016</a:t>
             </a:fld>
             <a:endParaRPr lang="ru-RU"/>
           </a:p>
@@ -6825,7 +4854,6 @@
               <a:rPr lang="ru-RU"/>
               <a:t>Образец заголовка</a:t>
             </a:r>
-            <a:endParaRPr lang="ru-RU"/>
           </a:p>
         </p:txBody>
       </p:sp>
@@ -6882,7 +4910,6 @@
               <a:rPr lang="ru-RU"/>
               <a:t>Пятый уровень</a:t>
             </a:r>
-            <a:endParaRPr lang="ru-RU"/>
           </a:p>
         </p:txBody>
       </p:sp>
@@ -6903,7 +4930,7 @@
           <a:p>
             <a:fld id="{D4F0CBB7-6BAD-4AC4-BD78-10C1BA832273}" type="datetimeFigureOut">
               <a:rPr lang="ru-RU" smtClean="0"/>
-              <a:t>26.11.2016</a:t>
+              <a:t>28.11.2016</a:t>
             </a:fld>
             <a:endParaRPr lang="ru-RU"/>
           </a:p>
@@ -7000,7 +5027,6 @@
               <a:rPr lang="ru-RU"/>
               <a:t>Образец заголовка</a:t>
             </a:r>
-            <a:endParaRPr lang="ru-RU"/>
           </a:p>
         </p:txBody>
       </p:sp>
@@ -7052,7 +5078,6 @@
               <a:rPr lang="ru-RU"/>
               <a:t>Пятый уровень</a:t>
             </a:r>
-            <a:endParaRPr lang="ru-RU"/>
           </a:p>
         </p:txBody>
       </p:sp>
@@ -7073,7 +5098,7 @@
           <a:p>
             <a:fld id="{D4F0CBB7-6BAD-4AC4-BD78-10C1BA832273}" type="datetimeFigureOut">
               <a:rPr lang="ru-RU" smtClean="0"/>
-              <a:t>26.11.2016</a:t>
+              <a:t>28.11.2016</a:t>
             </a:fld>
             <a:endParaRPr lang="ru-RU"/>
           </a:p>
@@ -7179,7 +5204,6 @@
               <a:rPr lang="ru-RU"/>
               <a:t>Образец заголовка</a:t>
             </a:r>
-            <a:endParaRPr lang="ru-RU"/>
           </a:p>
         </p:txBody>
       </p:sp>
@@ -7319,7 +5343,7 @@
           <a:p>
             <a:fld id="{D4F0CBB7-6BAD-4AC4-BD78-10C1BA832273}" type="datetimeFigureOut">
               <a:rPr lang="ru-RU" smtClean="0"/>
-              <a:t>26.11.2016</a:t>
+              <a:t>28.11.2016</a:t>
             </a:fld>
             <a:endParaRPr lang="ru-RU"/>
           </a:p>
@@ -7416,7 +5440,6 @@
               <a:rPr lang="ru-RU"/>
               <a:t>Образец заголовка</a:t>
             </a:r>
-            <a:endParaRPr lang="ru-RU"/>
           </a:p>
         </p:txBody>
       </p:sp>
@@ -7473,7 +5496,6 @@
               <a:rPr lang="ru-RU"/>
               <a:t>Пятый уровень</a:t>
             </a:r>
-            <a:endParaRPr lang="ru-RU"/>
           </a:p>
         </p:txBody>
       </p:sp>
@@ -7530,7 +5552,6 @@
               <a:rPr lang="ru-RU"/>
               <a:t>Пятый уровень</a:t>
             </a:r>
-            <a:endParaRPr lang="ru-RU"/>
           </a:p>
         </p:txBody>
       </p:sp>
@@ -7551,7 +5572,7 @@
           <a:p>
             <a:fld id="{D4F0CBB7-6BAD-4AC4-BD78-10C1BA832273}" type="datetimeFigureOut">
               <a:rPr lang="ru-RU" smtClean="0"/>
-              <a:t>26.11.2016</a:t>
+              <a:t>28.11.2016</a:t>
             </a:fld>
             <a:endParaRPr lang="ru-RU"/>
           </a:p>
@@ -7653,7 +5674,6 @@
               <a:rPr lang="ru-RU"/>
               <a:t>Образец заголовка</a:t>
             </a:r>
-            <a:endParaRPr lang="ru-RU"/>
           </a:p>
         </p:txBody>
       </p:sp>
@@ -7775,7 +5795,6 @@
               <a:rPr lang="ru-RU"/>
               <a:t>Пятый уровень</a:t>
             </a:r>
-            <a:endParaRPr lang="ru-RU"/>
           </a:p>
         </p:txBody>
       </p:sp>
@@ -7897,7 +5916,6 @@
               <a:rPr lang="ru-RU"/>
               <a:t>Пятый уровень</a:t>
             </a:r>
-            <a:endParaRPr lang="ru-RU"/>
           </a:p>
         </p:txBody>
       </p:sp>
@@ -7918,7 +5936,7 @@
           <a:p>
             <a:fld id="{D4F0CBB7-6BAD-4AC4-BD78-10C1BA832273}" type="datetimeFigureOut">
               <a:rPr lang="ru-RU" smtClean="0"/>
-              <a:t>26.11.2016</a:t>
+              <a:t>28.11.2016</a:t>
             </a:fld>
             <a:endParaRPr lang="ru-RU"/>
           </a:p>
@@ -8015,7 +6033,6 @@
               <a:rPr lang="ru-RU"/>
               <a:t>Образец заголовка</a:t>
             </a:r>
-            <a:endParaRPr lang="ru-RU"/>
           </a:p>
         </p:txBody>
       </p:sp>
@@ -8036,7 +6053,7 @@
           <a:p>
             <a:fld id="{D4F0CBB7-6BAD-4AC4-BD78-10C1BA832273}" type="datetimeFigureOut">
               <a:rPr lang="ru-RU" smtClean="0"/>
-              <a:t>26.11.2016</a:t>
+              <a:t>28.11.2016</a:t>
             </a:fld>
             <a:endParaRPr lang="ru-RU"/>
           </a:p>
@@ -8131,7 +6148,7 @@
           <a:p>
             <a:fld id="{D4F0CBB7-6BAD-4AC4-BD78-10C1BA832273}" type="datetimeFigureOut">
               <a:rPr lang="ru-RU" smtClean="0"/>
-              <a:t>26.11.2016</a:t>
+              <a:t>28.11.2016</a:t>
             </a:fld>
             <a:endParaRPr lang="ru-RU"/>
           </a:p>
@@ -8237,7 +6254,6 @@
               <a:rPr lang="ru-RU"/>
               <a:t>Образец заголовка</a:t>
             </a:r>
-            <a:endParaRPr lang="ru-RU"/>
           </a:p>
         </p:txBody>
       </p:sp>
@@ -8322,7 +6338,6 @@
               <a:rPr lang="ru-RU"/>
               <a:t>Пятый уровень</a:t>
             </a:r>
-            <a:endParaRPr lang="ru-RU"/>
           </a:p>
         </p:txBody>
       </p:sp>
@@ -8408,7 +6423,7 @@
           <a:p>
             <a:fld id="{D4F0CBB7-6BAD-4AC4-BD78-10C1BA832273}" type="datetimeFigureOut">
               <a:rPr lang="ru-RU" smtClean="0"/>
-              <a:t>26.11.2016</a:t>
+              <a:t>28.11.2016</a:t>
             </a:fld>
             <a:endParaRPr lang="ru-RU"/>
           </a:p>
@@ -8514,7 +6529,6 @@
               <a:rPr lang="ru-RU"/>
               <a:t>Образец заголовка</a:t>
             </a:r>
-            <a:endParaRPr lang="ru-RU"/>
           </a:p>
         </p:txBody>
       </p:sp>
@@ -8661,7 +6675,7 @@
           <a:p>
             <a:fld id="{D4F0CBB7-6BAD-4AC4-BD78-10C1BA832273}" type="datetimeFigureOut">
               <a:rPr lang="ru-RU" smtClean="0"/>
-              <a:t>26.11.2016</a:t>
+              <a:t>28.11.2016</a:t>
             </a:fld>
             <a:endParaRPr lang="ru-RU"/>
           </a:p>
@@ -8773,7 +6787,6 @@
               <a:rPr lang="ru-RU"/>
               <a:t>Образец заголовка</a:t>
             </a:r>
-            <a:endParaRPr lang="ru-RU"/>
           </a:p>
         </p:txBody>
       </p:sp>
@@ -8835,7 +6848,6 @@
               <a:rPr lang="ru-RU"/>
               <a:t>Пятый уровень</a:t>
             </a:r>
-            <a:endParaRPr lang="ru-RU"/>
           </a:p>
         </p:txBody>
       </p:sp>
@@ -8874,7 +6886,7 @@
           <a:p>
             <a:fld id="{D4F0CBB7-6BAD-4AC4-BD78-10C1BA832273}" type="datetimeFigureOut">
               <a:rPr lang="ru-RU" smtClean="0"/>
-              <a:t>26.11.2016</a:t>
+              <a:t>28.11.2016</a:t>
             </a:fld>
             <a:endParaRPr lang="ru-RU"/>
           </a:p>
@@ -9281,19 +7293,19 @@
       </p:grpSpPr>
       <p:graphicFrame>
         <p:nvGraphicFramePr>
-          <p:cNvPr id="7" name="Схема 6"/>
+          <p:cNvPr id="2" name="Схема 1"/>
           <p:cNvGraphicFramePr/>
           <p:nvPr>
             <p:extLst>
               <p:ext uri="{D42A27DB-BD31-4B8C-83A1-F6EECF244321}">
-                <p14:modId xmlns:p14="http://schemas.microsoft.com/office/powerpoint/2010/main" val="3802623864"/>
+                <p14:modId xmlns:p14="http://schemas.microsoft.com/office/powerpoint/2010/main" val="2625905515"/>
               </p:ext>
             </p:extLst>
           </p:nvPr>
         </p:nvGraphicFramePr>
         <p:xfrm>
-          <a:off x="2032000" y="719666"/>
-          <a:ext cx="8128000" cy="5418667"/>
+          <a:off x="0" y="0"/>
+          <a:ext cx="12191999" cy="6858000"/>
         </p:xfrm>
         <a:graphic>
           <a:graphicData uri="http://schemas.openxmlformats.org/drawingml/2006/diagram">

</xml_diff>